<commit_message>
Added reading check and programming practices
</commit_message>
<xml_diff>
--- a/slides/On-Campus/06_02_MoreLoops.pptx
+++ b/slides/On-Campus/06_02_MoreLoops.pptx
@@ -5,18 +5,22 @@
     <p:sldMasterId id="2147483648" r:id="rId1"/>
   </p:sldMasterIdLst>
   <p:notesMasterIdLst>
-    <p:notesMasterId r:id="rId8"/>
+    <p:notesMasterId r:id="rId12"/>
   </p:notesMasterIdLst>
   <p:handoutMasterIdLst>
-    <p:handoutMasterId r:id="rId9"/>
+    <p:handoutMasterId r:id="rId13"/>
   </p:handoutMasterIdLst>
   <p:sldIdLst>
     <p:sldId id="256" r:id="rId2"/>
     <p:sldId id="257" r:id="rId3"/>
     <p:sldId id="258" r:id="rId4"/>
-    <p:sldId id="259" r:id="rId5"/>
-    <p:sldId id="260" r:id="rId6"/>
-    <p:sldId id="261" r:id="rId7"/>
+    <p:sldId id="262" r:id="rId5"/>
+    <p:sldId id="263" r:id="rId6"/>
+    <p:sldId id="259" r:id="rId7"/>
+    <p:sldId id="264" r:id="rId8"/>
+    <p:sldId id="260" r:id="rId9"/>
+    <p:sldId id="265" r:id="rId10"/>
+    <p:sldId id="261" r:id="rId11"/>
   </p:sldIdLst>
   <p:sldSz cx="13817600" cy="7772400"/>
   <p:notesSz cx="6858000" cy="9144000"/>
@@ -137,6 +141,308 @@
 </p:presentation>
 </file>
 
+<file path=ppt/changesInfos/changesInfo1.xml><?xml version="1.0" encoding="utf-8"?>
+<pc:chgInfo xmlns:a="http://schemas.openxmlformats.org/drawingml/2006/main" xmlns:r="http://schemas.openxmlformats.org/officeDocument/2006/relationships" xmlns:ac="http://schemas.microsoft.com/office/drawing/2013/main/command" xmlns:pc="http://schemas.microsoft.com/office/powerpoint/2013/main/command">
+  <pc:docChgLst>
+    <pc:chgData name="Marcia Moraes" userId="c9c67e8a-58e2-4733-9a1c-5d44fec4775b" providerId="ADAL" clId="{421463BC-71AD-4DEC-91D0-F294F05D6BC4}"/>
+    <pc:docChg chg="undo custSel addSld delSld modSld">
+      <pc:chgData name="Marcia Moraes" userId="c9c67e8a-58e2-4733-9a1c-5d44fec4775b" providerId="ADAL" clId="{421463BC-71AD-4DEC-91D0-F294F05D6BC4}" dt="2021-09-27T23:30:40.916" v="1980" actId="20577"/>
+      <pc:docMkLst>
+        <pc:docMk/>
+      </pc:docMkLst>
+      <pc:sldChg chg="modSp">
+        <pc:chgData name="Marcia Moraes" userId="c9c67e8a-58e2-4733-9a1c-5d44fec4775b" providerId="ADAL" clId="{421463BC-71AD-4DEC-91D0-F294F05D6BC4}" dt="2021-09-27T22:59:50.944" v="1750" actId="14100"/>
+        <pc:sldMkLst>
+          <pc:docMk/>
+          <pc:sldMk cId="2656504816" sldId="257"/>
+        </pc:sldMkLst>
+        <pc:spChg chg="mod">
+          <ac:chgData name="Marcia Moraes" userId="c9c67e8a-58e2-4733-9a1c-5d44fec4775b" providerId="ADAL" clId="{421463BC-71AD-4DEC-91D0-F294F05D6BC4}" dt="2021-09-27T22:59:50.944" v="1750" actId="14100"/>
+          <ac:spMkLst>
+            <pc:docMk/>
+            <pc:sldMk cId="2656504816" sldId="257"/>
+            <ac:spMk id="5" creationId="{DADDAA0C-CB62-1049-AF60-5356E6C65DB6}"/>
+          </ac:spMkLst>
+        </pc:spChg>
+      </pc:sldChg>
+      <pc:sldChg chg="addSp modSp modAnim">
+        <pc:chgData name="Marcia Moraes" userId="c9c67e8a-58e2-4733-9a1c-5d44fec4775b" providerId="ADAL" clId="{421463BC-71AD-4DEC-91D0-F294F05D6BC4}" dt="2021-09-27T19:57:33.749" v="173"/>
+        <pc:sldMkLst>
+          <pc:docMk/>
+          <pc:sldMk cId="4259123250" sldId="258"/>
+        </pc:sldMkLst>
+        <pc:spChg chg="mod">
+          <ac:chgData name="Marcia Moraes" userId="c9c67e8a-58e2-4733-9a1c-5d44fec4775b" providerId="ADAL" clId="{421463BC-71AD-4DEC-91D0-F294F05D6BC4}" dt="2021-09-27T19:55:21.483" v="105" actId="20577"/>
+          <ac:spMkLst>
+            <pc:docMk/>
+            <pc:sldMk cId="4259123250" sldId="258"/>
+            <ac:spMk id="6" creationId="{215A03DE-C225-4246-BE01-1284F3300E55}"/>
+          </ac:spMkLst>
+        </pc:spChg>
+        <pc:spChg chg="mod">
+          <ac:chgData name="Marcia Moraes" userId="c9c67e8a-58e2-4733-9a1c-5d44fec4775b" providerId="ADAL" clId="{421463BC-71AD-4DEC-91D0-F294F05D6BC4}" dt="2021-09-27T19:55:31.576" v="116" actId="20577"/>
+          <ac:spMkLst>
+            <pc:docMk/>
+            <pc:sldMk cId="4259123250" sldId="258"/>
+            <ac:spMk id="8" creationId="{49EADE3C-DE69-F74B-9A8A-62754D809272}"/>
+          </ac:spMkLst>
+        </pc:spChg>
+        <pc:spChg chg="mod">
+          <ac:chgData name="Marcia Moraes" userId="c9c67e8a-58e2-4733-9a1c-5d44fec4775b" providerId="ADAL" clId="{421463BC-71AD-4DEC-91D0-F294F05D6BC4}" dt="2021-09-27T19:44:37.790" v="22" actId="1076"/>
+          <ac:spMkLst>
+            <pc:docMk/>
+            <pc:sldMk cId="4259123250" sldId="258"/>
+            <ac:spMk id="9" creationId="{5BBACFA7-FBA0-D147-B545-C0A5AAFE4B13}"/>
+          </ac:spMkLst>
+        </pc:spChg>
+        <pc:spChg chg="add mod">
+          <ac:chgData name="Marcia Moraes" userId="c9c67e8a-58e2-4733-9a1c-5d44fec4775b" providerId="ADAL" clId="{421463BC-71AD-4DEC-91D0-F294F05D6BC4}" dt="2021-09-27T19:56:04.102" v="149" actId="14100"/>
+          <ac:spMkLst>
+            <pc:docMk/>
+            <pc:sldMk cId="4259123250" sldId="258"/>
+            <ac:spMk id="10" creationId="{F9AE95EF-C521-405F-9CA2-05DC5267DA5C}"/>
+          </ac:spMkLst>
+        </pc:spChg>
+        <pc:spChg chg="mod">
+          <ac:chgData name="Marcia Moraes" userId="c9c67e8a-58e2-4733-9a1c-5d44fec4775b" providerId="ADAL" clId="{421463BC-71AD-4DEC-91D0-F294F05D6BC4}" dt="2021-09-27T19:44:42.213" v="23" actId="1076"/>
+          <ac:spMkLst>
+            <pc:docMk/>
+            <pc:sldMk cId="4259123250" sldId="258"/>
+            <ac:spMk id="11" creationId="{0916400C-5B8A-9344-8124-8D5F32E3ADF5}"/>
+          </ac:spMkLst>
+        </pc:spChg>
+        <pc:spChg chg="add mod">
+          <ac:chgData name="Marcia Moraes" userId="c9c67e8a-58e2-4733-9a1c-5d44fec4775b" providerId="ADAL" clId="{421463BC-71AD-4DEC-91D0-F294F05D6BC4}" dt="2021-09-27T19:56:21.359" v="169" actId="20577"/>
+          <ac:spMkLst>
+            <pc:docMk/>
+            <pc:sldMk cId="4259123250" sldId="258"/>
+            <ac:spMk id="12" creationId="{9AD6023A-1D95-47A3-B466-C0999E8BEAF5}"/>
+          </ac:spMkLst>
+        </pc:spChg>
+        <pc:spChg chg="mod">
+          <ac:chgData name="Marcia Moraes" userId="c9c67e8a-58e2-4733-9a1c-5d44fec4775b" providerId="ADAL" clId="{421463BC-71AD-4DEC-91D0-F294F05D6BC4}" dt="2021-09-27T19:44:33.946" v="21" actId="1076"/>
+          <ac:spMkLst>
+            <pc:docMk/>
+            <pc:sldMk cId="4259123250" sldId="258"/>
+            <ac:spMk id="13" creationId="{208E2CC9-0840-BD40-943D-DB7B66889258}"/>
+          </ac:spMkLst>
+        </pc:spChg>
+      </pc:sldChg>
+      <pc:sldChg chg="modSp add">
+        <pc:chgData name="Marcia Moraes" userId="c9c67e8a-58e2-4733-9a1c-5d44fec4775b" providerId="ADAL" clId="{421463BC-71AD-4DEC-91D0-F294F05D6BC4}" dt="2021-09-27T20:12:36.167" v="673" actId="20577"/>
+        <pc:sldMkLst>
+          <pc:docMk/>
+          <pc:sldMk cId="2269088149" sldId="262"/>
+        </pc:sldMkLst>
+        <pc:spChg chg="mod">
+          <ac:chgData name="Marcia Moraes" userId="c9c67e8a-58e2-4733-9a1c-5d44fec4775b" providerId="ADAL" clId="{421463BC-71AD-4DEC-91D0-F294F05D6BC4}" dt="2021-09-27T20:04:04.905" v="187" actId="20577"/>
+          <ac:spMkLst>
+            <pc:docMk/>
+            <pc:sldMk cId="2269088149" sldId="262"/>
+            <ac:spMk id="4" creationId="{FAAE6F2E-172B-F74B-A63E-FBEE9F584404}"/>
+          </ac:spMkLst>
+        </pc:spChg>
+        <pc:spChg chg="mod">
+          <ac:chgData name="Marcia Moraes" userId="c9c67e8a-58e2-4733-9a1c-5d44fec4775b" providerId="ADAL" clId="{421463BC-71AD-4DEC-91D0-F294F05D6BC4}" dt="2021-09-27T20:12:36.167" v="673" actId="20577"/>
+          <ac:spMkLst>
+            <pc:docMk/>
+            <pc:sldMk cId="2269088149" sldId="262"/>
+            <ac:spMk id="5" creationId="{DADDAA0C-CB62-1049-AF60-5356E6C65DB6}"/>
+          </ac:spMkLst>
+        </pc:spChg>
+      </pc:sldChg>
+      <pc:sldChg chg="addSp delSp modSp add modAnim">
+        <pc:chgData name="Marcia Moraes" userId="c9c67e8a-58e2-4733-9a1c-5d44fec4775b" providerId="ADAL" clId="{421463BC-71AD-4DEC-91D0-F294F05D6BC4}" dt="2021-09-27T23:11:56.576" v="1777" actId="20577"/>
+        <pc:sldMkLst>
+          <pc:docMk/>
+          <pc:sldMk cId="2773136670" sldId="263"/>
+        </pc:sldMkLst>
+        <pc:spChg chg="add mod">
+          <ac:chgData name="Marcia Moraes" userId="c9c67e8a-58e2-4733-9a1c-5d44fec4775b" providerId="ADAL" clId="{421463BC-71AD-4DEC-91D0-F294F05D6BC4}" dt="2021-09-27T23:11:56.576" v="1777" actId="20577"/>
+          <ac:spMkLst>
+            <pc:docMk/>
+            <pc:sldMk cId="2773136670" sldId="263"/>
+            <ac:spMk id="2" creationId="{F6BD3C05-F987-46BA-9064-1FF4E002025C}"/>
+          </ac:spMkLst>
+        </pc:spChg>
+        <pc:spChg chg="add del mod">
+          <ac:chgData name="Marcia Moraes" userId="c9c67e8a-58e2-4733-9a1c-5d44fec4775b" providerId="ADAL" clId="{421463BC-71AD-4DEC-91D0-F294F05D6BC4}" dt="2021-09-27T20:20:32.451" v="699" actId="478"/>
+          <ac:spMkLst>
+            <pc:docMk/>
+            <pc:sldMk cId="2773136670" sldId="263"/>
+            <ac:spMk id="3" creationId="{1859DA0A-1835-450C-8C10-08F65B6028FD}"/>
+          </ac:spMkLst>
+        </pc:spChg>
+        <pc:spChg chg="add mod">
+          <ac:chgData name="Marcia Moraes" userId="c9c67e8a-58e2-4733-9a1c-5d44fec4775b" providerId="ADAL" clId="{421463BC-71AD-4DEC-91D0-F294F05D6BC4}" dt="2021-09-27T22:40:35.042" v="700" actId="11529"/>
+          <ac:spMkLst>
+            <pc:docMk/>
+            <pc:sldMk cId="2773136670" sldId="263"/>
+            <ac:spMk id="3" creationId="{5F71938A-F4EF-4C7E-A174-370663BD7E78}"/>
+          </ac:spMkLst>
+        </pc:spChg>
+        <pc:spChg chg="mod">
+          <ac:chgData name="Marcia Moraes" userId="c9c67e8a-58e2-4733-9a1c-5d44fec4775b" providerId="ADAL" clId="{421463BC-71AD-4DEC-91D0-F294F05D6BC4}" dt="2021-09-27T20:18:57.681" v="696" actId="1076"/>
+          <ac:spMkLst>
+            <pc:docMk/>
+            <pc:sldMk cId="2773136670" sldId="263"/>
+            <ac:spMk id="4" creationId="{FAAE6F2E-172B-F74B-A63E-FBEE9F584404}"/>
+          </ac:spMkLst>
+        </pc:spChg>
+        <pc:spChg chg="add mod">
+          <ac:chgData name="Marcia Moraes" userId="c9c67e8a-58e2-4733-9a1c-5d44fec4775b" providerId="ADAL" clId="{421463BC-71AD-4DEC-91D0-F294F05D6BC4}" dt="2021-09-27T22:41:27.972" v="762" actId="6549"/>
+          <ac:spMkLst>
+            <pc:docMk/>
+            <pc:sldMk cId="2773136670" sldId="263"/>
+            <ac:spMk id="5" creationId="{869777BD-3740-4BB9-AA23-5BFCF2D69557}"/>
+          </ac:spMkLst>
+        </pc:spChg>
+        <pc:spChg chg="del mod">
+          <ac:chgData name="Marcia Moraes" userId="c9c67e8a-58e2-4733-9a1c-5d44fec4775b" providerId="ADAL" clId="{421463BC-71AD-4DEC-91D0-F294F05D6BC4}" dt="2021-09-27T20:18:21.592" v="693"/>
+          <ac:spMkLst>
+            <pc:docMk/>
+            <pc:sldMk cId="2773136670" sldId="263"/>
+            <ac:spMk id="5" creationId="{DADDAA0C-CB62-1049-AF60-5356E6C65DB6}"/>
+          </ac:spMkLst>
+        </pc:spChg>
+        <pc:spChg chg="add mod">
+          <ac:chgData name="Marcia Moraes" userId="c9c67e8a-58e2-4733-9a1c-5d44fec4775b" providerId="ADAL" clId="{421463BC-71AD-4DEC-91D0-F294F05D6BC4}" dt="2021-09-27T22:41:45.269" v="766" actId="14100"/>
+          <ac:spMkLst>
+            <pc:docMk/>
+            <pc:sldMk cId="2773136670" sldId="263"/>
+            <ac:spMk id="6" creationId="{51A77FE8-AFCB-4BB7-A9EE-7ED1FA167F37}"/>
+          </ac:spMkLst>
+        </pc:spChg>
+        <pc:spChg chg="add mod">
+          <ac:chgData name="Marcia Moraes" userId="c9c67e8a-58e2-4733-9a1c-5d44fec4775b" providerId="ADAL" clId="{421463BC-71AD-4DEC-91D0-F294F05D6BC4}" dt="2021-09-27T22:42:09.808" v="816" actId="1076"/>
+          <ac:spMkLst>
+            <pc:docMk/>
+            <pc:sldMk cId="2773136670" sldId="263"/>
+            <ac:spMk id="7" creationId="{3B5F058B-94F9-48DF-858B-E3BBBF940E08}"/>
+          </ac:spMkLst>
+        </pc:spChg>
+        <pc:spChg chg="add mod">
+          <ac:chgData name="Marcia Moraes" userId="c9c67e8a-58e2-4733-9a1c-5d44fec4775b" providerId="ADAL" clId="{421463BC-71AD-4DEC-91D0-F294F05D6BC4}" dt="2021-09-27T22:42:15.941" v="818" actId="1076"/>
+          <ac:spMkLst>
+            <pc:docMk/>
+            <pc:sldMk cId="2773136670" sldId="263"/>
+            <ac:spMk id="8" creationId="{E8A14603-091C-4F16-AA8E-024DF442E84E}"/>
+          </ac:spMkLst>
+        </pc:spChg>
+        <pc:spChg chg="add mod">
+          <ac:chgData name="Marcia Moraes" userId="c9c67e8a-58e2-4733-9a1c-5d44fec4775b" providerId="ADAL" clId="{421463BC-71AD-4DEC-91D0-F294F05D6BC4}" dt="2021-09-27T22:42:34.577" v="886" actId="6549"/>
+          <ac:spMkLst>
+            <pc:docMk/>
+            <pc:sldMk cId="2773136670" sldId="263"/>
+            <ac:spMk id="9" creationId="{3DC5E008-0995-4A18-826B-41B8FD0923B6}"/>
+          </ac:spMkLst>
+        </pc:spChg>
+      </pc:sldChg>
+      <pc:sldChg chg="delSp modSp add delAnim">
+        <pc:chgData name="Marcia Moraes" userId="c9c67e8a-58e2-4733-9a1c-5d44fec4775b" providerId="ADAL" clId="{421463BC-71AD-4DEC-91D0-F294F05D6BC4}" dt="2021-09-27T23:14:23.459" v="1805" actId="20577"/>
+        <pc:sldMkLst>
+          <pc:docMk/>
+          <pc:sldMk cId="1005821696" sldId="264"/>
+        </pc:sldMkLst>
+        <pc:spChg chg="mod">
+          <ac:chgData name="Marcia Moraes" userId="c9c67e8a-58e2-4733-9a1c-5d44fec4775b" providerId="ADAL" clId="{421463BC-71AD-4DEC-91D0-F294F05D6BC4}" dt="2021-09-27T23:02:31.657" v="1770" actId="20577"/>
+          <ac:spMkLst>
+            <pc:docMk/>
+            <pc:sldMk cId="1005821696" sldId="264"/>
+            <ac:spMk id="2" creationId="{D9AF706D-06D8-E545-B819-BF81D256C7CE}"/>
+          </ac:spMkLst>
+        </pc:spChg>
+        <pc:spChg chg="mod">
+          <ac:chgData name="Marcia Moraes" userId="c9c67e8a-58e2-4733-9a1c-5d44fec4775b" providerId="ADAL" clId="{421463BC-71AD-4DEC-91D0-F294F05D6BC4}" dt="2021-09-27T23:14:23.459" v="1805" actId="20577"/>
+          <ac:spMkLst>
+            <pc:docMk/>
+            <pc:sldMk cId="1005821696" sldId="264"/>
+            <ac:spMk id="3" creationId="{A532DEDA-9414-0A41-B377-DBD94A1F0E75}"/>
+          </ac:spMkLst>
+        </pc:spChg>
+        <pc:spChg chg="del">
+          <ac:chgData name="Marcia Moraes" userId="c9c67e8a-58e2-4733-9a1c-5d44fec4775b" providerId="ADAL" clId="{421463BC-71AD-4DEC-91D0-F294F05D6BC4}" dt="2021-09-27T22:46:17.832" v="904" actId="478"/>
+          <ac:spMkLst>
+            <pc:docMk/>
+            <pc:sldMk cId="1005821696" sldId="264"/>
+            <ac:spMk id="4" creationId="{220DC209-9736-5C43-A4E6-0C23A367239F}"/>
+          </ac:spMkLst>
+        </pc:spChg>
+        <pc:spChg chg="del">
+          <ac:chgData name="Marcia Moraes" userId="c9c67e8a-58e2-4733-9a1c-5d44fec4775b" providerId="ADAL" clId="{421463BC-71AD-4DEC-91D0-F294F05D6BC4}" dt="2021-09-27T22:46:14.515" v="902" actId="478"/>
+          <ac:spMkLst>
+            <pc:docMk/>
+            <pc:sldMk cId="1005821696" sldId="264"/>
+            <ac:spMk id="5" creationId="{DC652986-60D7-D04D-B220-8D3C643C5819}"/>
+          </ac:spMkLst>
+        </pc:spChg>
+        <pc:spChg chg="del">
+          <ac:chgData name="Marcia Moraes" userId="c9c67e8a-58e2-4733-9a1c-5d44fec4775b" providerId="ADAL" clId="{421463BC-71AD-4DEC-91D0-F294F05D6BC4}" dt="2021-09-27T22:46:15.682" v="903" actId="478"/>
+          <ac:spMkLst>
+            <pc:docMk/>
+            <pc:sldMk cId="1005821696" sldId="264"/>
+            <ac:spMk id="6" creationId="{AE630439-DD3A-5842-AE4F-84D0C8D653D7}"/>
+          </ac:spMkLst>
+        </pc:spChg>
+      </pc:sldChg>
+      <pc:sldChg chg="modSp add">
+        <pc:chgData name="Marcia Moraes" userId="c9c67e8a-58e2-4733-9a1c-5d44fec4775b" providerId="ADAL" clId="{421463BC-71AD-4DEC-91D0-F294F05D6BC4}" dt="2021-09-27T23:30:40.916" v="1980" actId="20577"/>
+        <pc:sldMkLst>
+          <pc:docMk/>
+          <pc:sldMk cId="2860398301" sldId="265"/>
+        </pc:sldMkLst>
+        <pc:spChg chg="mod">
+          <ac:chgData name="Marcia Moraes" userId="c9c67e8a-58e2-4733-9a1c-5d44fec4775b" providerId="ADAL" clId="{421463BC-71AD-4DEC-91D0-F294F05D6BC4}" dt="2021-09-27T23:25:49.437" v="1808" actId="20577"/>
+          <ac:spMkLst>
+            <pc:docMk/>
+            <pc:sldMk cId="2860398301" sldId="265"/>
+            <ac:spMk id="2" creationId="{D9AF706D-06D8-E545-B819-BF81D256C7CE}"/>
+          </ac:spMkLst>
+        </pc:spChg>
+        <pc:spChg chg="mod">
+          <ac:chgData name="Marcia Moraes" userId="c9c67e8a-58e2-4733-9a1c-5d44fec4775b" providerId="ADAL" clId="{421463BC-71AD-4DEC-91D0-F294F05D6BC4}" dt="2021-09-27T23:30:40.916" v="1980" actId="20577"/>
+          <ac:spMkLst>
+            <pc:docMk/>
+            <pc:sldMk cId="2860398301" sldId="265"/>
+            <ac:spMk id="3" creationId="{A532DEDA-9414-0A41-B377-DBD94A1F0E75}"/>
+          </ac:spMkLst>
+        </pc:spChg>
+      </pc:sldChg>
+      <pc:sldChg chg="addSp delSp add del">
+        <pc:chgData name="Marcia Moraes" userId="c9c67e8a-58e2-4733-9a1c-5d44fec4775b" providerId="ADAL" clId="{421463BC-71AD-4DEC-91D0-F294F05D6BC4}" dt="2021-09-27T19:44:28.326" v="19" actId="2696"/>
+        <pc:sldMkLst>
+          <pc:docMk/>
+          <pc:sldMk cId="926474781" sldId="266"/>
+        </pc:sldMkLst>
+        <pc:spChg chg="add del">
+          <ac:chgData name="Marcia Moraes" userId="c9c67e8a-58e2-4733-9a1c-5d44fec4775b" providerId="ADAL" clId="{421463BC-71AD-4DEC-91D0-F294F05D6BC4}" dt="2021-09-27T19:44:06.930" v="6" actId="478"/>
+          <ac:spMkLst>
+            <pc:docMk/>
+            <pc:sldMk cId="926474781" sldId="266"/>
+            <ac:spMk id="3" creationId="{219403AF-FCA0-4FAD-B2CD-E3D24CF8DD27}"/>
+          </ac:spMkLst>
+        </pc:spChg>
+      </pc:sldChg>
+      <pc:sldMasterChg chg="addSldLayout delSldLayout">
+        <pc:chgData name="Marcia Moraes" userId="c9c67e8a-58e2-4733-9a1c-5d44fec4775b" providerId="ADAL" clId="{421463BC-71AD-4DEC-91D0-F294F05D6BC4}" dt="2021-09-27T19:44:28.326" v="20" actId="2696"/>
+        <pc:sldMasterMkLst>
+          <pc:docMk/>
+          <pc:sldMasterMk cId="3965733437" sldId="2147483648"/>
+        </pc:sldMasterMkLst>
+        <pc:sldLayoutChg chg="add del">
+          <pc:chgData name="Marcia Moraes" userId="c9c67e8a-58e2-4733-9a1c-5d44fec4775b" providerId="ADAL" clId="{421463BC-71AD-4DEC-91D0-F294F05D6BC4}" dt="2021-09-27T19:44:28.326" v="20" actId="2696"/>
+          <pc:sldLayoutMkLst>
+            <pc:docMk/>
+            <pc:sldMasterMk cId="3965733437" sldId="2147483648"/>
+            <pc:sldLayoutMk cId="979323933" sldId="2147483693"/>
+          </pc:sldLayoutMkLst>
+        </pc:sldLayoutChg>
+      </pc:sldMasterChg>
+    </pc:docChg>
+  </pc:docChgLst>
+</pc:chgInfo>
+</file>
+
 <file path=ppt/handoutMasters/handoutMaster1.xml><?xml version="1.0" encoding="utf-8"?>
 <p:handoutMaster xmlns:a="http://schemas.openxmlformats.org/drawingml/2006/main" xmlns:r="http://schemas.openxmlformats.org/officeDocument/2006/relationships" xmlns:p="http://schemas.openxmlformats.org/presentationml/2006/main">
   <p:cSld>
@@ -219,7 +525,7 @@
           <a:p>
             <a:fld id="{4D7E51A5-B478-1E40-8CBB-0DAA8831E99D}" type="datetimeFigureOut">
               <a:rPr lang="en-US" smtClean="0"/>
-              <a:t>4/11/20</a:t>
+              <a:t>9/27/2021</a:t>
             </a:fld>
             <a:endParaRPr lang="en-US"/>
           </a:p>
@@ -384,7 +690,7 @@
           <a:p>
             <a:fld id="{D0ED587F-861E-6740-9643-E3DDAE89B8D6}" type="datetimeFigureOut">
               <a:rPr lang="en-US" smtClean="0"/>
-              <a:t>4/11/20</a:t>
+              <a:t>9/27/2021</a:t>
             </a:fld>
             <a:endParaRPr lang="en-US"/>
           </a:p>
@@ -6708,6 +7014,690 @@
 </p:sld>
 </file>
 
+<file path=ppt/slides/slide10.xml><?xml version="1.0" encoding="utf-8"?>
+<p:sld xmlns:a="http://schemas.openxmlformats.org/drawingml/2006/main" xmlns:r="http://schemas.openxmlformats.org/officeDocument/2006/relationships" xmlns:p="http://schemas.openxmlformats.org/presentationml/2006/main">
+  <p:cSld>
+    <p:spTree>
+      <p:nvGrpSpPr>
+        <p:cNvPr id="1" name=""/>
+        <p:cNvGrpSpPr/>
+        <p:nvPr/>
+      </p:nvGrpSpPr>
+      <p:grpSpPr>
+        <a:xfrm>
+          <a:off x="0" y="0"/>
+          <a:ext cx="0" cy="0"/>
+          <a:chOff x="0" y="0"/>
+          <a:chExt cx="0" cy="0"/>
+        </a:xfrm>
+      </p:grpSpPr>
+      <p:sp>
+        <p:nvSpPr>
+          <p:cNvPr id="2" name="Title 1">
+            <a:extLst>
+              <a:ext uri="{FF2B5EF4-FFF2-40B4-BE49-F238E27FC236}">
+                <a16:creationId xmlns:a16="http://schemas.microsoft.com/office/drawing/2014/main" id="{539AA6FB-C635-3F4C-A3B8-64514A3441C6}"/>
+              </a:ext>
+            </a:extLst>
+          </p:cNvPr>
+          <p:cNvSpPr>
+            <a:spLocks noGrp="1"/>
+          </p:cNvSpPr>
+          <p:nvPr>
+            <p:ph type="title"/>
+          </p:nvPr>
+        </p:nvSpPr>
+        <p:spPr/>
+        <p:txBody>
+          <a:bodyPr/>
+          <a:lstStyle/>
+          <a:p>
+            <a:r>
+              <a:rPr lang="en-US" dirty="0"/>
+              <a:t>Changing loop order: Break / Continue</a:t>
+            </a:r>
+          </a:p>
+        </p:txBody>
+      </p:sp>
+      <p:sp>
+        <p:nvSpPr>
+          <p:cNvPr id="3" name="Text Placeholder 2">
+            <a:extLst>
+              <a:ext uri="{FF2B5EF4-FFF2-40B4-BE49-F238E27FC236}">
+                <a16:creationId xmlns:a16="http://schemas.microsoft.com/office/drawing/2014/main" id="{9EBD3E95-5EDA-0C42-8688-123BE37EC608}"/>
+              </a:ext>
+            </a:extLst>
+          </p:cNvPr>
+          <p:cNvSpPr>
+            <a:spLocks noGrp="1"/>
+          </p:cNvSpPr>
+          <p:nvPr>
+            <p:ph type="body" sz="quarter" idx="10"/>
+          </p:nvPr>
+        </p:nvSpPr>
+        <p:spPr>
+          <a:xfrm>
+            <a:off x="628075" y="1776682"/>
+            <a:ext cx="6644263" cy="2295255"/>
+          </a:xfrm>
+        </p:spPr>
+        <p:txBody>
+          <a:bodyPr/>
+          <a:lstStyle/>
+          <a:p>
+            <a:r>
+              <a:rPr lang="en-US" dirty="0"/>
+              <a:t>break</a:t>
+            </a:r>
+          </a:p>
+          <a:p>
+            <a:pPr lvl="1"/>
+            <a:r>
+              <a:rPr lang="en-US" dirty="0"/>
+              <a:t>allows to break out of the loop completely (early exit)</a:t>
+            </a:r>
+          </a:p>
+          <a:p>
+            <a:r>
+              <a:rPr lang="en-US" dirty="0"/>
+              <a:t>continue</a:t>
+            </a:r>
+          </a:p>
+          <a:p>
+            <a:pPr lvl="1"/>
+            <a:r>
+              <a:rPr lang="en-US" dirty="0"/>
+              <a:t>allows us to move back to the top of the code block</a:t>
+            </a:r>
+          </a:p>
+          <a:p>
+            <a:pPr lvl="1"/>
+            <a:r>
+              <a:rPr lang="en-US" dirty="0"/>
+              <a:t>with for loop, the incrementor is still completed</a:t>
+            </a:r>
+          </a:p>
+        </p:txBody>
+      </p:sp>
+      <p:sp>
+        <p:nvSpPr>
+          <p:cNvPr id="4" name="TextBox 3">
+            <a:extLst>
+              <a:ext uri="{FF2B5EF4-FFF2-40B4-BE49-F238E27FC236}">
+                <a16:creationId xmlns:a16="http://schemas.microsoft.com/office/drawing/2014/main" id="{F4C21DEF-FFE6-7846-8B15-F8294C302A46}"/>
+              </a:ext>
+            </a:extLst>
+          </p:cNvPr>
+          <p:cNvSpPr txBox="1"/>
+          <p:nvPr/>
+        </p:nvSpPr>
+        <p:spPr>
+          <a:xfrm>
+            <a:off x="7873297" y="2282784"/>
+            <a:ext cx="4921953" cy="1077218"/>
+          </a:xfrm>
+          <a:prstGeom prst="rect">
+            <a:avLst/>
+          </a:prstGeom>
+          <a:solidFill>
+            <a:schemeClr val="bg2"/>
+          </a:solidFill>
+        </p:spPr>
+        <p:txBody>
+          <a:bodyPr wrap="square" rtlCol="0">
+            <a:spAutoFit/>
+          </a:bodyPr>
+          <a:lstStyle/>
+          <a:p>
+            <a:r>
+              <a:rPr lang="en-US" sz="1600" dirty="0">
+                <a:latin typeface="Consolas" panose="020B0609020204030204" pitchFamily="49" charset="0"/>
+                <a:cs typeface="Consolas" panose="020B0609020204030204" pitchFamily="49" charset="0"/>
+              </a:rPr>
+              <a:t>for(int x =  0; x &lt; 100; x++) {</a:t>
+            </a:r>
+          </a:p>
+          <a:p>
+            <a:r>
+              <a:rPr lang="en-US" sz="1600" dirty="0">
+                <a:latin typeface="Consolas" panose="020B0609020204030204" pitchFamily="49" charset="0"/>
+                <a:cs typeface="Consolas" panose="020B0609020204030204" pitchFamily="49" charset="0"/>
+              </a:rPr>
+              <a:t>   if(x == 10) </a:t>
+            </a:r>
+            <a:r>
+              <a:rPr lang="en-US" sz="1600" b="1" dirty="0">
+                <a:latin typeface="Consolas" panose="020B0609020204030204" pitchFamily="49" charset="0"/>
+                <a:cs typeface="Consolas" panose="020B0609020204030204" pitchFamily="49" charset="0"/>
+              </a:rPr>
+              <a:t>break</a:t>
+            </a:r>
+            <a:r>
+              <a:rPr lang="en-US" sz="1600" dirty="0">
+                <a:latin typeface="Consolas" panose="020B0609020204030204" pitchFamily="49" charset="0"/>
+                <a:cs typeface="Consolas" panose="020B0609020204030204" pitchFamily="49" charset="0"/>
+              </a:rPr>
+              <a:t>;</a:t>
+            </a:r>
+          </a:p>
+          <a:p>
+            <a:r>
+              <a:rPr lang="en-US" sz="1600" dirty="0">
+                <a:latin typeface="Consolas" panose="020B0609020204030204" pitchFamily="49" charset="0"/>
+                <a:cs typeface="Consolas" panose="020B0609020204030204" pitchFamily="49" charset="0"/>
+              </a:rPr>
+              <a:t>   </a:t>
+            </a:r>
+            <a:r>
+              <a:rPr lang="en-US" sz="1600" dirty="0" err="1">
+                <a:latin typeface="Consolas" panose="020B0609020204030204" pitchFamily="49" charset="0"/>
+                <a:cs typeface="Consolas" panose="020B0609020204030204" pitchFamily="49" charset="0"/>
+              </a:rPr>
+              <a:t>System.out.print</a:t>
+            </a:r>
+            <a:r>
+              <a:rPr lang="en-US" sz="1600" dirty="0">
+                <a:latin typeface="Consolas" panose="020B0609020204030204" pitchFamily="49" charset="0"/>
+                <a:cs typeface="Consolas" panose="020B0609020204030204" pitchFamily="49" charset="0"/>
+              </a:rPr>
+              <a:t>(x);</a:t>
+            </a:r>
+          </a:p>
+          <a:p>
+            <a:r>
+              <a:rPr lang="en-US" sz="1600" dirty="0">
+                <a:latin typeface="Consolas" panose="020B0609020204030204" pitchFamily="49" charset="0"/>
+                <a:cs typeface="Consolas" panose="020B0609020204030204" pitchFamily="49" charset="0"/>
+              </a:rPr>
+              <a:t>}</a:t>
+            </a:r>
+          </a:p>
+        </p:txBody>
+      </p:sp>
+      <p:sp>
+        <p:nvSpPr>
+          <p:cNvPr id="5" name="Snip Single Corner Rectangle 4">
+            <a:extLst>
+              <a:ext uri="{FF2B5EF4-FFF2-40B4-BE49-F238E27FC236}">
+                <a16:creationId xmlns:a16="http://schemas.microsoft.com/office/drawing/2014/main" id="{18A788EF-078B-C547-81F9-CA02C1169A20}"/>
+              </a:ext>
+            </a:extLst>
+          </p:cNvPr>
+          <p:cNvSpPr/>
+          <p:nvPr/>
+        </p:nvSpPr>
+        <p:spPr>
+          <a:xfrm>
+            <a:off x="8441179" y="3536126"/>
+            <a:ext cx="3786188" cy="700088"/>
+          </a:xfrm>
+          <a:prstGeom prst="snip1Rect">
+            <a:avLst/>
+          </a:prstGeom>
+          <a:solidFill>
+            <a:schemeClr val="tx2"/>
+          </a:solidFill>
+          <a:ln>
+            <a:noFill/>
+          </a:ln>
+          <a:effectLst/>
+        </p:spPr>
+        <p:style>
+          <a:lnRef idx="1">
+            <a:schemeClr val="accent1"/>
+          </a:lnRef>
+          <a:fillRef idx="3">
+            <a:schemeClr val="accent1"/>
+          </a:fillRef>
+          <a:effectRef idx="2">
+            <a:schemeClr val="accent1"/>
+          </a:effectRef>
+          <a:fontRef idx="minor">
+            <a:schemeClr val="lt1"/>
+          </a:fontRef>
+        </p:style>
+        <p:txBody>
+          <a:bodyPr lIns="274320" tIns="182880" rIns="274320" bIns="182880" rtlCol="0" anchor="ctr"/>
+          <a:lstStyle/>
+          <a:p>
+            <a:pPr algn="ctr"/>
+            <a:r>
+              <a:rPr lang="en-US" dirty="0">
+                <a:latin typeface="Proxima Nova" charset="0"/>
+                <a:ea typeface="Proxima Nova" charset="0"/>
+                <a:cs typeface="Proxima Nova" charset="0"/>
+              </a:rPr>
+              <a:t>0123456789</a:t>
+            </a:r>
+          </a:p>
+        </p:txBody>
+      </p:sp>
+      <p:sp>
+        <p:nvSpPr>
+          <p:cNvPr id="6" name="TextBox 5">
+            <a:extLst>
+              <a:ext uri="{FF2B5EF4-FFF2-40B4-BE49-F238E27FC236}">
+                <a16:creationId xmlns:a16="http://schemas.microsoft.com/office/drawing/2014/main" id="{4F117C7A-5AD9-BB42-AC66-5DEA244CC162}"/>
+              </a:ext>
+            </a:extLst>
+          </p:cNvPr>
+          <p:cNvSpPr txBox="1"/>
+          <p:nvPr/>
+        </p:nvSpPr>
+        <p:spPr>
+          <a:xfrm>
+            <a:off x="1489229" y="4997409"/>
+            <a:ext cx="4921953" cy="1077218"/>
+          </a:xfrm>
+          <a:prstGeom prst="rect">
+            <a:avLst/>
+          </a:prstGeom>
+          <a:solidFill>
+            <a:schemeClr val="bg2"/>
+          </a:solidFill>
+        </p:spPr>
+        <p:txBody>
+          <a:bodyPr wrap="square" rtlCol="0">
+            <a:spAutoFit/>
+          </a:bodyPr>
+          <a:lstStyle/>
+          <a:p>
+            <a:r>
+              <a:rPr lang="en-US" sz="1600" dirty="0">
+                <a:latin typeface="Consolas" panose="020B0609020204030204" pitchFamily="49" charset="0"/>
+                <a:cs typeface="Consolas" panose="020B0609020204030204" pitchFamily="49" charset="0"/>
+              </a:rPr>
+              <a:t>for(int x =  1; x &lt; 10; x++) {</a:t>
+            </a:r>
+          </a:p>
+          <a:p>
+            <a:r>
+              <a:rPr lang="en-US" sz="1600" dirty="0">
+                <a:latin typeface="Consolas" panose="020B0609020204030204" pitchFamily="49" charset="0"/>
+                <a:cs typeface="Consolas" panose="020B0609020204030204" pitchFamily="49" charset="0"/>
+              </a:rPr>
+              <a:t>   if(x%2 == 0) </a:t>
+            </a:r>
+            <a:r>
+              <a:rPr lang="en-US" sz="1600" b="1" dirty="0">
+                <a:latin typeface="Consolas" panose="020B0609020204030204" pitchFamily="49" charset="0"/>
+                <a:cs typeface="Consolas" panose="020B0609020204030204" pitchFamily="49" charset="0"/>
+              </a:rPr>
+              <a:t>continue</a:t>
+            </a:r>
+            <a:r>
+              <a:rPr lang="en-US" sz="1600" dirty="0">
+                <a:latin typeface="Consolas" panose="020B0609020204030204" pitchFamily="49" charset="0"/>
+                <a:cs typeface="Consolas" panose="020B0609020204030204" pitchFamily="49" charset="0"/>
+              </a:rPr>
+              <a:t>;</a:t>
+            </a:r>
+          </a:p>
+          <a:p>
+            <a:r>
+              <a:rPr lang="en-US" sz="1600" dirty="0">
+                <a:latin typeface="Consolas" panose="020B0609020204030204" pitchFamily="49" charset="0"/>
+                <a:cs typeface="Consolas" panose="020B0609020204030204" pitchFamily="49" charset="0"/>
+              </a:rPr>
+              <a:t>   </a:t>
+            </a:r>
+            <a:r>
+              <a:rPr lang="en-US" sz="1600" dirty="0" err="1">
+                <a:latin typeface="Consolas" panose="020B0609020204030204" pitchFamily="49" charset="0"/>
+                <a:cs typeface="Consolas" panose="020B0609020204030204" pitchFamily="49" charset="0"/>
+              </a:rPr>
+              <a:t>System.out.print</a:t>
+            </a:r>
+            <a:r>
+              <a:rPr lang="en-US" sz="1600" dirty="0">
+                <a:latin typeface="Consolas" panose="020B0609020204030204" pitchFamily="49" charset="0"/>
+                <a:cs typeface="Consolas" panose="020B0609020204030204" pitchFamily="49" charset="0"/>
+              </a:rPr>
+              <a:t>(x);</a:t>
+            </a:r>
+          </a:p>
+          <a:p>
+            <a:r>
+              <a:rPr lang="en-US" sz="1600" dirty="0">
+                <a:latin typeface="Consolas" panose="020B0609020204030204" pitchFamily="49" charset="0"/>
+                <a:cs typeface="Consolas" panose="020B0609020204030204" pitchFamily="49" charset="0"/>
+              </a:rPr>
+              <a:t>}</a:t>
+            </a:r>
+          </a:p>
+        </p:txBody>
+      </p:sp>
+      <p:sp>
+        <p:nvSpPr>
+          <p:cNvPr id="7" name="Snip Single Corner Rectangle 6">
+            <a:extLst>
+              <a:ext uri="{FF2B5EF4-FFF2-40B4-BE49-F238E27FC236}">
+                <a16:creationId xmlns:a16="http://schemas.microsoft.com/office/drawing/2014/main" id="{9B78E545-AACE-F448-BFEE-45B3ADEE260E}"/>
+              </a:ext>
+            </a:extLst>
+          </p:cNvPr>
+          <p:cNvSpPr/>
+          <p:nvPr/>
+        </p:nvSpPr>
+        <p:spPr>
+          <a:xfrm>
+            <a:off x="2057111" y="6300011"/>
+            <a:ext cx="3786188" cy="700088"/>
+          </a:xfrm>
+          <a:prstGeom prst="snip1Rect">
+            <a:avLst/>
+          </a:prstGeom>
+          <a:solidFill>
+            <a:schemeClr val="tx2"/>
+          </a:solidFill>
+          <a:ln>
+            <a:noFill/>
+          </a:ln>
+          <a:effectLst/>
+        </p:spPr>
+        <p:style>
+          <a:lnRef idx="1">
+            <a:schemeClr val="accent1"/>
+          </a:lnRef>
+          <a:fillRef idx="3">
+            <a:schemeClr val="accent1"/>
+          </a:fillRef>
+          <a:effectRef idx="2">
+            <a:schemeClr val="accent1"/>
+          </a:effectRef>
+          <a:fontRef idx="minor">
+            <a:schemeClr val="lt1"/>
+          </a:fontRef>
+        </p:style>
+        <p:txBody>
+          <a:bodyPr lIns="274320" tIns="182880" rIns="274320" bIns="182880" rtlCol="0" anchor="ctr"/>
+          <a:lstStyle/>
+          <a:p>
+            <a:pPr algn="ctr"/>
+            <a:r>
+              <a:rPr lang="en-US" dirty="0">
+                <a:latin typeface="Proxima Nova" charset="0"/>
+                <a:ea typeface="Proxima Nova" charset="0"/>
+                <a:cs typeface="Proxima Nova" charset="0"/>
+              </a:rPr>
+              <a:t>13579</a:t>
+            </a:r>
+          </a:p>
+        </p:txBody>
+      </p:sp>
+    </p:spTree>
+    <p:extLst>
+      <p:ext uri="{BB962C8B-B14F-4D97-AF65-F5344CB8AC3E}">
+        <p14:creationId xmlns:p14="http://schemas.microsoft.com/office/powerpoint/2010/main" val="4081044051"/>
+      </p:ext>
+    </p:extLst>
+  </p:cSld>
+  <p:clrMapOvr>
+    <a:masterClrMapping/>
+  </p:clrMapOvr>
+  <mc:AlternateContent xmlns:mc="http://schemas.openxmlformats.org/markup-compatibility/2006" xmlns:p14="http://schemas.microsoft.com/office/powerpoint/2010/main">
+    <mc:Choice Requires="p14">
+      <p:transition p14:dur="300">
+        <p:fade/>
+      </p:transition>
+    </mc:Choice>
+    <mc:Fallback xmlns="">
+      <p:transition>
+        <p:fade/>
+      </p:transition>
+    </mc:Fallback>
+  </mc:AlternateContent>
+  <p:timing>
+    <p:tnLst>
+      <p:par>
+        <p:cTn id="1" dur="indefinite" restart="never" nodeType="tmRoot">
+          <p:childTnLst>
+            <p:seq concurrent="1" nextAc="seek">
+              <p:cTn id="2" dur="indefinite" nodeType="mainSeq">
+                <p:childTnLst>
+                  <p:par>
+                    <p:cTn id="3" fill="hold">
+                      <p:stCondLst>
+                        <p:cond delay="indefinite"/>
+                      </p:stCondLst>
+                      <p:childTnLst>
+                        <p:par>
+                          <p:cTn id="4" fill="hold">
+                            <p:stCondLst>
+                              <p:cond delay="0"/>
+                            </p:stCondLst>
+                            <p:childTnLst>
+                              <p:par>
+                                <p:cTn id="5" presetID="9" presetClass="entr" presetSubtype="0" fill="hold" grpId="0" nodeType="clickEffect">
+                                  <p:stCondLst>
+                                    <p:cond delay="0"/>
+                                  </p:stCondLst>
+                                  <p:childTnLst>
+                                    <p:set>
+                                      <p:cBhvr>
+                                        <p:cTn id="6" dur="1" fill="hold">
+                                          <p:stCondLst>
+                                            <p:cond delay="0"/>
+                                          </p:stCondLst>
+                                        </p:cTn>
+                                        <p:tgtEl>
+                                          <p:spTgt spid="4"/>
+                                        </p:tgtEl>
+                                        <p:attrNameLst>
+                                          <p:attrName>style.visibility</p:attrName>
+                                        </p:attrNameLst>
+                                      </p:cBhvr>
+                                      <p:to>
+                                        <p:strVal val="visible"/>
+                                      </p:to>
+                                    </p:set>
+                                    <p:animEffect transition="in" filter="dissolve">
+                                      <p:cBhvr>
+                                        <p:cTn id="7" dur="500"/>
+                                        <p:tgtEl>
+                                          <p:spTgt spid="4"/>
+                                        </p:tgtEl>
+                                      </p:cBhvr>
+                                    </p:animEffect>
+                                  </p:childTnLst>
+                                </p:cTn>
+                              </p:par>
+                            </p:childTnLst>
+                          </p:cTn>
+                        </p:par>
+                      </p:childTnLst>
+                    </p:cTn>
+                  </p:par>
+                  <p:par>
+                    <p:cTn id="8" fill="hold">
+                      <p:stCondLst>
+                        <p:cond delay="indefinite"/>
+                      </p:stCondLst>
+                      <p:childTnLst>
+                        <p:par>
+                          <p:cTn id="9" fill="hold">
+                            <p:stCondLst>
+                              <p:cond delay="0"/>
+                            </p:stCondLst>
+                            <p:childTnLst>
+                              <p:par>
+                                <p:cTn id="10" presetID="9" presetClass="entr" presetSubtype="0" fill="hold" grpId="0" nodeType="clickEffect">
+                                  <p:stCondLst>
+                                    <p:cond delay="0"/>
+                                  </p:stCondLst>
+                                  <p:childTnLst>
+                                    <p:set>
+                                      <p:cBhvr>
+                                        <p:cTn id="11" dur="1" fill="hold">
+                                          <p:stCondLst>
+                                            <p:cond delay="0"/>
+                                          </p:stCondLst>
+                                        </p:cTn>
+                                        <p:tgtEl>
+                                          <p:spTgt spid="5"/>
+                                        </p:tgtEl>
+                                        <p:attrNameLst>
+                                          <p:attrName>style.visibility</p:attrName>
+                                        </p:attrNameLst>
+                                      </p:cBhvr>
+                                      <p:to>
+                                        <p:strVal val="visible"/>
+                                      </p:to>
+                                    </p:set>
+                                    <p:animEffect transition="in" filter="dissolve">
+                                      <p:cBhvr>
+                                        <p:cTn id="12" dur="500"/>
+                                        <p:tgtEl>
+                                          <p:spTgt spid="5"/>
+                                        </p:tgtEl>
+                                      </p:cBhvr>
+                                    </p:animEffect>
+                                  </p:childTnLst>
+                                </p:cTn>
+                              </p:par>
+                            </p:childTnLst>
+                          </p:cTn>
+                        </p:par>
+                      </p:childTnLst>
+                    </p:cTn>
+                  </p:par>
+                  <p:par>
+                    <p:cTn id="13" fill="hold">
+                      <p:stCondLst>
+                        <p:cond delay="indefinite"/>
+                      </p:stCondLst>
+                      <p:childTnLst>
+                        <p:par>
+                          <p:cTn id="14" fill="hold">
+                            <p:stCondLst>
+                              <p:cond delay="0"/>
+                            </p:stCondLst>
+                            <p:childTnLst>
+                              <p:par>
+                                <p:cTn id="15" presetID="9" presetClass="entr" presetSubtype="0" fill="hold" grpId="0" nodeType="clickEffect">
+                                  <p:stCondLst>
+                                    <p:cond delay="0"/>
+                                  </p:stCondLst>
+                                  <p:childTnLst>
+                                    <p:set>
+                                      <p:cBhvr>
+                                        <p:cTn id="16" dur="1" fill="hold">
+                                          <p:stCondLst>
+                                            <p:cond delay="0"/>
+                                          </p:stCondLst>
+                                        </p:cTn>
+                                        <p:tgtEl>
+                                          <p:spTgt spid="6"/>
+                                        </p:tgtEl>
+                                        <p:attrNameLst>
+                                          <p:attrName>style.visibility</p:attrName>
+                                        </p:attrNameLst>
+                                      </p:cBhvr>
+                                      <p:to>
+                                        <p:strVal val="visible"/>
+                                      </p:to>
+                                    </p:set>
+                                    <p:animEffect transition="in" filter="dissolve">
+                                      <p:cBhvr>
+                                        <p:cTn id="17" dur="500"/>
+                                        <p:tgtEl>
+                                          <p:spTgt spid="6"/>
+                                        </p:tgtEl>
+                                      </p:cBhvr>
+                                    </p:animEffect>
+                                  </p:childTnLst>
+                                </p:cTn>
+                              </p:par>
+                            </p:childTnLst>
+                          </p:cTn>
+                        </p:par>
+                      </p:childTnLst>
+                    </p:cTn>
+                  </p:par>
+                  <p:par>
+                    <p:cTn id="18" fill="hold">
+                      <p:stCondLst>
+                        <p:cond delay="indefinite"/>
+                      </p:stCondLst>
+                      <p:childTnLst>
+                        <p:par>
+                          <p:cTn id="19" fill="hold">
+                            <p:stCondLst>
+                              <p:cond delay="0"/>
+                            </p:stCondLst>
+                            <p:childTnLst>
+                              <p:par>
+                                <p:cTn id="20" presetID="9" presetClass="entr" presetSubtype="0" fill="hold" grpId="0" nodeType="clickEffect">
+                                  <p:stCondLst>
+                                    <p:cond delay="0"/>
+                                  </p:stCondLst>
+                                  <p:childTnLst>
+                                    <p:set>
+                                      <p:cBhvr>
+                                        <p:cTn id="21" dur="1" fill="hold">
+                                          <p:stCondLst>
+                                            <p:cond delay="0"/>
+                                          </p:stCondLst>
+                                        </p:cTn>
+                                        <p:tgtEl>
+                                          <p:spTgt spid="7"/>
+                                        </p:tgtEl>
+                                        <p:attrNameLst>
+                                          <p:attrName>style.visibility</p:attrName>
+                                        </p:attrNameLst>
+                                      </p:cBhvr>
+                                      <p:to>
+                                        <p:strVal val="visible"/>
+                                      </p:to>
+                                    </p:set>
+                                    <p:animEffect transition="in" filter="dissolve">
+                                      <p:cBhvr>
+                                        <p:cTn id="22" dur="500"/>
+                                        <p:tgtEl>
+                                          <p:spTgt spid="7"/>
+                                        </p:tgtEl>
+                                      </p:cBhvr>
+                                    </p:animEffect>
+                                  </p:childTnLst>
+                                </p:cTn>
+                              </p:par>
+                            </p:childTnLst>
+                          </p:cTn>
+                        </p:par>
+                      </p:childTnLst>
+                    </p:cTn>
+                  </p:par>
+                </p:childTnLst>
+              </p:cTn>
+              <p:prevCondLst>
+                <p:cond evt="onPrev" delay="0">
+                  <p:tgtEl>
+                    <p:sldTgt/>
+                  </p:tgtEl>
+                </p:cond>
+              </p:prevCondLst>
+              <p:nextCondLst>
+                <p:cond evt="onNext" delay="0">
+                  <p:tgtEl>
+                    <p:sldTgt/>
+                  </p:tgtEl>
+                </p:cond>
+              </p:nextCondLst>
+            </p:seq>
+          </p:childTnLst>
+        </p:cTn>
+      </p:par>
+    </p:tnLst>
+    <p:bldLst>
+      <p:bldP spid="4" grpId="0" animBg="1"/>
+      <p:bldP spid="5" grpId="0" animBg="1"/>
+      <p:bldP spid="6" grpId="0" animBg="1"/>
+      <p:bldP spid="7" grpId="0" animBg="1"/>
+    </p:bldLst>
+  </p:timing>
+</p:sld>
+</file>
+
 <file path=ppt/slides/slide2.xml><?xml version="1.0" encoding="utf-8"?>
 <p:sld xmlns:a="http://schemas.openxmlformats.org/drawingml/2006/main" xmlns:r="http://schemas.openxmlformats.org/officeDocument/2006/relationships" xmlns:p="http://schemas.openxmlformats.org/presentationml/2006/main">
   <p:cSld>
@@ -6771,8 +7761,8 @@
         </p:nvSpPr>
         <p:spPr>
           <a:xfrm>
-            <a:off x="628075" y="1776683"/>
-            <a:ext cx="12561453" cy="5068119"/>
+            <a:off x="628075" y="1626781"/>
+            <a:ext cx="12561453" cy="5218022"/>
           </a:xfrm>
         </p:spPr>
         <p:txBody>
@@ -7057,7 +8047,7 @@
         <p:spPr>
           <a:xfrm>
             <a:off x="982136" y="2816579"/>
-            <a:ext cx="4301067" cy="1323439"/>
+            <a:ext cx="4301067" cy="1569660"/>
           </a:xfrm>
           <a:prstGeom prst="rect">
             <a:avLst/>
@@ -7096,6 +8086,29 @@
                 <a:cs typeface="Consolas" panose="020B0609020204030204" pitchFamily="49" charset="0"/>
               </a:rPr>
               <a:t>  // block of code to repeat</a:t>
+            </a:r>
+          </a:p>
+          <a:p>
+            <a:r>
+              <a:rPr lang="en-US" sz="1600" dirty="0">
+                <a:latin typeface="Consolas" panose="020B0609020204030204" pitchFamily="49" charset="0"/>
+                <a:cs typeface="Consolas" panose="020B0609020204030204" pitchFamily="49" charset="0"/>
+              </a:rPr>
+              <a:t>  </a:t>
+            </a:r>
+            <a:r>
+              <a:rPr lang="en-US" sz="1600" dirty="0" err="1">
+                <a:latin typeface="Consolas" panose="020B0609020204030204" pitchFamily="49" charset="0"/>
+                <a:cs typeface="Consolas" panose="020B0609020204030204" pitchFamily="49" charset="0"/>
+              </a:rPr>
+              <a:t>System.out.print</a:t>
+            </a:r>
+            <a:r>
+              <a:rPr lang="en-US" sz="1600" dirty="0">
+                <a:latin typeface="Consolas" panose="020B0609020204030204" pitchFamily="49" charset="0"/>
+                <a:cs typeface="Consolas" panose="020B0609020204030204" pitchFamily="49" charset="0"/>
+              </a:rPr>
+              <a:t>(count + “ ”);</a:t>
             </a:r>
           </a:p>
           <a:p>
@@ -7133,7 +8146,7 @@
         <p:spPr>
           <a:xfrm>
             <a:off x="7529687" y="2816579"/>
-            <a:ext cx="4301067" cy="1323439"/>
+            <a:ext cx="4301067" cy="1569660"/>
           </a:xfrm>
           <a:prstGeom prst="rect">
             <a:avLst/>
@@ -7189,7 +8202,30 @@
                 <a:latin typeface="Consolas" panose="020B0609020204030204" pitchFamily="49" charset="0"/>
                 <a:cs typeface="Consolas" panose="020B0609020204030204" pitchFamily="49" charset="0"/>
               </a:rPr>
-              <a:t>}</a:t>
+              <a:t>  </a:t>
+            </a:r>
+            <a:r>
+              <a:rPr lang="en-US" sz="1600" dirty="0" err="1">
+                <a:latin typeface="Consolas" panose="020B0609020204030204" pitchFamily="49" charset="0"/>
+                <a:cs typeface="Consolas" panose="020B0609020204030204" pitchFamily="49" charset="0"/>
+              </a:rPr>
+              <a:t>System.out.print</a:t>
+            </a:r>
+            <a:r>
+              <a:rPr lang="en-US" sz="1600" dirty="0">
+                <a:latin typeface="Consolas" panose="020B0609020204030204" pitchFamily="49" charset="0"/>
+                <a:cs typeface="Consolas" panose="020B0609020204030204" pitchFamily="49" charset="0"/>
+              </a:rPr>
+              <a:t>(count + “ ”);</a:t>
+            </a:r>
+          </a:p>
+          <a:p>
+            <a:r>
+              <a:rPr lang="en-US" sz="1600" dirty="0">
+                <a:latin typeface="Consolas" panose="020B0609020204030204" pitchFamily="49" charset="0"/>
+                <a:cs typeface="Consolas" panose="020B0609020204030204" pitchFamily="49" charset="0"/>
+              </a:rPr>
+              <a:t>} </a:t>
             </a:r>
           </a:p>
         </p:txBody>
@@ -7208,7 +8244,7 @@
         </p:nvSpPr>
         <p:spPr>
           <a:xfrm>
-            <a:off x="982136" y="4318335"/>
+            <a:off x="982136" y="5225098"/>
             <a:ext cx="8144933" cy="1323439"/>
           </a:xfrm>
           <a:prstGeom prst="rect">
@@ -7319,7 +8355,7 @@
         </p:nvSpPr>
         <p:spPr>
           <a:xfrm>
-            <a:off x="4540953" y="4503494"/>
+            <a:off x="4757347" y="5535023"/>
             <a:ext cx="4419602" cy="721604"/>
           </a:xfrm>
           <a:prstGeom prst="leftArrow">
@@ -7377,7 +8413,7 @@
         </p:nvSpPr>
         <p:spPr>
           <a:xfrm>
-            <a:off x="1520471" y="5764256"/>
+            <a:off x="1626797" y="6686320"/>
             <a:ext cx="6261100" cy="596900"/>
           </a:xfrm>
           <a:prstGeom prst="snip1Rect">
@@ -7417,6 +8453,122 @@
                 <a:cs typeface="Proxima Nova" charset="0"/>
               </a:rPr>
               <a:t>What is better, the book or the movie: Stardust?</a:t>
+            </a:r>
+          </a:p>
+        </p:txBody>
+      </p:sp>
+      <p:sp>
+        <p:nvSpPr>
+          <p:cNvPr id="10" name="Snip Single Corner Rectangle 12">
+            <a:extLst>
+              <a:ext uri="{FF2B5EF4-FFF2-40B4-BE49-F238E27FC236}">
+                <a16:creationId xmlns:a16="http://schemas.microsoft.com/office/drawing/2014/main" id="{F9AE95EF-C521-405F-9CA2-05DC5267DA5C}"/>
+              </a:ext>
+            </a:extLst>
+          </p:cNvPr>
+          <p:cNvSpPr/>
+          <p:nvPr/>
+        </p:nvSpPr>
+        <p:spPr>
+          <a:xfrm>
+            <a:off x="982136" y="4410472"/>
+            <a:ext cx="4301067" cy="596900"/>
+          </a:xfrm>
+          <a:prstGeom prst="snip1Rect">
+            <a:avLst/>
+          </a:prstGeom>
+          <a:solidFill>
+            <a:schemeClr val="tx2"/>
+          </a:solidFill>
+          <a:ln>
+            <a:noFill/>
+          </a:ln>
+          <a:effectLst/>
+        </p:spPr>
+        <p:style>
+          <a:lnRef idx="1">
+            <a:schemeClr val="accent1"/>
+          </a:lnRef>
+          <a:fillRef idx="3">
+            <a:schemeClr val="accent1"/>
+          </a:fillRef>
+          <a:effectRef idx="2">
+            <a:schemeClr val="accent1"/>
+          </a:effectRef>
+          <a:fontRef idx="minor">
+            <a:schemeClr val="lt1"/>
+          </a:fontRef>
+        </p:style>
+        <p:txBody>
+          <a:bodyPr lIns="274320" tIns="182880" rIns="274320" bIns="182880" rtlCol="0" anchor="ctr"/>
+          <a:lstStyle/>
+          <a:p>
+            <a:pPr algn="ctr"/>
+            <a:r>
+              <a:rPr lang="en-US" dirty="0">
+                <a:latin typeface="Proxima Nova" charset="0"/>
+                <a:ea typeface="Proxima Nova" charset="0"/>
+                <a:cs typeface="Proxima Nova" charset="0"/>
+              </a:rPr>
+              <a:t>100 90 80 70 60 50 40 30 20 10</a:t>
+            </a:r>
+          </a:p>
+        </p:txBody>
+      </p:sp>
+      <p:sp>
+        <p:nvSpPr>
+          <p:cNvPr id="12" name="Snip Single Corner Rectangle 12">
+            <a:extLst>
+              <a:ext uri="{FF2B5EF4-FFF2-40B4-BE49-F238E27FC236}">
+                <a16:creationId xmlns:a16="http://schemas.microsoft.com/office/drawing/2014/main" id="{9AD6023A-1D95-47A3-B466-C0999E8BEAF5}"/>
+              </a:ext>
+            </a:extLst>
+          </p:cNvPr>
+          <p:cNvSpPr/>
+          <p:nvPr/>
+        </p:nvSpPr>
+        <p:spPr>
+          <a:xfrm>
+            <a:off x="7529688" y="4438020"/>
+            <a:ext cx="4301067" cy="596900"/>
+          </a:xfrm>
+          <a:prstGeom prst="snip1Rect">
+            <a:avLst/>
+          </a:prstGeom>
+          <a:solidFill>
+            <a:schemeClr val="tx2"/>
+          </a:solidFill>
+          <a:ln>
+            <a:noFill/>
+          </a:ln>
+          <a:effectLst/>
+        </p:spPr>
+        <p:style>
+          <a:lnRef idx="1">
+            <a:schemeClr val="accent1"/>
+          </a:lnRef>
+          <a:fillRef idx="3">
+            <a:schemeClr val="accent1"/>
+          </a:fillRef>
+          <a:effectRef idx="2">
+            <a:schemeClr val="accent1"/>
+          </a:effectRef>
+          <a:fontRef idx="minor">
+            <a:schemeClr val="lt1"/>
+          </a:fontRef>
+        </p:style>
+        <p:txBody>
+          <a:bodyPr lIns="274320" tIns="182880" rIns="274320" bIns="182880" rtlCol="0" anchor="ctr"/>
+          <a:lstStyle/>
+          <a:p>
+            <a:pPr algn="ctr"/>
+            <a:r>
+              <a:rPr lang="en-US" dirty="0">
+                <a:latin typeface="Proxima Nova" charset="0"/>
+                <a:ea typeface="Proxima Nova" charset="0"/>
+                <a:cs typeface="Proxima Nova" charset="0"/>
+              </a:rPr>
+              <a:t>9 8 7 6 5 4 3 2 1 </a:t>
             </a:r>
           </a:p>
         </p:txBody>
@@ -7530,7 +8682,7 @@
                                           </p:stCondLst>
                                         </p:cTn>
                                         <p:tgtEl>
-                                          <p:spTgt spid="8"/>
+                                          <p:spTgt spid="10"/>
                                         </p:tgtEl>
                                         <p:attrNameLst>
                                           <p:attrName>style.visibility</p:attrName>
@@ -7544,7 +8696,7 @@
                                       <p:cBhvr>
                                         <p:cTn id="12" dur="500"/>
                                         <p:tgtEl>
-                                          <p:spTgt spid="8"/>
+                                          <p:spTgt spid="10"/>
                                         </p:tgtEl>
                                       </p:cBhvr>
                                     </p:animEffect>
@@ -7583,7 +8735,7 @@
                                           </p:stCondLst>
                                         </p:cTn>
                                         <p:tgtEl>
-                                          <p:spTgt spid="9"/>
+                                          <p:spTgt spid="8"/>
                                         </p:tgtEl>
                                         <p:attrNameLst>
                                           <p:attrName>style.visibility</p:attrName>
@@ -7597,7 +8749,7 @@
                                       <p:cBhvr>
                                         <p:cTn id="17" dur="500"/>
                                         <p:tgtEl>
-                                          <p:spTgt spid="9"/>
+                                          <p:spTgt spid="8"/>
                                         </p:tgtEl>
                                       </p:cBhvr>
                                     </p:animEffect>
@@ -7636,7 +8788,7 @@
                                           </p:stCondLst>
                                         </p:cTn>
                                         <p:tgtEl>
-                                          <p:spTgt spid="11"/>
+                                          <p:spTgt spid="12"/>
                                         </p:tgtEl>
                                         <p:attrNameLst>
                                           <p:attrName>style.visibility</p:attrName>
@@ -7650,7 +8802,7 @@
                                       <p:cBhvr>
                                         <p:cTn id="22" dur="500"/>
                                         <p:tgtEl>
-                                          <p:spTgt spid="11"/>
+                                          <p:spTgt spid="12"/>
                                         </p:tgtEl>
                                       </p:cBhvr>
                                     </p:animEffect>
@@ -7689,6 +8841,112 @@
                                           </p:stCondLst>
                                         </p:cTn>
                                         <p:tgtEl>
+                                          <p:spTgt spid="9"/>
+                                        </p:tgtEl>
+                                        <p:attrNameLst>
+                                          <p:attrName>style.visibility</p:attrName>
+                                        </p:attrNameLst>
+                                      </p:cBhvr>
+                                      <p:to>
+                                        <p:strVal val="visible"/>
+                                      </p:to>
+                                    </p:set>
+                                    <p:animEffect transition="in" filter="dissolve">
+                                      <p:cBhvr>
+                                        <p:cTn id="27" dur="500"/>
+                                        <p:tgtEl>
+                                          <p:spTgt spid="9"/>
+                                        </p:tgtEl>
+                                      </p:cBhvr>
+                                    </p:animEffect>
+                                  </p:childTnLst>
+                                </p:cTn>
+                              </p:par>
+                            </p:childTnLst>
+                          </p:cTn>
+                        </p:par>
+                      </p:childTnLst>
+                    </p:cTn>
+                  </p:par>
+                  <p:par>
+                    <p:cTn id="28" fill="hold">
+                      <p:stCondLst>
+                        <p:cond delay="indefinite"/>
+                      </p:stCondLst>
+                      <p:childTnLst>
+                        <p:par>
+                          <p:cTn id="29" fill="hold">
+                            <p:stCondLst>
+                              <p:cond delay="0"/>
+                            </p:stCondLst>
+                            <p:childTnLst>
+                              <p:par>
+                                <p:cTn id="30" presetID="9" presetClass="entr" presetSubtype="0" fill="hold" grpId="0" nodeType="clickEffect">
+                                  <p:stCondLst>
+                                    <p:cond delay="0"/>
+                                  </p:stCondLst>
+                                  <p:childTnLst>
+                                    <p:set>
+                                      <p:cBhvr>
+                                        <p:cTn id="31" dur="1" fill="hold">
+                                          <p:stCondLst>
+                                            <p:cond delay="0"/>
+                                          </p:stCondLst>
+                                        </p:cTn>
+                                        <p:tgtEl>
+                                          <p:spTgt spid="11"/>
+                                        </p:tgtEl>
+                                        <p:attrNameLst>
+                                          <p:attrName>style.visibility</p:attrName>
+                                        </p:attrNameLst>
+                                      </p:cBhvr>
+                                      <p:to>
+                                        <p:strVal val="visible"/>
+                                      </p:to>
+                                    </p:set>
+                                    <p:animEffect transition="in" filter="dissolve">
+                                      <p:cBhvr>
+                                        <p:cTn id="32" dur="500"/>
+                                        <p:tgtEl>
+                                          <p:spTgt spid="11"/>
+                                        </p:tgtEl>
+                                      </p:cBhvr>
+                                    </p:animEffect>
+                                  </p:childTnLst>
+                                </p:cTn>
+                              </p:par>
+                            </p:childTnLst>
+                          </p:cTn>
+                        </p:par>
+                      </p:childTnLst>
+                    </p:cTn>
+                  </p:par>
+                  <p:par>
+                    <p:cTn id="33" fill="hold">
+                      <p:stCondLst>
+                        <p:cond delay="indefinite"/>
+                      </p:stCondLst>
+                      <p:childTnLst>
+                        <p:par>
+                          <p:cTn id="34" fill="hold">
+                            <p:stCondLst>
+                              <p:cond delay="0"/>
+                            </p:stCondLst>
+                            <p:childTnLst>
+                              <p:par>
+                                <p:cTn id="35" presetID="9" presetClass="entr" presetSubtype="0" fill="hold" grpId="0" nodeType="clickEffect">
+                                  <p:stCondLst>
+                                    <p:cond delay="0"/>
+                                  </p:stCondLst>
+                                  <p:childTnLst>
+                                    <p:set>
+                                      <p:cBhvr>
+                                        <p:cTn id="36" dur="1" fill="hold">
+                                          <p:stCondLst>
+                                            <p:cond delay="0"/>
+                                          </p:stCondLst>
+                                        </p:cTn>
+                                        <p:tgtEl>
                                           <p:spTgt spid="13"/>
                                         </p:tgtEl>
                                         <p:attrNameLst>
@@ -7701,7 +8959,7 @@
                                     </p:set>
                                     <p:animEffect transition="in" filter="dissolve">
                                       <p:cBhvr>
-                                        <p:cTn id="27" dur="500"/>
+                                        <p:cTn id="37" dur="500"/>
                                         <p:tgtEl>
                                           <p:spTgt spid="13"/>
                                         </p:tgtEl>
@@ -7743,12 +9001,1758 @@
       <p:bldP spid="9" grpId="0" animBg="1"/>
       <p:bldP spid="11" grpId="0" animBg="1"/>
       <p:bldP spid="13" grpId="0" animBg="1"/>
+      <p:bldP spid="10" grpId="0" animBg="1"/>
+      <p:bldP spid="12" grpId="0" animBg="1"/>
     </p:bldLst>
   </p:timing>
 </p:sld>
 </file>
 
 <file path=ppt/slides/slide4.xml><?xml version="1.0" encoding="utf-8"?>
+<p:sld xmlns:a="http://schemas.openxmlformats.org/drawingml/2006/main" xmlns:r="http://schemas.openxmlformats.org/officeDocument/2006/relationships" xmlns:p="http://schemas.openxmlformats.org/presentationml/2006/main">
+  <p:cSld>
+    <p:spTree>
+      <p:nvGrpSpPr>
+        <p:cNvPr id="1" name=""/>
+        <p:cNvGrpSpPr/>
+        <p:nvPr/>
+      </p:nvGrpSpPr>
+      <p:grpSpPr>
+        <a:xfrm>
+          <a:off x="0" y="0"/>
+          <a:ext cx="0" cy="0"/>
+          <a:chOff x="0" y="0"/>
+          <a:chExt cx="0" cy="0"/>
+        </a:xfrm>
+      </p:grpSpPr>
+      <p:sp>
+        <p:nvSpPr>
+          <p:cNvPr id="4" name="Title 3">
+            <a:extLst>
+              <a:ext uri="{FF2B5EF4-FFF2-40B4-BE49-F238E27FC236}">
+                <a16:creationId xmlns:a16="http://schemas.microsoft.com/office/drawing/2014/main" id="{FAAE6F2E-172B-F74B-A63E-FBEE9F584404}"/>
+              </a:ext>
+            </a:extLst>
+          </p:cNvPr>
+          <p:cNvSpPr>
+            <a:spLocks noGrp="1"/>
+          </p:cNvSpPr>
+          <p:nvPr>
+            <p:ph type="title"/>
+          </p:nvPr>
+        </p:nvSpPr>
+        <p:spPr/>
+        <p:txBody>
+          <a:bodyPr/>
+          <a:lstStyle/>
+          <a:p>
+            <a:r>
+              <a:rPr lang="en-US" dirty="0"/>
+              <a:t>Reading Check</a:t>
+            </a:r>
+          </a:p>
+        </p:txBody>
+      </p:sp>
+      <p:sp>
+        <p:nvSpPr>
+          <p:cNvPr id="5" name="Text Placeholder 4">
+            <a:extLst>
+              <a:ext uri="{FF2B5EF4-FFF2-40B4-BE49-F238E27FC236}">
+                <a16:creationId xmlns:a16="http://schemas.microsoft.com/office/drawing/2014/main" id="{DADDAA0C-CB62-1049-AF60-5356E6C65DB6}"/>
+              </a:ext>
+            </a:extLst>
+          </p:cNvPr>
+          <p:cNvSpPr>
+            <a:spLocks noGrp="1"/>
+          </p:cNvSpPr>
+          <p:nvPr>
+            <p:ph type="body" sz="quarter" idx="10"/>
+          </p:nvPr>
+        </p:nvSpPr>
+        <p:spPr>
+          <a:xfrm>
+            <a:off x="628075" y="1776683"/>
+            <a:ext cx="12561453" cy="4704108"/>
+          </a:xfrm>
+        </p:spPr>
+        <p:txBody>
+          <a:bodyPr/>
+          <a:lstStyle/>
+          <a:p>
+            <a:pPr fontAlgn="base"/>
+            <a:r>
+              <a:rPr lang="en-US" dirty="0"/>
+              <a:t>Considering the following problem:</a:t>
+            </a:r>
+          </a:p>
+          <a:p>
+            <a:pPr marL="0" indent="0" fontAlgn="base">
+              <a:buNone/>
+            </a:pPr>
+            <a:r>
+              <a:rPr lang="en-US" dirty="0"/>
+              <a:t>Write a program that reads infinite positive numbers. When zero or a negative number is read, the program stops and prints the maximum value entered.</a:t>
+            </a:r>
+          </a:p>
+          <a:p>
+            <a:pPr marL="0" indent="0" fontAlgn="base">
+              <a:buNone/>
+            </a:pPr>
+            <a:endParaRPr lang="en-US" dirty="0"/>
+          </a:p>
+          <a:p>
+            <a:pPr fontAlgn="base"/>
+            <a:r>
+              <a:rPr lang="en-US" dirty="0"/>
+              <a:t>Which is </a:t>
+            </a:r>
+            <a:r>
+              <a:rPr lang="en-US" u="sng" dirty="0"/>
+              <a:t>the most appropriate way </a:t>
+            </a:r>
+            <a:r>
+              <a:rPr lang="en-US" dirty="0"/>
+              <a:t>to implement this program?</a:t>
+            </a:r>
+          </a:p>
+          <a:p>
+            <a:pPr marL="342900" indent="-342900" fontAlgn="base">
+              <a:buAutoNum type="alphaUcParenR"/>
+            </a:pPr>
+            <a:r>
+              <a:rPr lang="en-US" dirty="0"/>
+              <a:t>Using a for loop</a:t>
+            </a:r>
+          </a:p>
+          <a:p>
+            <a:pPr marL="342900" indent="-342900" fontAlgn="base">
+              <a:buAutoNum type="alphaUcParenR"/>
+            </a:pPr>
+            <a:r>
+              <a:rPr lang="en-US" dirty="0"/>
+              <a:t>Using a while loop</a:t>
+            </a:r>
+          </a:p>
+          <a:p>
+            <a:pPr marL="342900" indent="-342900" fontAlgn="base">
+              <a:buAutoNum type="alphaUcParenR"/>
+            </a:pPr>
+            <a:r>
+              <a:rPr lang="en-US" dirty="0"/>
+              <a:t>Using a while loop with a sentinel</a:t>
+            </a:r>
+          </a:p>
+          <a:p>
+            <a:pPr marL="0" indent="0" fontAlgn="base">
+              <a:buNone/>
+            </a:pPr>
+            <a:endParaRPr lang="en-US" dirty="0"/>
+          </a:p>
+          <a:p>
+            <a:pPr fontAlgn="base"/>
+            <a:r>
+              <a:rPr lang="en-US" dirty="0"/>
+              <a:t>Explain your decision.</a:t>
+            </a:r>
+          </a:p>
+        </p:txBody>
+      </p:sp>
+    </p:spTree>
+    <p:extLst>
+      <p:ext uri="{BB962C8B-B14F-4D97-AF65-F5344CB8AC3E}">
+        <p14:creationId xmlns:p14="http://schemas.microsoft.com/office/powerpoint/2010/main" val="2269088149"/>
+      </p:ext>
+    </p:extLst>
+  </p:cSld>
+  <p:clrMapOvr>
+    <a:masterClrMapping/>
+  </p:clrMapOvr>
+  <mc:AlternateContent xmlns:mc="http://schemas.openxmlformats.org/markup-compatibility/2006" xmlns:p14="http://schemas.microsoft.com/office/powerpoint/2010/main">
+    <mc:Choice Requires="p14">
+      <p:transition p14:dur="300">
+        <p:fade/>
+      </p:transition>
+    </mc:Choice>
+    <mc:Fallback xmlns="">
+      <p:transition>
+        <p:fade/>
+      </p:transition>
+    </mc:Fallback>
+  </mc:AlternateContent>
+</p:sld>
+</file>
+
+<file path=ppt/slides/slide5.xml><?xml version="1.0" encoding="utf-8"?>
+<p:sld xmlns:a="http://schemas.openxmlformats.org/drawingml/2006/main" xmlns:r="http://schemas.openxmlformats.org/officeDocument/2006/relationships" xmlns:p="http://schemas.openxmlformats.org/presentationml/2006/main">
+  <p:cSld>
+    <p:spTree>
+      <p:nvGrpSpPr>
+        <p:cNvPr id="1" name=""/>
+        <p:cNvGrpSpPr/>
+        <p:nvPr/>
+      </p:nvGrpSpPr>
+      <p:grpSpPr>
+        <a:xfrm>
+          <a:off x="0" y="0"/>
+          <a:ext cx="0" cy="0"/>
+          <a:chOff x="0" y="0"/>
+          <a:chExt cx="0" cy="0"/>
+        </a:xfrm>
+      </p:grpSpPr>
+      <p:sp>
+        <p:nvSpPr>
+          <p:cNvPr id="4" name="Title 3">
+            <a:extLst>
+              <a:ext uri="{FF2B5EF4-FFF2-40B4-BE49-F238E27FC236}">
+                <a16:creationId xmlns:a16="http://schemas.microsoft.com/office/drawing/2014/main" id="{FAAE6F2E-172B-F74B-A63E-FBEE9F584404}"/>
+              </a:ext>
+            </a:extLst>
+          </p:cNvPr>
+          <p:cNvSpPr>
+            <a:spLocks noGrp="1"/>
+          </p:cNvSpPr>
+          <p:nvPr>
+            <p:ph type="title"/>
+          </p:nvPr>
+        </p:nvSpPr>
+        <p:spPr>
+          <a:xfrm>
+            <a:off x="628073" y="36535"/>
+            <a:ext cx="12561453" cy="1015663"/>
+          </a:xfrm>
+        </p:spPr>
+        <p:txBody>
+          <a:bodyPr/>
+          <a:lstStyle/>
+          <a:p>
+            <a:r>
+              <a:rPr lang="en-US" dirty="0"/>
+              <a:t>Reading Check - Implementation</a:t>
+            </a:r>
+          </a:p>
+        </p:txBody>
+      </p:sp>
+      <p:sp>
+        <p:nvSpPr>
+          <p:cNvPr id="2" name="Text Placeholder 1">
+            <a:extLst>
+              <a:ext uri="{FF2B5EF4-FFF2-40B4-BE49-F238E27FC236}">
+                <a16:creationId xmlns:a16="http://schemas.microsoft.com/office/drawing/2014/main" id="{F6BD3C05-F987-46BA-9064-1FF4E002025C}"/>
+              </a:ext>
+            </a:extLst>
+          </p:cNvPr>
+          <p:cNvSpPr>
+            <a:spLocks noGrp="1" noChangeArrowheads="1"/>
+          </p:cNvSpPr>
+          <p:nvPr>
+            <p:ph type="body" sz="quarter" idx="10"/>
+          </p:nvPr>
+        </p:nvSpPr>
+        <p:spPr bwMode="auto">
+          <a:xfrm>
+            <a:off x="628073" y="1002958"/>
+            <a:ext cx="12821536" cy="6370975"/>
+          </a:xfrm>
+          <a:prstGeom prst="rect">
+            <a:avLst/>
+          </a:prstGeom>
+          <a:solidFill>
+            <a:srgbClr val="2B2B2B"/>
+          </a:solidFill>
+          <a:ln>
+            <a:noFill/>
+          </a:ln>
+          <a:effectLst/>
+          <a:extLst>
+            <a:ext uri="{91240B29-F687-4F45-9708-019B960494DF}">
+              <a14:hiddenLine xmlns:a14="http://schemas.microsoft.com/office/drawing/2010/main" w="9525">
+                <a:solidFill>
+                  <a:schemeClr val="tx1"/>
+                </a:solidFill>
+                <a:miter lim="800000"/>
+                <a:headEnd/>
+                <a:tailEnd/>
+              </a14:hiddenLine>
+            </a:ext>
+            <a:ext uri="{AF507438-7753-43E0-B8FC-AC1667EBCBE1}">
+              <a14:hiddenEffects xmlns:a14="http://schemas.microsoft.com/office/drawing/2010/main">
+                <a:effectLst>
+                  <a:outerShdw dist="35921" dir="2700000" algn="ctr" rotWithShape="0">
+                    <a:schemeClr val="bg2"/>
+                  </a:outerShdw>
+                </a:effectLst>
+              </a14:hiddenEffects>
+            </a:ext>
+          </a:extLst>
+        </p:spPr>
+        <p:txBody>
+          <a:bodyPr vert="horz" wrap="square" lIns="91440" tIns="45720" rIns="91440" bIns="45720" numCol="1" anchor="ctr" anchorCtr="0" compatLnSpc="1">
+            <a:prstTxWarp prst="textNoShape">
+              <a:avLst/>
+            </a:prstTxWarp>
+            <a:spAutoFit/>
+          </a:bodyPr>
+          <a:lstStyle/>
+          <a:p>
+            <a:pPr marL="0" marR="0" lvl="0" indent="0" algn="l" defTabSz="914400" rtl="0" eaLnBrk="0" fontAlgn="base" latinLnBrk="0" hangingPunct="0">
+              <a:lnSpc>
+                <a:spcPct val="100000"/>
+              </a:lnSpc>
+              <a:spcBef>
+                <a:spcPct val="0"/>
+              </a:spcBef>
+              <a:spcAft>
+                <a:spcPct val="0"/>
+              </a:spcAft>
+              <a:buClrTx/>
+              <a:buSzTx/>
+              <a:buFontTx/>
+              <a:buNone/>
+              <a:tabLst/>
+            </a:pPr>
+            <a:r>
+              <a:rPr kumimoji="0" lang="en-US" altLang="en-US" sz="2400" b="0" i="0" u="none" strike="noStrike" cap="none" normalizeH="0" baseline="0" dirty="0">
+                <a:ln>
+                  <a:noFill/>
+                </a:ln>
+                <a:solidFill>
+                  <a:srgbClr val="A9B7C6"/>
+                </a:solidFill>
+                <a:effectLst/>
+                <a:latin typeface="JetBrains Mono"/>
+              </a:rPr>
+              <a:t>Scanner scnr = </a:t>
+            </a:r>
+            <a:r>
+              <a:rPr kumimoji="0" lang="en-US" altLang="en-US" sz="2400" b="0" i="0" u="none" strike="noStrike" cap="none" normalizeH="0" baseline="0" dirty="0">
+                <a:ln>
+                  <a:noFill/>
+                </a:ln>
+                <a:solidFill>
+                  <a:srgbClr val="CC7832"/>
+                </a:solidFill>
+                <a:effectLst/>
+                <a:latin typeface="JetBrains Mono"/>
+              </a:rPr>
+              <a:t>new </a:t>
+            </a:r>
+            <a:r>
+              <a:rPr kumimoji="0" lang="en-US" altLang="en-US" sz="2400" b="0" i="0" u="none" strike="noStrike" cap="none" normalizeH="0" baseline="0" dirty="0">
+                <a:ln>
+                  <a:noFill/>
+                </a:ln>
+                <a:solidFill>
+                  <a:srgbClr val="A9B7C6"/>
+                </a:solidFill>
+                <a:effectLst/>
+                <a:latin typeface="JetBrains Mono"/>
+              </a:rPr>
+              <a:t>Scanner(System.</a:t>
+            </a:r>
+            <a:r>
+              <a:rPr kumimoji="0" lang="en-US" altLang="en-US" sz="2400" b="0" i="1" u="none" strike="noStrike" cap="none" normalizeH="0" baseline="0" dirty="0">
+                <a:ln>
+                  <a:noFill/>
+                </a:ln>
+                <a:solidFill>
+                  <a:srgbClr val="9876AA"/>
+                </a:solidFill>
+                <a:effectLst/>
+                <a:latin typeface="JetBrains Mono"/>
+              </a:rPr>
+              <a:t>in</a:t>
+            </a:r>
+            <a:r>
+              <a:rPr kumimoji="0" lang="en-US" altLang="en-US" sz="2400" b="0" i="0" u="none" strike="noStrike" cap="none" normalizeH="0" baseline="0" dirty="0">
+                <a:ln>
+                  <a:noFill/>
+                </a:ln>
+                <a:solidFill>
+                  <a:srgbClr val="A9B7C6"/>
+                </a:solidFill>
+                <a:effectLst/>
+                <a:latin typeface="JetBrains Mono"/>
+              </a:rPr>
+              <a:t>)</a:t>
+            </a:r>
+            <a:r>
+              <a:rPr kumimoji="0" lang="en-US" altLang="en-US" sz="2400" b="0" i="0" u="none" strike="noStrike" cap="none" normalizeH="0" baseline="0" dirty="0">
+                <a:ln>
+                  <a:noFill/>
+                </a:ln>
+                <a:solidFill>
+                  <a:srgbClr val="CC7832"/>
+                </a:solidFill>
+                <a:effectLst/>
+                <a:latin typeface="JetBrains Mono"/>
+              </a:rPr>
+              <a:t>;</a:t>
+            </a:r>
+            <a:br>
+              <a:rPr kumimoji="0" lang="en-US" altLang="en-US" sz="2400" b="0" i="0" u="none" strike="noStrike" cap="none" normalizeH="0" baseline="0" dirty="0">
+                <a:ln>
+                  <a:noFill/>
+                </a:ln>
+                <a:solidFill>
+                  <a:srgbClr val="CC7832"/>
+                </a:solidFill>
+                <a:effectLst/>
+                <a:latin typeface="JetBrains Mono"/>
+              </a:rPr>
+            </a:br>
+            <a:r>
+              <a:rPr kumimoji="0" lang="en-US" altLang="en-US" sz="2400" b="0" i="0" u="none" strike="noStrike" cap="none" normalizeH="0" baseline="0" dirty="0">
+                <a:ln>
+                  <a:noFill/>
+                </a:ln>
+                <a:solidFill>
+                  <a:srgbClr val="CC7832"/>
+                </a:solidFill>
+                <a:effectLst/>
+                <a:latin typeface="JetBrains Mono"/>
+              </a:rPr>
+              <a:t>int </a:t>
+            </a:r>
+            <a:r>
+              <a:rPr kumimoji="0" lang="en-US" altLang="en-US" sz="2400" b="0" i="0" u="none" strike="noStrike" cap="none" normalizeH="0" baseline="0" dirty="0">
+                <a:ln>
+                  <a:noFill/>
+                </a:ln>
+                <a:solidFill>
+                  <a:srgbClr val="A9B7C6"/>
+                </a:solidFill>
+                <a:effectLst/>
+                <a:latin typeface="JetBrains Mono"/>
+              </a:rPr>
+              <a:t>enteredValue</a:t>
+            </a:r>
+            <a:r>
+              <a:rPr kumimoji="0" lang="en-US" altLang="en-US" sz="2400" b="0" i="0" u="none" strike="noStrike" cap="none" normalizeH="0" baseline="0" dirty="0">
+                <a:ln>
+                  <a:noFill/>
+                </a:ln>
+                <a:solidFill>
+                  <a:srgbClr val="CC7832"/>
+                </a:solidFill>
+                <a:effectLst/>
+                <a:latin typeface="JetBrains Mono"/>
+              </a:rPr>
+              <a:t>;</a:t>
+            </a:r>
+            <a:br>
+              <a:rPr kumimoji="0" lang="en-US" altLang="en-US" sz="2400" b="0" i="0" u="none" strike="noStrike" cap="none" normalizeH="0" baseline="0" dirty="0">
+                <a:ln>
+                  <a:noFill/>
+                </a:ln>
+                <a:solidFill>
+                  <a:srgbClr val="CC7832"/>
+                </a:solidFill>
+                <a:effectLst/>
+                <a:latin typeface="JetBrains Mono"/>
+              </a:rPr>
+            </a:br>
+            <a:r>
+              <a:rPr kumimoji="0" lang="en-US" altLang="en-US" sz="2400" b="0" i="0" u="none" strike="noStrike" cap="none" normalizeH="0" baseline="0" dirty="0">
+                <a:ln>
+                  <a:noFill/>
+                </a:ln>
+                <a:solidFill>
+                  <a:srgbClr val="CC7832"/>
+                </a:solidFill>
+                <a:effectLst/>
+                <a:latin typeface="JetBrains Mono"/>
+              </a:rPr>
+              <a:t>int </a:t>
+            </a:r>
+            <a:r>
+              <a:rPr kumimoji="0" lang="en-US" altLang="en-US" sz="2400" b="0" i="0" u="none" strike="noStrike" cap="none" normalizeH="0" baseline="0" dirty="0">
+                <a:ln>
+                  <a:noFill/>
+                </a:ln>
+                <a:solidFill>
+                  <a:srgbClr val="A9B7C6"/>
+                </a:solidFill>
+                <a:effectLst/>
+                <a:latin typeface="JetBrains Mono"/>
+              </a:rPr>
+              <a:t>maxNumber</a:t>
+            </a:r>
+            <a:r>
+              <a:rPr kumimoji="0" lang="en-US" altLang="en-US" sz="2400" b="0" i="0" u="none" strike="noStrike" cap="none" normalizeH="0" baseline="0" dirty="0">
+                <a:ln>
+                  <a:noFill/>
+                </a:ln>
+                <a:solidFill>
+                  <a:srgbClr val="CC7832"/>
+                </a:solidFill>
+                <a:effectLst/>
+                <a:latin typeface="JetBrains Mono"/>
+              </a:rPr>
+              <a:t>;</a:t>
+            </a:r>
+            <a:br>
+              <a:rPr kumimoji="0" lang="en-US" altLang="en-US" sz="2400" b="0" i="0" u="none" strike="noStrike" cap="none" normalizeH="0" baseline="0" dirty="0">
+                <a:ln>
+                  <a:noFill/>
+                </a:ln>
+                <a:solidFill>
+                  <a:srgbClr val="CC7832"/>
+                </a:solidFill>
+                <a:effectLst/>
+                <a:latin typeface="JetBrains Mono"/>
+              </a:rPr>
+            </a:br>
+            <a:br>
+              <a:rPr kumimoji="0" lang="en-US" altLang="en-US" sz="2400" b="0" i="0" u="none" strike="noStrike" cap="none" normalizeH="0" baseline="0" dirty="0">
+                <a:ln>
+                  <a:noFill/>
+                </a:ln>
+                <a:solidFill>
+                  <a:srgbClr val="CC7832"/>
+                </a:solidFill>
+                <a:effectLst/>
+                <a:latin typeface="JetBrains Mono"/>
+              </a:rPr>
+            </a:br>
+            <a:r>
+              <a:rPr kumimoji="0" lang="en-US" altLang="en-US" sz="2400" b="0" i="0" u="none" strike="noStrike" cap="none" normalizeH="0" baseline="0" dirty="0">
+                <a:ln>
+                  <a:noFill/>
+                </a:ln>
+                <a:solidFill>
+                  <a:srgbClr val="A9B7C6"/>
+                </a:solidFill>
+                <a:effectLst/>
+                <a:latin typeface="JetBrains Mono"/>
+              </a:rPr>
+              <a:t>System.</a:t>
+            </a:r>
+            <a:r>
+              <a:rPr kumimoji="0" lang="en-US" altLang="en-US" sz="2400" b="0" i="1" u="none" strike="noStrike" cap="none" normalizeH="0" baseline="0" dirty="0">
+                <a:ln>
+                  <a:noFill/>
+                </a:ln>
+                <a:solidFill>
+                  <a:srgbClr val="9876AA"/>
+                </a:solidFill>
+                <a:effectLst/>
+                <a:latin typeface="JetBrains Mono"/>
+              </a:rPr>
+              <a:t>out</a:t>
+            </a:r>
+            <a:r>
+              <a:rPr kumimoji="0" lang="en-US" altLang="en-US" sz="2400" b="0" i="0" u="none" strike="noStrike" cap="none" normalizeH="0" baseline="0" dirty="0">
+                <a:ln>
+                  <a:noFill/>
+                </a:ln>
+                <a:solidFill>
+                  <a:srgbClr val="A9B7C6"/>
+                </a:solidFill>
+                <a:effectLst/>
+                <a:latin typeface="JetBrains Mono"/>
+              </a:rPr>
+              <a:t>.println(</a:t>
+            </a:r>
+            <a:r>
+              <a:rPr kumimoji="0" lang="en-US" altLang="en-US" sz="2400" b="0" i="0" u="none" strike="noStrike" cap="none" normalizeH="0" baseline="0" dirty="0">
+                <a:ln>
+                  <a:noFill/>
+                </a:ln>
+                <a:solidFill>
+                  <a:srgbClr val="6A8759"/>
+                </a:solidFill>
+                <a:effectLst/>
+                <a:latin typeface="JetBrains Mono"/>
+              </a:rPr>
+              <a:t>"</a:t>
+            </a:r>
+            <a:r>
+              <a:rPr kumimoji="0" lang="en-US" altLang="en-US" sz="2400" b="0" i="0" u="none" strike="noStrike" cap="none" normalizeH="0" baseline="0" dirty="0">
+                <a:ln>
+                  <a:noFill/>
+                </a:ln>
+                <a:solidFill>
+                  <a:srgbClr val="CC7832"/>
+                </a:solidFill>
+                <a:effectLst/>
+                <a:latin typeface="JetBrains Mono"/>
+              </a:rPr>
+              <a:t>\</a:t>
+            </a:r>
+            <a:r>
+              <a:rPr kumimoji="0" lang="en-US" altLang="en-US" sz="2400" b="0" i="0" u="none" strike="noStrike" cap="none" normalizeH="0" baseline="0" dirty="0" err="1">
+                <a:ln>
+                  <a:noFill/>
+                </a:ln>
+                <a:solidFill>
+                  <a:srgbClr val="CC7832"/>
+                </a:solidFill>
+                <a:effectLst/>
+                <a:latin typeface="JetBrains Mono"/>
+              </a:rPr>
+              <a:t>n</a:t>
+            </a:r>
+            <a:r>
+              <a:rPr kumimoji="0" lang="en-US" altLang="en-US" sz="2400" b="0" i="0" u="none" strike="noStrike" cap="none" normalizeH="0" baseline="0" dirty="0" err="1">
+                <a:ln>
+                  <a:noFill/>
+                </a:ln>
+                <a:solidFill>
+                  <a:srgbClr val="6A8759"/>
+                </a:solidFill>
+                <a:effectLst/>
+                <a:latin typeface="JetBrains Mono"/>
+              </a:rPr>
+              <a:t>Enter</a:t>
+            </a:r>
+            <a:r>
+              <a:rPr kumimoji="0" lang="en-US" altLang="en-US" sz="2400" b="0" i="0" u="none" strike="noStrike" cap="none" normalizeH="0" baseline="0" dirty="0">
+                <a:ln>
+                  <a:noFill/>
+                </a:ln>
+                <a:solidFill>
+                  <a:srgbClr val="6A8759"/>
+                </a:solidFill>
+                <a:effectLst/>
+                <a:latin typeface="JetBrains Mono"/>
+              </a:rPr>
+              <a:t> a positive value (0 or negative to exit):"</a:t>
+            </a:r>
+            <a:r>
+              <a:rPr kumimoji="0" lang="en-US" altLang="en-US" sz="2400" b="0" i="0" u="none" strike="noStrike" cap="none" normalizeH="0" baseline="0" dirty="0">
+                <a:ln>
+                  <a:noFill/>
+                </a:ln>
+                <a:solidFill>
+                  <a:srgbClr val="A9B7C6"/>
+                </a:solidFill>
+                <a:effectLst/>
+                <a:latin typeface="JetBrains Mono"/>
+              </a:rPr>
+              <a:t>)</a:t>
+            </a:r>
+            <a:r>
+              <a:rPr kumimoji="0" lang="en-US" altLang="en-US" sz="2400" b="0" i="0" u="none" strike="noStrike" cap="none" normalizeH="0" baseline="0" dirty="0">
+                <a:ln>
+                  <a:noFill/>
+                </a:ln>
+                <a:solidFill>
+                  <a:srgbClr val="CC7832"/>
+                </a:solidFill>
+                <a:effectLst/>
+                <a:latin typeface="JetBrains Mono"/>
+              </a:rPr>
+              <a:t>;</a:t>
+            </a:r>
+            <a:br>
+              <a:rPr kumimoji="0" lang="en-US" altLang="en-US" sz="2400" b="0" i="0" u="none" strike="noStrike" cap="none" normalizeH="0" baseline="0" dirty="0">
+                <a:ln>
+                  <a:noFill/>
+                </a:ln>
+                <a:solidFill>
+                  <a:srgbClr val="CC7832"/>
+                </a:solidFill>
+                <a:effectLst/>
+                <a:latin typeface="JetBrains Mono"/>
+              </a:rPr>
+            </a:br>
+            <a:r>
+              <a:rPr kumimoji="0" lang="en-US" altLang="en-US" sz="2400" b="0" i="0" u="none" strike="noStrike" cap="none" normalizeH="0" baseline="0" dirty="0">
+                <a:ln>
+                  <a:noFill/>
+                </a:ln>
+                <a:solidFill>
+                  <a:srgbClr val="A9B7C6"/>
+                </a:solidFill>
+                <a:effectLst/>
+                <a:latin typeface="JetBrains Mono"/>
+              </a:rPr>
+              <a:t>enteredValue = scnr.nextInt()</a:t>
+            </a:r>
+            <a:r>
+              <a:rPr kumimoji="0" lang="en-US" altLang="en-US" sz="2400" b="0" i="0" u="none" strike="noStrike" cap="none" normalizeH="0" baseline="0" dirty="0">
+                <a:ln>
+                  <a:noFill/>
+                </a:ln>
+                <a:solidFill>
+                  <a:srgbClr val="CC7832"/>
+                </a:solidFill>
+                <a:effectLst/>
+                <a:latin typeface="JetBrains Mono"/>
+              </a:rPr>
+              <a:t>;</a:t>
+            </a:r>
+            <a:br>
+              <a:rPr kumimoji="0" lang="en-US" altLang="en-US" sz="2400" b="0" i="0" u="none" strike="noStrike" cap="none" normalizeH="0" baseline="0" dirty="0">
+                <a:ln>
+                  <a:noFill/>
+                </a:ln>
+                <a:solidFill>
+                  <a:srgbClr val="CC7832"/>
+                </a:solidFill>
+                <a:effectLst/>
+                <a:latin typeface="JetBrains Mono"/>
+              </a:rPr>
+            </a:br>
+            <a:r>
+              <a:rPr kumimoji="0" lang="en-US" altLang="en-US" sz="2400" b="0" i="0" u="none" strike="noStrike" cap="none" normalizeH="0" baseline="0" dirty="0">
+                <a:ln>
+                  <a:noFill/>
+                </a:ln>
+                <a:solidFill>
+                  <a:srgbClr val="A9B7C6"/>
+                </a:solidFill>
+                <a:effectLst/>
+                <a:latin typeface="JetBrains Mono"/>
+              </a:rPr>
+              <a:t>maxNumber = enteredValue</a:t>
+            </a:r>
+            <a:r>
+              <a:rPr kumimoji="0" lang="en-US" altLang="en-US" sz="2400" b="0" i="0" u="none" strike="noStrike" cap="none" normalizeH="0" baseline="0" dirty="0">
+                <a:ln>
+                  <a:noFill/>
+                </a:ln>
+                <a:solidFill>
+                  <a:srgbClr val="CC7832"/>
+                </a:solidFill>
+                <a:effectLst/>
+                <a:latin typeface="JetBrains Mono"/>
+              </a:rPr>
+              <a:t>;</a:t>
+            </a:r>
+            <a:br>
+              <a:rPr kumimoji="0" lang="en-US" altLang="en-US" sz="2400" b="0" i="0" u="none" strike="noStrike" cap="none" normalizeH="0" baseline="0" dirty="0">
+                <a:ln>
+                  <a:noFill/>
+                </a:ln>
+                <a:solidFill>
+                  <a:srgbClr val="CC7832"/>
+                </a:solidFill>
+                <a:effectLst/>
+                <a:latin typeface="JetBrains Mono"/>
+              </a:rPr>
+            </a:br>
+            <a:br>
+              <a:rPr kumimoji="0" lang="en-US" altLang="en-US" sz="2400" b="0" i="0" u="none" strike="noStrike" cap="none" normalizeH="0" baseline="0" dirty="0">
+                <a:ln>
+                  <a:noFill/>
+                </a:ln>
+                <a:solidFill>
+                  <a:srgbClr val="CC7832"/>
+                </a:solidFill>
+                <a:effectLst/>
+                <a:latin typeface="JetBrains Mono"/>
+              </a:rPr>
+            </a:br>
+            <a:r>
+              <a:rPr kumimoji="0" lang="en-US" altLang="en-US" sz="2400" b="0" i="0" u="none" strike="noStrike" cap="none" normalizeH="0" baseline="0" dirty="0">
+                <a:ln>
+                  <a:noFill/>
+                </a:ln>
+                <a:solidFill>
+                  <a:srgbClr val="CC7832"/>
+                </a:solidFill>
+                <a:effectLst/>
+                <a:latin typeface="JetBrains Mono"/>
+              </a:rPr>
+              <a:t>while </a:t>
+            </a:r>
+            <a:r>
+              <a:rPr kumimoji="0" lang="en-US" altLang="en-US" sz="2400" b="0" i="0" u="none" strike="noStrike" cap="none" normalizeH="0" baseline="0" dirty="0">
+                <a:ln>
+                  <a:noFill/>
+                </a:ln>
+                <a:solidFill>
+                  <a:srgbClr val="A9B7C6"/>
+                </a:solidFill>
+                <a:effectLst/>
+                <a:latin typeface="JetBrains Mono"/>
+              </a:rPr>
+              <a:t>(enteredValue &gt; </a:t>
+            </a:r>
+            <a:r>
+              <a:rPr kumimoji="0" lang="en-US" altLang="en-US" sz="2400" b="0" i="0" u="none" strike="noStrike" cap="none" normalizeH="0" baseline="0" dirty="0">
+                <a:ln>
+                  <a:noFill/>
+                </a:ln>
+                <a:solidFill>
+                  <a:srgbClr val="6897BB"/>
+                </a:solidFill>
+                <a:effectLst/>
+                <a:latin typeface="JetBrains Mono"/>
+              </a:rPr>
+              <a:t>0</a:t>
+            </a:r>
+            <a:r>
+              <a:rPr kumimoji="0" lang="en-US" altLang="en-US" sz="2400" b="0" i="0" u="none" strike="noStrike" cap="none" normalizeH="0" baseline="0" dirty="0">
+                <a:ln>
+                  <a:noFill/>
+                </a:ln>
+                <a:solidFill>
+                  <a:srgbClr val="A9B7C6"/>
+                </a:solidFill>
+                <a:effectLst/>
+                <a:latin typeface="JetBrains Mono"/>
+              </a:rPr>
+              <a:t>) {</a:t>
+            </a:r>
+            <a:br>
+              <a:rPr kumimoji="0" lang="en-US" altLang="en-US" sz="2400" b="0" i="0" u="none" strike="noStrike" cap="none" normalizeH="0" baseline="0" dirty="0">
+                <a:ln>
+                  <a:noFill/>
+                </a:ln>
+                <a:solidFill>
+                  <a:srgbClr val="A9B7C6"/>
+                </a:solidFill>
+                <a:effectLst/>
+                <a:latin typeface="JetBrains Mono"/>
+              </a:rPr>
+            </a:br>
+            <a:r>
+              <a:rPr kumimoji="0" lang="en-US" altLang="en-US" sz="2400" b="0" i="0" u="none" strike="noStrike" cap="none" normalizeH="0" baseline="0" dirty="0">
+                <a:ln>
+                  <a:noFill/>
+                </a:ln>
+                <a:solidFill>
+                  <a:srgbClr val="A9B7C6"/>
+                </a:solidFill>
+                <a:effectLst/>
+                <a:latin typeface="JetBrains Mono"/>
+              </a:rPr>
+              <a:t>    </a:t>
+            </a:r>
+            <a:r>
+              <a:rPr kumimoji="0" lang="en-US" altLang="en-US" sz="2400" b="0" i="0" u="none" strike="noStrike" cap="none" normalizeH="0" baseline="0" dirty="0">
+                <a:ln>
+                  <a:noFill/>
+                </a:ln>
+                <a:solidFill>
+                  <a:srgbClr val="CC7832"/>
+                </a:solidFill>
+                <a:effectLst/>
+                <a:latin typeface="JetBrains Mono"/>
+              </a:rPr>
+              <a:t>if </a:t>
+            </a:r>
+            <a:r>
+              <a:rPr kumimoji="0" lang="en-US" altLang="en-US" sz="2400" b="0" i="0" u="none" strike="noStrike" cap="none" normalizeH="0" baseline="0" dirty="0">
+                <a:ln>
+                  <a:noFill/>
+                </a:ln>
+                <a:solidFill>
+                  <a:srgbClr val="A9B7C6"/>
+                </a:solidFill>
+                <a:effectLst/>
+                <a:latin typeface="JetBrains Mono"/>
+              </a:rPr>
+              <a:t>(enteredValue &gt; maxNumber) {</a:t>
+            </a:r>
+            <a:br>
+              <a:rPr kumimoji="0" lang="en-US" altLang="en-US" sz="2400" b="0" i="0" u="none" strike="noStrike" cap="none" normalizeH="0" baseline="0" dirty="0">
+                <a:ln>
+                  <a:noFill/>
+                </a:ln>
+                <a:solidFill>
+                  <a:srgbClr val="A9B7C6"/>
+                </a:solidFill>
+                <a:effectLst/>
+                <a:latin typeface="JetBrains Mono"/>
+              </a:rPr>
+            </a:br>
+            <a:r>
+              <a:rPr kumimoji="0" lang="en-US" altLang="en-US" sz="2400" b="0" i="0" u="none" strike="noStrike" cap="none" normalizeH="0" baseline="0" dirty="0">
+                <a:ln>
+                  <a:noFill/>
+                </a:ln>
+                <a:solidFill>
+                  <a:srgbClr val="A9B7C6"/>
+                </a:solidFill>
+                <a:effectLst/>
+                <a:latin typeface="JetBrains Mono"/>
+              </a:rPr>
+              <a:t>        maxNumber = enteredValue</a:t>
+            </a:r>
+            <a:r>
+              <a:rPr kumimoji="0" lang="en-US" altLang="en-US" sz="2400" b="0" i="0" u="none" strike="noStrike" cap="none" normalizeH="0" baseline="0" dirty="0">
+                <a:ln>
+                  <a:noFill/>
+                </a:ln>
+                <a:solidFill>
+                  <a:srgbClr val="CC7832"/>
+                </a:solidFill>
+                <a:effectLst/>
+                <a:latin typeface="JetBrains Mono"/>
+              </a:rPr>
+              <a:t>;</a:t>
+            </a:r>
+            <a:br>
+              <a:rPr kumimoji="0" lang="en-US" altLang="en-US" sz="2400" b="0" i="0" u="none" strike="noStrike" cap="none" normalizeH="0" baseline="0" dirty="0">
+                <a:ln>
+                  <a:noFill/>
+                </a:ln>
+                <a:solidFill>
+                  <a:srgbClr val="CC7832"/>
+                </a:solidFill>
+                <a:effectLst/>
+                <a:latin typeface="JetBrains Mono"/>
+              </a:rPr>
+            </a:br>
+            <a:r>
+              <a:rPr kumimoji="0" lang="en-US" altLang="en-US" sz="2400" b="0" i="0" u="none" strike="noStrike" cap="none" normalizeH="0" baseline="0" dirty="0">
+                <a:ln>
+                  <a:noFill/>
+                </a:ln>
+                <a:solidFill>
+                  <a:srgbClr val="CC7832"/>
+                </a:solidFill>
+                <a:effectLst/>
+                <a:latin typeface="JetBrains Mono"/>
+              </a:rPr>
+              <a:t>    </a:t>
+            </a:r>
+            <a:r>
+              <a:rPr kumimoji="0" lang="en-US" altLang="en-US" sz="2400" b="0" i="0" u="none" strike="noStrike" cap="none" normalizeH="0" baseline="0" dirty="0">
+                <a:ln>
+                  <a:noFill/>
+                </a:ln>
+                <a:solidFill>
+                  <a:srgbClr val="A9B7C6"/>
+                </a:solidFill>
+                <a:effectLst/>
+                <a:latin typeface="JetBrains Mono"/>
+              </a:rPr>
+              <a:t>}</a:t>
+            </a:r>
+            <a:br>
+              <a:rPr kumimoji="0" lang="en-US" altLang="en-US" sz="2400" b="0" i="0" u="none" strike="noStrike" cap="none" normalizeH="0" baseline="0" dirty="0">
+                <a:ln>
+                  <a:noFill/>
+                </a:ln>
+                <a:solidFill>
+                  <a:srgbClr val="A9B7C6"/>
+                </a:solidFill>
+                <a:effectLst/>
+                <a:latin typeface="JetBrains Mono"/>
+              </a:rPr>
+            </a:br>
+            <a:r>
+              <a:rPr kumimoji="0" lang="en-US" altLang="en-US" sz="2400" b="0" i="0" u="none" strike="noStrike" cap="none" normalizeH="0" baseline="0" dirty="0">
+                <a:ln>
+                  <a:noFill/>
+                </a:ln>
+                <a:solidFill>
+                  <a:srgbClr val="A9B7C6"/>
+                </a:solidFill>
+                <a:effectLst/>
+                <a:latin typeface="JetBrains Mono"/>
+              </a:rPr>
+              <a:t>    System.</a:t>
+            </a:r>
+            <a:r>
+              <a:rPr kumimoji="0" lang="en-US" altLang="en-US" sz="2400" b="0" i="1" u="none" strike="noStrike" cap="none" normalizeH="0" baseline="0" dirty="0">
+                <a:ln>
+                  <a:noFill/>
+                </a:ln>
+                <a:solidFill>
+                  <a:srgbClr val="9876AA"/>
+                </a:solidFill>
+                <a:effectLst/>
+                <a:latin typeface="JetBrains Mono"/>
+              </a:rPr>
+              <a:t>out</a:t>
+            </a:r>
+            <a:r>
+              <a:rPr kumimoji="0" lang="en-US" altLang="en-US" sz="2400" b="0" i="0" u="none" strike="noStrike" cap="none" normalizeH="0" baseline="0" dirty="0">
+                <a:ln>
+                  <a:noFill/>
+                </a:ln>
+                <a:solidFill>
+                  <a:srgbClr val="A9B7C6"/>
+                </a:solidFill>
+                <a:effectLst/>
+                <a:latin typeface="JetBrains Mono"/>
+              </a:rPr>
+              <a:t>.println(</a:t>
+            </a:r>
+            <a:r>
+              <a:rPr kumimoji="0" lang="en-US" altLang="en-US" sz="2400" b="0" i="0" u="none" strike="noStrike" cap="none" normalizeH="0" baseline="0" dirty="0">
+                <a:ln>
+                  <a:noFill/>
+                </a:ln>
+                <a:solidFill>
+                  <a:srgbClr val="6A8759"/>
+                </a:solidFill>
+                <a:effectLst/>
+                <a:latin typeface="JetBrains Mono"/>
+              </a:rPr>
+              <a:t>"Enter a positive value (0 or negative to exit):"</a:t>
+            </a:r>
+            <a:r>
+              <a:rPr kumimoji="0" lang="en-US" altLang="en-US" sz="2400" b="0" i="0" u="none" strike="noStrike" cap="none" normalizeH="0" baseline="0" dirty="0">
+                <a:ln>
+                  <a:noFill/>
+                </a:ln>
+                <a:solidFill>
+                  <a:srgbClr val="A9B7C6"/>
+                </a:solidFill>
+                <a:effectLst/>
+                <a:latin typeface="JetBrains Mono"/>
+              </a:rPr>
+              <a:t>)</a:t>
+            </a:r>
+            <a:r>
+              <a:rPr kumimoji="0" lang="en-US" altLang="en-US" sz="2400" b="0" i="0" u="none" strike="noStrike" cap="none" normalizeH="0" baseline="0" dirty="0">
+                <a:ln>
+                  <a:noFill/>
+                </a:ln>
+                <a:solidFill>
+                  <a:srgbClr val="CC7832"/>
+                </a:solidFill>
+                <a:effectLst/>
+                <a:latin typeface="JetBrains Mono"/>
+              </a:rPr>
+              <a:t>;</a:t>
+            </a:r>
+            <a:br>
+              <a:rPr kumimoji="0" lang="en-US" altLang="en-US" sz="2400" b="0" i="0" u="none" strike="noStrike" cap="none" normalizeH="0" baseline="0" dirty="0">
+                <a:ln>
+                  <a:noFill/>
+                </a:ln>
+                <a:solidFill>
+                  <a:srgbClr val="CC7832"/>
+                </a:solidFill>
+                <a:effectLst/>
+                <a:latin typeface="JetBrains Mono"/>
+              </a:rPr>
+            </a:br>
+            <a:r>
+              <a:rPr kumimoji="0" lang="en-US" altLang="en-US" sz="2400" b="0" i="0" u="none" strike="noStrike" cap="none" normalizeH="0" baseline="0" dirty="0">
+                <a:ln>
+                  <a:noFill/>
+                </a:ln>
+                <a:solidFill>
+                  <a:srgbClr val="CC7832"/>
+                </a:solidFill>
+                <a:effectLst/>
+                <a:latin typeface="JetBrains Mono"/>
+              </a:rPr>
+              <a:t>    </a:t>
+            </a:r>
+            <a:r>
+              <a:rPr kumimoji="0" lang="en-US" altLang="en-US" sz="2400" b="0" i="0" u="none" strike="noStrike" cap="none" normalizeH="0" baseline="0" dirty="0">
+                <a:ln>
+                  <a:noFill/>
+                </a:ln>
+                <a:solidFill>
+                  <a:srgbClr val="A9B7C6"/>
+                </a:solidFill>
+                <a:effectLst/>
+                <a:latin typeface="JetBrains Mono"/>
+              </a:rPr>
+              <a:t>enteredValue = scnr.nextInt()</a:t>
+            </a:r>
+            <a:r>
+              <a:rPr kumimoji="0" lang="en-US" altLang="en-US" sz="2400" b="0" i="0" u="none" strike="noStrike" cap="none" normalizeH="0" baseline="0" dirty="0">
+                <a:ln>
+                  <a:noFill/>
+                </a:ln>
+                <a:solidFill>
+                  <a:srgbClr val="CC7832"/>
+                </a:solidFill>
+                <a:effectLst/>
+                <a:latin typeface="JetBrains Mono"/>
+              </a:rPr>
+              <a:t>;</a:t>
+            </a:r>
+            <a:br>
+              <a:rPr kumimoji="0" lang="en-US" altLang="en-US" sz="2400" b="0" i="0" u="none" strike="noStrike" cap="none" normalizeH="0" baseline="0" dirty="0">
+                <a:ln>
+                  <a:noFill/>
+                </a:ln>
+                <a:solidFill>
+                  <a:srgbClr val="CC7832"/>
+                </a:solidFill>
+                <a:effectLst/>
+                <a:latin typeface="JetBrains Mono"/>
+              </a:rPr>
+            </a:br>
+            <a:r>
+              <a:rPr kumimoji="0" lang="en-US" altLang="en-US" sz="2400" b="0" i="0" u="none" strike="noStrike" cap="none" normalizeH="0" baseline="0" dirty="0">
+                <a:ln>
+                  <a:noFill/>
+                </a:ln>
+                <a:solidFill>
+                  <a:srgbClr val="A9B7C6"/>
+                </a:solidFill>
+                <a:effectLst/>
+                <a:latin typeface="JetBrains Mono"/>
+              </a:rPr>
+              <a:t>}</a:t>
+            </a:r>
+            <a:br>
+              <a:rPr kumimoji="0" lang="en-US" altLang="en-US" sz="2400" b="0" i="0" u="none" strike="noStrike" cap="none" normalizeH="0" baseline="0" dirty="0">
+                <a:ln>
+                  <a:noFill/>
+                </a:ln>
+                <a:solidFill>
+                  <a:srgbClr val="A9B7C6"/>
+                </a:solidFill>
+                <a:effectLst/>
+                <a:latin typeface="JetBrains Mono"/>
+              </a:rPr>
+            </a:br>
+            <a:br>
+              <a:rPr kumimoji="0" lang="en-US" altLang="en-US" sz="2400" b="0" i="0" u="none" strike="noStrike" cap="none" normalizeH="0" baseline="0" dirty="0">
+                <a:ln>
+                  <a:noFill/>
+                </a:ln>
+                <a:solidFill>
+                  <a:srgbClr val="A9B7C6"/>
+                </a:solidFill>
+                <a:effectLst/>
+                <a:latin typeface="JetBrains Mono"/>
+              </a:rPr>
+            </a:br>
+            <a:r>
+              <a:rPr kumimoji="0" lang="en-US" altLang="en-US" sz="2400" b="0" i="0" u="none" strike="noStrike" cap="none" normalizeH="0" baseline="0" dirty="0">
+                <a:ln>
+                  <a:noFill/>
+                </a:ln>
+                <a:solidFill>
+                  <a:srgbClr val="A9B7C6"/>
+                </a:solidFill>
+                <a:effectLst/>
+                <a:latin typeface="JetBrains Mono"/>
+              </a:rPr>
+              <a:t>System.</a:t>
+            </a:r>
+            <a:r>
+              <a:rPr kumimoji="0" lang="en-US" altLang="en-US" sz="2400" b="0" i="1" u="none" strike="noStrike" cap="none" normalizeH="0" baseline="0" dirty="0">
+                <a:ln>
+                  <a:noFill/>
+                </a:ln>
+                <a:solidFill>
+                  <a:srgbClr val="9876AA"/>
+                </a:solidFill>
+                <a:effectLst/>
+                <a:latin typeface="JetBrains Mono"/>
+              </a:rPr>
+              <a:t>out</a:t>
+            </a:r>
+            <a:r>
+              <a:rPr kumimoji="0" lang="en-US" altLang="en-US" sz="2400" b="0" i="0" u="none" strike="noStrike" cap="none" normalizeH="0" baseline="0" dirty="0">
+                <a:ln>
+                  <a:noFill/>
+                </a:ln>
+                <a:solidFill>
+                  <a:srgbClr val="A9B7C6"/>
+                </a:solidFill>
+                <a:effectLst/>
+                <a:latin typeface="JetBrains Mono"/>
+              </a:rPr>
+              <a:t>.println(</a:t>
+            </a:r>
+            <a:r>
+              <a:rPr kumimoji="0" lang="en-US" altLang="en-US" sz="2400" b="0" i="0" u="none" strike="noStrike" cap="none" normalizeH="0" baseline="0" dirty="0">
+                <a:ln>
+                  <a:noFill/>
+                </a:ln>
+                <a:solidFill>
+                  <a:srgbClr val="6A8759"/>
+                </a:solidFill>
+                <a:effectLst/>
+                <a:latin typeface="JetBrains Mono"/>
+              </a:rPr>
+              <a:t>"Max value: " </a:t>
+            </a:r>
+            <a:r>
+              <a:rPr kumimoji="0" lang="en-US" altLang="en-US" sz="2400" b="0" i="0" u="none" strike="noStrike" cap="none" normalizeH="0" baseline="0" dirty="0">
+                <a:ln>
+                  <a:noFill/>
+                </a:ln>
+                <a:solidFill>
+                  <a:srgbClr val="A9B7C6"/>
+                </a:solidFill>
+                <a:effectLst/>
+                <a:latin typeface="JetBrains Mono"/>
+              </a:rPr>
+              <a:t>+ maxNumber)</a:t>
+            </a:r>
+            <a:r>
+              <a:rPr kumimoji="0" lang="en-US" altLang="en-US" sz="2400" b="0" i="0" u="none" strike="noStrike" cap="none" normalizeH="0" baseline="0" dirty="0">
+                <a:ln>
+                  <a:noFill/>
+                </a:ln>
+                <a:solidFill>
+                  <a:srgbClr val="CC7832"/>
+                </a:solidFill>
+                <a:effectLst/>
+                <a:latin typeface="JetBrains Mono"/>
+              </a:rPr>
+              <a:t>;</a:t>
+            </a:r>
+            <a:endParaRPr kumimoji="0" lang="en-US" altLang="en-US" sz="2400" b="0" i="0" u="none" strike="noStrike" cap="none" normalizeH="0" baseline="0" dirty="0">
+              <a:ln>
+                <a:noFill/>
+              </a:ln>
+              <a:solidFill>
+                <a:schemeClr val="tx1"/>
+              </a:solidFill>
+              <a:effectLst/>
+              <a:latin typeface="Arial" panose="020B0604020202020204" pitchFamily="34" charset="0"/>
+            </a:endParaRPr>
+          </a:p>
+        </p:txBody>
+      </p:sp>
+      <p:sp>
+        <p:nvSpPr>
+          <p:cNvPr id="3" name="Right Brace 2">
+            <a:extLst>
+              <a:ext uri="{FF2B5EF4-FFF2-40B4-BE49-F238E27FC236}">
+                <a16:creationId xmlns:a16="http://schemas.microsoft.com/office/drawing/2014/main" id="{5F71938A-F4EF-4C7E-A174-370663BD7E78}"/>
+              </a:ext>
+            </a:extLst>
+          </p:cNvPr>
+          <p:cNvSpPr/>
+          <p:nvPr/>
+        </p:nvSpPr>
+        <p:spPr>
+          <a:xfrm>
+            <a:off x="9494874" y="2573079"/>
+            <a:ext cx="318977" cy="723014"/>
+          </a:xfrm>
+          <a:prstGeom prst="rightBrace">
+            <a:avLst/>
+          </a:prstGeom>
+        </p:spPr>
+        <p:style>
+          <a:lnRef idx="2">
+            <a:schemeClr val="accent1"/>
+          </a:lnRef>
+          <a:fillRef idx="0">
+            <a:schemeClr val="accent1"/>
+          </a:fillRef>
+          <a:effectRef idx="1">
+            <a:schemeClr val="accent1"/>
+          </a:effectRef>
+          <a:fontRef idx="minor">
+            <a:schemeClr val="tx1"/>
+          </a:fontRef>
+        </p:style>
+        <p:txBody>
+          <a:bodyPr rtlCol="0" anchor="ctr"/>
+          <a:lstStyle/>
+          <a:p>
+            <a:pPr algn="ctr"/>
+            <a:endParaRPr lang="en-US"/>
+          </a:p>
+        </p:txBody>
+      </p:sp>
+      <p:sp>
+        <p:nvSpPr>
+          <p:cNvPr id="5" name="TextBox 4">
+            <a:extLst>
+              <a:ext uri="{FF2B5EF4-FFF2-40B4-BE49-F238E27FC236}">
+                <a16:creationId xmlns:a16="http://schemas.microsoft.com/office/drawing/2014/main" id="{869777BD-3740-4BB9-AA23-5BFCF2D69557}"/>
+              </a:ext>
+            </a:extLst>
+          </p:cNvPr>
+          <p:cNvSpPr txBox="1"/>
+          <p:nvPr/>
+        </p:nvSpPr>
+        <p:spPr>
+          <a:xfrm>
+            <a:off x="9973339" y="2661074"/>
+            <a:ext cx="3424335" cy="707886"/>
+          </a:xfrm>
+          <a:prstGeom prst="rect">
+            <a:avLst/>
+          </a:prstGeom>
+          <a:noFill/>
+        </p:spPr>
+        <p:txBody>
+          <a:bodyPr wrap="none" rtlCol="0">
+            <a:spAutoFit/>
+          </a:bodyPr>
+          <a:lstStyle/>
+          <a:p>
+            <a:r>
+              <a:rPr lang="en-US" dirty="0">
+                <a:solidFill>
+                  <a:schemeClr val="bg1"/>
+                </a:solidFill>
+              </a:rPr>
+              <a:t>Sentinel variable – initialized</a:t>
+            </a:r>
+          </a:p>
+          <a:p>
+            <a:r>
+              <a:rPr lang="en-US" dirty="0">
+                <a:solidFill>
+                  <a:schemeClr val="bg1"/>
+                </a:solidFill>
+              </a:rPr>
+              <a:t>out of the while</a:t>
+            </a:r>
+          </a:p>
+        </p:txBody>
+      </p:sp>
+      <p:sp>
+        <p:nvSpPr>
+          <p:cNvPr id="6" name="Right Brace 5">
+            <a:extLst>
+              <a:ext uri="{FF2B5EF4-FFF2-40B4-BE49-F238E27FC236}">
+                <a16:creationId xmlns:a16="http://schemas.microsoft.com/office/drawing/2014/main" id="{51A77FE8-AFCB-4BB7-A9EE-7ED1FA167F37}"/>
+              </a:ext>
+            </a:extLst>
+          </p:cNvPr>
+          <p:cNvSpPr/>
+          <p:nvPr/>
+        </p:nvSpPr>
+        <p:spPr>
+          <a:xfrm>
+            <a:off x="4575544" y="3987208"/>
+            <a:ext cx="318977" cy="462935"/>
+          </a:xfrm>
+          <a:prstGeom prst="rightBrace">
+            <a:avLst/>
+          </a:prstGeom>
+        </p:spPr>
+        <p:style>
+          <a:lnRef idx="2">
+            <a:schemeClr val="accent1"/>
+          </a:lnRef>
+          <a:fillRef idx="0">
+            <a:schemeClr val="accent1"/>
+          </a:fillRef>
+          <a:effectRef idx="1">
+            <a:schemeClr val="accent1"/>
+          </a:effectRef>
+          <a:fontRef idx="minor">
+            <a:schemeClr val="tx1"/>
+          </a:fontRef>
+        </p:style>
+        <p:txBody>
+          <a:bodyPr rtlCol="0" anchor="ctr"/>
+          <a:lstStyle/>
+          <a:p>
+            <a:pPr algn="ctr"/>
+            <a:endParaRPr lang="en-US"/>
+          </a:p>
+        </p:txBody>
+      </p:sp>
+      <p:sp>
+        <p:nvSpPr>
+          <p:cNvPr id="7" name="TextBox 6">
+            <a:extLst>
+              <a:ext uri="{FF2B5EF4-FFF2-40B4-BE49-F238E27FC236}">
+                <a16:creationId xmlns:a16="http://schemas.microsoft.com/office/drawing/2014/main" id="{3B5F058B-94F9-48DF-858B-E3BBBF940E08}"/>
+              </a:ext>
+            </a:extLst>
+          </p:cNvPr>
+          <p:cNvSpPr txBox="1"/>
+          <p:nvPr/>
+        </p:nvSpPr>
+        <p:spPr>
+          <a:xfrm>
+            <a:off x="5054009" y="4042944"/>
+            <a:ext cx="5706140" cy="400110"/>
+          </a:xfrm>
+          <a:prstGeom prst="rect">
+            <a:avLst/>
+          </a:prstGeom>
+          <a:noFill/>
+        </p:spPr>
+        <p:txBody>
+          <a:bodyPr wrap="square" rtlCol="0">
+            <a:spAutoFit/>
+          </a:bodyPr>
+          <a:lstStyle/>
+          <a:p>
+            <a:r>
+              <a:rPr lang="en-US" dirty="0">
+                <a:solidFill>
+                  <a:schemeClr val="bg1"/>
+                </a:solidFill>
+              </a:rPr>
+              <a:t>Use the sentinel variable in the while condition</a:t>
+            </a:r>
+          </a:p>
+        </p:txBody>
+      </p:sp>
+      <p:sp>
+        <p:nvSpPr>
+          <p:cNvPr id="8" name="Right Brace 7">
+            <a:extLst>
+              <a:ext uri="{FF2B5EF4-FFF2-40B4-BE49-F238E27FC236}">
+                <a16:creationId xmlns:a16="http://schemas.microsoft.com/office/drawing/2014/main" id="{E8A14603-091C-4F16-AA8E-024DF442E84E}"/>
+              </a:ext>
+            </a:extLst>
+          </p:cNvPr>
+          <p:cNvSpPr/>
+          <p:nvPr/>
+        </p:nvSpPr>
+        <p:spPr>
+          <a:xfrm>
+            <a:off x="9286726" y="5490958"/>
+            <a:ext cx="318977" cy="723014"/>
+          </a:xfrm>
+          <a:prstGeom prst="rightBrace">
+            <a:avLst/>
+          </a:prstGeom>
+        </p:spPr>
+        <p:style>
+          <a:lnRef idx="2">
+            <a:schemeClr val="accent1"/>
+          </a:lnRef>
+          <a:fillRef idx="0">
+            <a:schemeClr val="accent1"/>
+          </a:fillRef>
+          <a:effectRef idx="1">
+            <a:schemeClr val="accent1"/>
+          </a:effectRef>
+          <a:fontRef idx="minor">
+            <a:schemeClr val="tx1"/>
+          </a:fontRef>
+        </p:style>
+        <p:txBody>
+          <a:bodyPr rtlCol="0" anchor="ctr"/>
+          <a:lstStyle/>
+          <a:p>
+            <a:pPr algn="ctr"/>
+            <a:endParaRPr lang="en-US"/>
+          </a:p>
+        </p:txBody>
+      </p:sp>
+      <p:sp>
+        <p:nvSpPr>
+          <p:cNvPr id="9" name="TextBox 8">
+            <a:extLst>
+              <a:ext uri="{FF2B5EF4-FFF2-40B4-BE49-F238E27FC236}">
+                <a16:creationId xmlns:a16="http://schemas.microsoft.com/office/drawing/2014/main" id="{3DC5E008-0995-4A18-826B-41B8FD0923B6}"/>
+              </a:ext>
+            </a:extLst>
+          </p:cNvPr>
+          <p:cNvSpPr txBox="1"/>
+          <p:nvPr/>
+        </p:nvSpPr>
+        <p:spPr>
+          <a:xfrm>
+            <a:off x="9765191" y="5578953"/>
+            <a:ext cx="3220753" cy="707886"/>
+          </a:xfrm>
+          <a:prstGeom prst="rect">
+            <a:avLst/>
+          </a:prstGeom>
+          <a:noFill/>
+        </p:spPr>
+        <p:txBody>
+          <a:bodyPr wrap="none" rtlCol="0">
+            <a:spAutoFit/>
+          </a:bodyPr>
+          <a:lstStyle/>
+          <a:p>
+            <a:r>
+              <a:rPr lang="en-US" dirty="0">
+                <a:solidFill>
+                  <a:schemeClr val="bg1"/>
+                </a:solidFill>
+              </a:rPr>
+              <a:t>Sentinel variable – update </a:t>
+            </a:r>
+          </a:p>
+          <a:p>
+            <a:r>
+              <a:rPr lang="en-US" dirty="0">
+                <a:solidFill>
+                  <a:schemeClr val="bg1"/>
+                </a:solidFill>
+              </a:rPr>
+              <a:t>inside the while loop</a:t>
+            </a:r>
+          </a:p>
+        </p:txBody>
+      </p:sp>
+    </p:spTree>
+    <p:extLst>
+      <p:ext uri="{BB962C8B-B14F-4D97-AF65-F5344CB8AC3E}">
+        <p14:creationId xmlns:p14="http://schemas.microsoft.com/office/powerpoint/2010/main" val="2773136670"/>
+      </p:ext>
+    </p:extLst>
+  </p:cSld>
+  <p:clrMapOvr>
+    <a:masterClrMapping/>
+  </p:clrMapOvr>
+  <mc:AlternateContent xmlns:mc="http://schemas.openxmlformats.org/markup-compatibility/2006" xmlns:p14="http://schemas.microsoft.com/office/powerpoint/2010/main">
+    <mc:Choice Requires="p14">
+      <p:transition p14:dur="300">
+        <p:fade/>
+      </p:transition>
+    </mc:Choice>
+    <mc:Fallback xmlns="">
+      <p:transition>
+        <p:fade/>
+      </p:transition>
+    </mc:Fallback>
+  </mc:AlternateContent>
+  <p:timing>
+    <p:tnLst>
+      <p:par>
+        <p:cTn id="1" dur="indefinite" restart="never" nodeType="tmRoot">
+          <p:childTnLst>
+            <p:seq concurrent="1" nextAc="seek">
+              <p:cTn id="2" dur="indefinite" nodeType="mainSeq">
+                <p:childTnLst>
+                  <p:par>
+                    <p:cTn id="3" fill="hold">
+                      <p:stCondLst>
+                        <p:cond delay="indefinite"/>
+                      </p:stCondLst>
+                      <p:childTnLst>
+                        <p:par>
+                          <p:cTn id="4" fill="hold">
+                            <p:stCondLst>
+                              <p:cond delay="0"/>
+                            </p:stCondLst>
+                            <p:childTnLst>
+                              <p:par>
+                                <p:cTn id="5" presetID="1" presetClass="entr" presetSubtype="0" fill="hold" grpId="0" nodeType="clickEffect">
+                                  <p:stCondLst>
+                                    <p:cond delay="0"/>
+                                  </p:stCondLst>
+                                  <p:childTnLst>
+                                    <p:set>
+                                      <p:cBhvr>
+                                        <p:cTn id="6" dur="1" fill="hold">
+                                          <p:stCondLst>
+                                            <p:cond delay="0"/>
+                                          </p:stCondLst>
+                                        </p:cTn>
+                                        <p:tgtEl>
+                                          <p:spTgt spid="3"/>
+                                        </p:tgtEl>
+                                        <p:attrNameLst>
+                                          <p:attrName>style.visibility</p:attrName>
+                                        </p:attrNameLst>
+                                      </p:cBhvr>
+                                      <p:to>
+                                        <p:strVal val="visible"/>
+                                      </p:to>
+                                    </p:set>
+                                  </p:childTnLst>
+                                </p:cTn>
+                              </p:par>
+                              <p:par>
+                                <p:cTn id="7" presetID="1" presetClass="entr" presetSubtype="0" fill="hold" grpId="0" nodeType="withEffect">
+                                  <p:stCondLst>
+                                    <p:cond delay="0"/>
+                                  </p:stCondLst>
+                                  <p:childTnLst>
+                                    <p:set>
+                                      <p:cBhvr>
+                                        <p:cTn id="8" dur="1" fill="hold">
+                                          <p:stCondLst>
+                                            <p:cond delay="0"/>
+                                          </p:stCondLst>
+                                        </p:cTn>
+                                        <p:tgtEl>
+                                          <p:spTgt spid="5"/>
+                                        </p:tgtEl>
+                                        <p:attrNameLst>
+                                          <p:attrName>style.visibility</p:attrName>
+                                        </p:attrNameLst>
+                                      </p:cBhvr>
+                                      <p:to>
+                                        <p:strVal val="visible"/>
+                                      </p:to>
+                                    </p:set>
+                                  </p:childTnLst>
+                                </p:cTn>
+                              </p:par>
+                            </p:childTnLst>
+                          </p:cTn>
+                        </p:par>
+                      </p:childTnLst>
+                    </p:cTn>
+                  </p:par>
+                  <p:par>
+                    <p:cTn id="9" fill="hold">
+                      <p:stCondLst>
+                        <p:cond delay="indefinite"/>
+                      </p:stCondLst>
+                      <p:childTnLst>
+                        <p:par>
+                          <p:cTn id="10" fill="hold">
+                            <p:stCondLst>
+                              <p:cond delay="0"/>
+                            </p:stCondLst>
+                            <p:childTnLst>
+                              <p:par>
+                                <p:cTn id="11" presetID="1" presetClass="entr" presetSubtype="0" fill="hold" grpId="0" nodeType="clickEffect">
+                                  <p:stCondLst>
+                                    <p:cond delay="0"/>
+                                  </p:stCondLst>
+                                  <p:childTnLst>
+                                    <p:set>
+                                      <p:cBhvr>
+                                        <p:cTn id="12" dur="1" fill="hold">
+                                          <p:stCondLst>
+                                            <p:cond delay="0"/>
+                                          </p:stCondLst>
+                                        </p:cTn>
+                                        <p:tgtEl>
+                                          <p:spTgt spid="6"/>
+                                        </p:tgtEl>
+                                        <p:attrNameLst>
+                                          <p:attrName>style.visibility</p:attrName>
+                                        </p:attrNameLst>
+                                      </p:cBhvr>
+                                      <p:to>
+                                        <p:strVal val="visible"/>
+                                      </p:to>
+                                    </p:set>
+                                  </p:childTnLst>
+                                </p:cTn>
+                              </p:par>
+                              <p:par>
+                                <p:cTn id="13" presetID="1" presetClass="entr" presetSubtype="0" fill="hold" grpId="0" nodeType="withEffect">
+                                  <p:stCondLst>
+                                    <p:cond delay="0"/>
+                                  </p:stCondLst>
+                                  <p:childTnLst>
+                                    <p:set>
+                                      <p:cBhvr>
+                                        <p:cTn id="14" dur="1" fill="hold">
+                                          <p:stCondLst>
+                                            <p:cond delay="0"/>
+                                          </p:stCondLst>
+                                        </p:cTn>
+                                        <p:tgtEl>
+                                          <p:spTgt spid="7"/>
+                                        </p:tgtEl>
+                                        <p:attrNameLst>
+                                          <p:attrName>style.visibility</p:attrName>
+                                        </p:attrNameLst>
+                                      </p:cBhvr>
+                                      <p:to>
+                                        <p:strVal val="visible"/>
+                                      </p:to>
+                                    </p:set>
+                                  </p:childTnLst>
+                                </p:cTn>
+                              </p:par>
+                            </p:childTnLst>
+                          </p:cTn>
+                        </p:par>
+                      </p:childTnLst>
+                    </p:cTn>
+                  </p:par>
+                  <p:par>
+                    <p:cTn id="15" fill="hold">
+                      <p:stCondLst>
+                        <p:cond delay="indefinite"/>
+                      </p:stCondLst>
+                      <p:childTnLst>
+                        <p:par>
+                          <p:cTn id="16" fill="hold">
+                            <p:stCondLst>
+                              <p:cond delay="0"/>
+                            </p:stCondLst>
+                            <p:childTnLst>
+                              <p:par>
+                                <p:cTn id="17" presetID="1" presetClass="entr" presetSubtype="0" fill="hold" grpId="0" nodeType="clickEffect">
+                                  <p:stCondLst>
+                                    <p:cond delay="0"/>
+                                  </p:stCondLst>
+                                  <p:childTnLst>
+                                    <p:set>
+                                      <p:cBhvr>
+                                        <p:cTn id="18" dur="1" fill="hold">
+                                          <p:stCondLst>
+                                            <p:cond delay="0"/>
+                                          </p:stCondLst>
+                                        </p:cTn>
+                                        <p:tgtEl>
+                                          <p:spTgt spid="8"/>
+                                        </p:tgtEl>
+                                        <p:attrNameLst>
+                                          <p:attrName>style.visibility</p:attrName>
+                                        </p:attrNameLst>
+                                      </p:cBhvr>
+                                      <p:to>
+                                        <p:strVal val="visible"/>
+                                      </p:to>
+                                    </p:set>
+                                  </p:childTnLst>
+                                </p:cTn>
+                              </p:par>
+                              <p:par>
+                                <p:cTn id="19" presetID="1" presetClass="entr" presetSubtype="0" fill="hold" grpId="0" nodeType="withEffect">
+                                  <p:stCondLst>
+                                    <p:cond delay="0"/>
+                                  </p:stCondLst>
+                                  <p:childTnLst>
+                                    <p:set>
+                                      <p:cBhvr>
+                                        <p:cTn id="20" dur="1" fill="hold">
+                                          <p:stCondLst>
+                                            <p:cond delay="0"/>
+                                          </p:stCondLst>
+                                        </p:cTn>
+                                        <p:tgtEl>
+                                          <p:spTgt spid="9"/>
+                                        </p:tgtEl>
+                                        <p:attrNameLst>
+                                          <p:attrName>style.visibility</p:attrName>
+                                        </p:attrNameLst>
+                                      </p:cBhvr>
+                                      <p:to>
+                                        <p:strVal val="visible"/>
+                                      </p:to>
+                                    </p:set>
+                                  </p:childTnLst>
+                                </p:cTn>
+                              </p:par>
+                            </p:childTnLst>
+                          </p:cTn>
+                        </p:par>
+                      </p:childTnLst>
+                    </p:cTn>
+                  </p:par>
+                </p:childTnLst>
+              </p:cTn>
+              <p:prevCondLst>
+                <p:cond evt="onPrev" delay="0">
+                  <p:tgtEl>
+                    <p:sldTgt/>
+                  </p:tgtEl>
+                </p:cond>
+              </p:prevCondLst>
+              <p:nextCondLst>
+                <p:cond evt="onNext" delay="0">
+                  <p:tgtEl>
+                    <p:sldTgt/>
+                  </p:tgtEl>
+                </p:cond>
+              </p:nextCondLst>
+            </p:seq>
+          </p:childTnLst>
+        </p:cTn>
+      </p:par>
+    </p:tnLst>
+    <p:bldLst>
+      <p:bldP spid="3" grpId="0" animBg="1"/>
+      <p:bldP spid="5" grpId="0"/>
+      <p:bldP spid="6" grpId="0" animBg="1"/>
+      <p:bldP spid="7" grpId="0"/>
+      <p:bldP spid="8" grpId="0" animBg="1"/>
+      <p:bldP spid="9" grpId="0"/>
+    </p:bldLst>
+  </p:timing>
+</p:sld>
+</file>
+
+<file path=ppt/slides/slide6.xml><?xml version="1.0" encoding="utf-8"?>
 <p:sld xmlns:a="http://schemas.openxmlformats.org/drawingml/2006/main" xmlns:r="http://schemas.openxmlformats.org/officeDocument/2006/relationships" xmlns:p="http://schemas.openxmlformats.org/presentationml/2006/main">
   <p:cSld>
     <p:spTree>
@@ -11842,7 +14846,7 @@
 </p:sld>
 </file>
 
-<file path=ppt/slides/slide5.xml><?xml version="1.0" encoding="utf-8"?>
+<file path=ppt/slides/slide7.xml><?xml version="1.0" encoding="utf-8"?>
 <p:sld xmlns:a="http://schemas.openxmlformats.org/drawingml/2006/main" xmlns:r="http://schemas.openxmlformats.org/officeDocument/2006/relationships" xmlns:p="http://schemas.openxmlformats.org/presentationml/2006/main">
   <p:cSld>
     <p:spTree>
@@ -11882,6 +14886,147 @@
           <a:p>
             <a:r>
               <a:rPr lang="en-US" dirty="0"/>
+              <a:t>Practice 1 – Group Programing</a:t>
+            </a:r>
+          </a:p>
+        </p:txBody>
+      </p:sp>
+      <p:sp>
+        <p:nvSpPr>
+          <p:cNvPr id="3" name="Text Placeholder 2">
+            <a:extLst>
+              <a:ext uri="{FF2B5EF4-FFF2-40B4-BE49-F238E27FC236}">
+                <a16:creationId xmlns:a16="http://schemas.microsoft.com/office/drawing/2014/main" id="{A532DEDA-9414-0A41-B377-DBD94A1F0E75}"/>
+              </a:ext>
+            </a:extLst>
+          </p:cNvPr>
+          <p:cNvSpPr>
+            <a:spLocks noGrp="1"/>
+          </p:cNvSpPr>
+          <p:nvPr>
+            <p:ph type="body" sz="quarter" idx="10"/>
+          </p:nvPr>
+        </p:nvSpPr>
+        <p:spPr>
+          <a:xfrm>
+            <a:off x="628075" y="1776683"/>
+            <a:ext cx="11312287" cy="3840090"/>
+          </a:xfrm>
+        </p:spPr>
+        <p:txBody>
+          <a:bodyPr/>
+          <a:lstStyle/>
+          <a:p>
+            <a:r>
+              <a:rPr lang="en-US" dirty="0"/>
+              <a:t>Write a method that receives a String as a parameter and returns a new String containing each letter that appears in the String followed by how many times that letter appears in the String.</a:t>
+            </a:r>
+          </a:p>
+          <a:p>
+            <a:r>
+              <a:rPr lang="en-US" dirty="0"/>
+              <a:t>For example:</a:t>
+            </a:r>
+          </a:p>
+          <a:p>
+            <a:r>
+              <a:rPr lang="en-US" dirty="0"/>
+              <a:t>Considering that the method will receive as a parameter the String “blueberry”, it will return  the following String “b2l1u1e2b2e2r2r2y1”.</a:t>
+            </a:r>
+          </a:p>
+          <a:p>
+            <a:r>
+              <a:rPr lang="en-US" dirty="0"/>
+              <a:t>Form groups of 3-4 students to write this method.</a:t>
+            </a:r>
+          </a:p>
+          <a:p>
+            <a:r>
+              <a:rPr lang="en-US" dirty="0"/>
+              <a:t>Tip: </a:t>
+            </a:r>
+          </a:p>
+          <a:p>
+            <a:pPr lvl="1"/>
+            <a:r>
+              <a:rPr lang="en-US" dirty="0"/>
+              <a:t>First think about what do you need to do in order to solve this problem (write a sequence of steps in English).</a:t>
+            </a:r>
+          </a:p>
+          <a:p>
+            <a:pPr lvl="1"/>
+            <a:r>
+              <a:rPr lang="en-US" dirty="0"/>
+              <a:t>When you have that clear in your mind, translate your steps to Java and write the code.</a:t>
+            </a:r>
+          </a:p>
+        </p:txBody>
+      </p:sp>
+    </p:spTree>
+    <p:extLst>
+      <p:ext uri="{BB962C8B-B14F-4D97-AF65-F5344CB8AC3E}">
+        <p14:creationId xmlns:p14="http://schemas.microsoft.com/office/powerpoint/2010/main" val="1005821696"/>
+      </p:ext>
+    </p:extLst>
+  </p:cSld>
+  <p:clrMapOvr>
+    <a:masterClrMapping/>
+  </p:clrMapOvr>
+  <mc:AlternateContent xmlns:mc="http://schemas.openxmlformats.org/markup-compatibility/2006" xmlns:p14="http://schemas.microsoft.com/office/powerpoint/2010/main">
+    <mc:Choice Requires="p14">
+      <p:transition p14:dur="300">
+        <p:fade/>
+      </p:transition>
+    </mc:Choice>
+    <mc:Fallback xmlns="">
+      <p:transition>
+        <p:fade/>
+      </p:transition>
+    </mc:Fallback>
+  </mc:AlternateContent>
+</p:sld>
+</file>
+
+<file path=ppt/slides/slide8.xml><?xml version="1.0" encoding="utf-8"?>
+<p:sld xmlns:a="http://schemas.openxmlformats.org/drawingml/2006/main" xmlns:r="http://schemas.openxmlformats.org/officeDocument/2006/relationships" xmlns:p="http://schemas.openxmlformats.org/presentationml/2006/main">
+  <p:cSld>
+    <p:spTree>
+      <p:nvGrpSpPr>
+        <p:cNvPr id="1" name=""/>
+        <p:cNvGrpSpPr/>
+        <p:nvPr/>
+      </p:nvGrpSpPr>
+      <p:grpSpPr>
+        <a:xfrm>
+          <a:off x="0" y="0"/>
+          <a:ext cx="0" cy="0"/>
+          <a:chOff x="0" y="0"/>
+          <a:chExt cx="0" cy="0"/>
+        </a:xfrm>
+      </p:grpSpPr>
+      <p:sp>
+        <p:nvSpPr>
+          <p:cNvPr id="2" name="Title 1">
+            <a:extLst>
+              <a:ext uri="{FF2B5EF4-FFF2-40B4-BE49-F238E27FC236}">
+                <a16:creationId xmlns:a16="http://schemas.microsoft.com/office/drawing/2014/main" id="{D9AF706D-06D8-E545-B819-BF81D256C7CE}"/>
+              </a:ext>
+            </a:extLst>
+          </p:cNvPr>
+          <p:cNvSpPr>
+            <a:spLocks noGrp="1"/>
+          </p:cNvSpPr>
+          <p:nvPr>
+            <p:ph type="title"/>
+          </p:nvPr>
+        </p:nvSpPr>
+        <p:spPr/>
+        <p:txBody>
+          <a:bodyPr/>
+          <a:lstStyle/>
+          <a:p>
+            <a:r>
+              <a:rPr lang="en-US" dirty="0"/>
               <a:t>Do While Loop</a:t>
             </a:r>
           </a:p>
@@ -12064,35 +15209,7 @@
                 <a:latin typeface="Consolas" panose="020B0609020204030204" pitchFamily="49" charset="0"/>
                 <a:cs typeface="Consolas" panose="020B0609020204030204" pitchFamily="49" charset="0"/>
               </a:rPr>
-              <a:t>Scanner </a:t>
-            </a:r>
-            <a:r>
-              <a:rPr lang="en-US" sz="1600" dirty="0" err="1">
-                <a:latin typeface="Consolas" panose="020B0609020204030204" pitchFamily="49" charset="0"/>
-                <a:cs typeface="Consolas" panose="020B0609020204030204" pitchFamily="49" charset="0"/>
-              </a:rPr>
-              <a:t>scnr</a:t>
-            </a:r>
-            <a:r>
-              <a:rPr lang="en-US" sz="1600" dirty="0">
-                <a:latin typeface="Consolas" panose="020B0609020204030204" pitchFamily="49" charset="0"/>
-                <a:cs typeface="Consolas" panose="020B0609020204030204" pitchFamily="49" charset="0"/>
-              </a:rPr>
-              <a:t> = new Scanner(</a:t>
-            </a:r>
-            <a:r>
-              <a:rPr lang="en-US" sz="1600" dirty="0" err="1">
-                <a:latin typeface="Consolas" panose="020B0609020204030204" pitchFamily="49" charset="0"/>
-                <a:cs typeface="Consolas" panose="020B0609020204030204" pitchFamily="49" charset="0"/>
-              </a:rPr>
-              <a:t>System.in</a:t>
-            </a:r>
-            <a:r>
-              <a:rPr lang="en-US" sz="1600" dirty="0">
-                <a:latin typeface="Consolas" panose="020B0609020204030204" pitchFamily="49" charset="0"/>
-                <a:cs typeface="Consolas" panose="020B0609020204030204" pitchFamily="49" charset="0"/>
-              </a:rPr>
-              <a:t>);</a:t>
+              <a:t>Scanner scnr = new Scanner(System.in);</a:t>
             </a:r>
           </a:p>
           <a:p>
@@ -12416,7 +15533,7 @@
 </p:sld>
 </file>
 
-<file path=ppt/slides/slide6.xml><?xml version="1.0" encoding="utf-8"?>
+<file path=ppt/slides/slide9.xml><?xml version="1.0" encoding="utf-8"?>
 <p:sld xmlns:a="http://schemas.openxmlformats.org/drawingml/2006/main" xmlns:r="http://schemas.openxmlformats.org/officeDocument/2006/relationships" xmlns:p="http://schemas.openxmlformats.org/presentationml/2006/main">
   <p:cSld>
     <p:spTree>
@@ -12438,7 +15555,7 @@
           <p:cNvPr id="2" name="Title 1">
             <a:extLst>
               <a:ext uri="{FF2B5EF4-FFF2-40B4-BE49-F238E27FC236}">
-                <a16:creationId xmlns:a16="http://schemas.microsoft.com/office/drawing/2014/main" id="{539AA6FB-C635-3F4C-A3B8-64514A3441C6}"/>
+                <a16:creationId xmlns:a16="http://schemas.microsoft.com/office/drawing/2014/main" id="{D9AF706D-06D8-E545-B819-BF81D256C7CE}"/>
               </a:ext>
             </a:extLst>
           </p:cNvPr>
@@ -12456,7 +15573,7 @@
           <a:p>
             <a:r>
               <a:rPr lang="en-US" dirty="0"/>
-              <a:t>Changing loop order: Break / Continue</a:t>
+              <a:t>Practice 2 – Group Programing</a:t>
             </a:r>
           </a:p>
         </p:txBody>
@@ -12466,7 +15583,7 @@
           <p:cNvPr id="3" name="Text Placeholder 2">
             <a:extLst>
               <a:ext uri="{FF2B5EF4-FFF2-40B4-BE49-F238E27FC236}">
-                <a16:creationId xmlns:a16="http://schemas.microsoft.com/office/drawing/2014/main" id="{9EBD3E95-5EDA-0C42-8688-123BE37EC608}"/>
+                <a16:creationId xmlns:a16="http://schemas.microsoft.com/office/drawing/2014/main" id="{A532DEDA-9414-0A41-B377-DBD94A1F0E75}"/>
               </a:ext>
             </a:extLst>
           </p:cNvPr>
@@ -12479,8 +15596,8 @@
         </p:nvSpPr>
         <p:spPr>
           <a:xfrm>
-            <a:off x="628075" y="1776682"/>
-            <a:ext cx="6644263" cy="2295255"/>
+            <a:off x="628075" y="1776683"/>
+            <a:ext cx="11312287" cy="1786386"/>
           </a:xfrm>
         </p:spPr>
         <p:txBody>
@@ -12489,340 +15606,24 @@
           <a:p>
             <a:r>
               <a:rPr lang="en-US" dirty="0"/>
-              <a:t>break</a:t>
-            </a:r>
-          </a:p>
-          <a:p>
-            <a:pPr lvl="1"/>
+              <a:t>Write a method that continues to prompt a user to enter a number in the following interval [1;12]. When the user type a correct number</a:t>
+            </a:r>
+            <a:r>
+              <a:rPr lang="en-US"/>
+              <a:t>, return </a:t>
+            </a:r>
             <a:r>
               <a:rPr lang="en-US" dirty="0"/>
-              <a:t>allows to break out of the loop completely (early exit)</a:t>
-            </a:r>
+              <a:t>that number.</a:t>
+            </a:r>
+          </a:p>
+          <a:p>
+            <a:endParaRPr lang="en-US" dirty="0"/>
           </a:p>
           <a:p>
             <a:r>
               <a:rPr lang="en-US" dirty="0"/>
-              <a:t>continue</a:t>
-            </a:r>
-          </a:p>
-          <a:p>
-            <a:pPr lvl="1"/>
-            <a:r>
-              <a:rPr lang="en-US" dirty="0"/>
-              <a:t>allows us to move back to the top of the code block</a:t>
-            </a:r>
-          </a:p>
-          <a:p>
-            <a:pPr lvl="1"/>
-            <a:r>
-              <a:rPr lang="en-US" dirty="0"/>
-              <a:t>with for loop, the incrementor is still completed</a:t>
-            </a:r>
-          </a:p>
-        </p:txBody>
-      </p:sp>
-      <p:sp>
-        <p:nvSpPr>
-          <p:cNvPr id="4" name="TextBox 3">
-            <a:extLst>
-              <a:ext uri="{FF2B5EF4-FFF2-40B4-BE49-F238E27FC236}">
-                <a16:creationId xmlns:a16="http://schemas.microsoft.com/office/drawing/2014/main" id="{F4C21DEF-FFE6-7846-8B15-F8294C302A46}"/>
-              </a:ext>
-            </a:extLst>
-          </p:cNvPr>
-          <p:cNvSpPr txBox="1"/>
-          <p:nvPr/>
-        </p:nvSpPr>
-        <p:spPr>
-          <a:xfrm>
-            <a:off x="7873297" y="2282784"/>
-            <a:ext cx="4921953" cy="1077218"/>
-          </a:xfrm>
-          <a:prstGeom prst="rect">
-            <a:avLst/>
-          </a:prstGeom>
-          <a:solidFill>
-            <a:schemeClr val="bg2"/>
-          </a:solidFill>
-        </p:spPr>
-        <p:txBody>
-          <a:bodyPr wrap="square" rtlCol="0">
-            <a:spAutoFit/>
-          </a:bodyPr>
-          <a:lstStyle/>
-          <a:p>
-            <a:r>
-              <a:rPr lang="en-US" sz="1600" dirty="0">
-                <a:latin typeface="Consolas" panose="020B0609020204030204" pitchFamily="49" charset="0"/>
-                <a:cs typeface="Consolas" panose="020B0609020204030204" pitchFamily="49" charset="0"/>
-              </a:rPr>
-              <a:t>for(int x =  0; x &lt; 100; x++) {</a:t>
-            </a:r>
-          </a:p>
-          <a:p>
-            <a:r>
-              <a:rPr lang="en-US" sz="1600" dirty="0">
-                <a:latin typeface="Consolas" panose="020B0609020204030204" pitchFamily="49" charset="0"/>
-                <a:cs typeface="Consolas" panose="020B0609020204030204" pitchFamily="49" charset="0"/>
-              </a:rPr>
-              <a:t>   if(x == 10) </a:t>
-            </a:r>
-            <a:r>
-              <a:rPr lang="en-US" sz="1600" b="1" dirty="0">
-                <a:latin typeface="Consolas" panose="020B0609020204030204" pitchFamily="49" charset="0"/>
-                <a:cs typeface="Consolas" panose="020B0609020204030204" pitchFamily="49" charset="0"/>
-              </a:rPr>
-              <a:t>break</a:t>
-            </a:r>
-            <a:r>
-              <a:rPr lang="en-US" sz="1600" dirty="0">
-                <a:latin typeface="Consolas" panose="020B0609020204030204" pitchFamily="49" charset="0"/>
-                <a:cs typeface="Consolas" panose="020B0609020204030204" pitchFamily="49" charset="0"/>
-              </a:rPr>
-              <a:t>;</a:t>
-            </a:r>
-          </a:p>
-          <a:p>
-            <a:r>
-              <a:rPr lang="en-US" sz="1600" dirty="0">
-                <a:latin typeface="Consolas" panose="020B0609020204030204" pitchFamily="49" charset="0"/>
-                <a:cs typeface="Consolas" panose="020B0609020204030204" pitchFamily="49" charset="0"/>
-              </a:rPr>
-              <a:t>   </a:t>
-            </a:r>
-            <a:r>
-              <a:rPr lang="en-US" sz="1600" dirty="0" err="1">
-                <a:latin typeface="Consolas" panose="020B0609020204030204" pitchFamily="49" charset="0"/>
-                <a:cs typeface="Consolas" panose="020B0609020204030204" pitchFamily="49" charset="0"/>
-              </a:rPr>
-              <a:t>System.out.print</a:t>
-            </a:r>
-            <a:r>
-              <a:rPr lang="en-US" sz="1600" dirty="0">
-                <a:latin typeface="Consolas" panose="020B0609020204030204" pitchFamily="49" charset="0"/>
-                <a:cs typeface="Consolas" panose="020B0609020204030204" pitchFamily="49" charset="0"/>
-              </a:rPr>
-              <a:t>(x);</a:t>
-            </a:r>
-          </a:p>
-          <a:p>
-            <a:r>
-              <a:rPr lang="en-US" sz="1600" dirty="0">
-                <a:latin typeface="Consolas" panose="020B0609020204030204" pitchFamily="49" charset="0"/>
-                <a:cs typeface="Consolas" panose="020B0609020204030204" pitchFamily="49" charset="0"/>
-              </a:rPr>
-              <a:t>}</a:t>
-            </a:r>
-          </a:p>
-        </p:txBody>
-      </p:sp>
-      <p:sp>
-        <p:nvSpPr>
-          <p:cNvPr id="5" name="Snip Single Corner Rectangle 4">
-            <a:extLst>
-              <a:ext uri="{FF2B5EF4-FFF2-40B4-BE49-F238E27FC236}">
-                <a16:creationId xmlns:a16="http://schemas.microsoft.com/office/drawing/2014/main" id="{18A788EF-078B-C547-81F9-CA02C1169A20}"/>
-              </a:ext>
-            </a:extLst>
-          </p:cNvPr>
-          <p:cNvSpPr/>
-          <p:nvPr/>
-        </p:nvSpPr>
-        <p:spPr>
-          <a:xfrm>
-            <a:off x="8441179" y="3536126"/>
-            <a:ext cx="3786188" cy="700088"/>
-          </a:xfrm>
-          <a:prstGeom prst="snip1Rect">
-            <a:avLst/>
-          </a:prstGeom>
-          <a:solidFill>
-            <a:schemeClr val="tx2"/>
-          </a:solidFill>
-          <a:ln>
-            <a:noFill/>
-          </a:ln>
-          <a:effectLst/>
-        </p:spPr>
-        <p:style>
-          <a:lnRef idx="1">
-            <a:schemeClr val="accent1"/>
-          </a:lnRef>
-          <a:fillRef idx="3">
-            <a:schemeClr val="accent1"/>
-          </a:fillRef>
-          <a:effectRef idx="2">
-            <a:schemeClr val="accent1"/>
-          </a:effectRef>
-          <a:fontRef idx="minor">
-            <a:schemeClr val="lt1"/>
-          </a:fontRef>
-        </p:style>
-        <p:txBody>
-          <a:bodyPr lIns="274320" tIns="182880" rIns="274320" bIns="182880" rtlCol="0" anchor="ctr"/>
-          <a:lstStyle/>
-          <a:p>
-            <a:pPr algn="ctr"/>
-            <a:r>
-              <a:rPr lang="en-US" dirty="0">
-                <a:latin typeface="Proxima Nova" charset="0"/>
-                <a:ea typeface="Proxima Nova" charset="0"/>
-                <a:cs typeface="Proxima Nova" charset="0"/>
-              </a:rPr>
-              <a:t>0123456789</a:t>
-            </a:r>
-          </a:p>
-        </p:txBody>
-      </p:sp>
-      <p:sp>
-        <p:nvSpPr>
-          <p:cNvPr id="6" name="TextBox 5">
-            <a:extLst>
-              <a:ext uri="{FF2B5EF4-FFF2-40B4-BE49-F238E27FC236}">
-                <a16:creationId xmlns:a16="http://schemas.microsoft.com/office/drawing/2014/main" id="{4F117C7A-5AD9-BB42-AC66-5DEA244CC162}"/>
-              </a:ext>
-            </a:extLst>
-          </p:cNvPr>
-          <p:cNvSpPr txBox="1"/>
-          <p:nvPr/>
-        </p:nvSpPr>
-        <p:spPr>
-          <a:xfrm>
-            <a:off x="1489229" y="4997409"/>
-            <a:ext cx="4921953" cy="1077218"/>
-          </a:xfrm>
-          <a:prstGeom prst="rect">
-            <a:avLst/>
-          </a:prstGeom>
-          <a:solidFill>
-            <a:schemeClr val="bg2"/>
-          </a:solidFill>
-        </p:spPr>
-        <p:txBody>
-          <a:bodyPr wrap="square" rtlCol="0">
-            <a:spAutoFit/>
-          </a:bodyPr>
-          <a:lstStyle/>
-          <a:p>
-            <a:r>
-              <a:rPr lang="en-US" sz="1600" dirty="0">
-                <a:latin typeface="Consolas" panose="020B0609020204030204" pitchFamily="49" charset="0"/>
-                <a:cs typeface="Consolas" panose="020B0609020204030204" pitchFamily="49" charset="0"/>
-              </a:rPr>
-              <a:t>for(int x =  1; x &lt; 10; x++) {</a:t>
-            </a:r>
-          </a:p>
-          <a:p>
-            <a:r>
-              <a:rPr lang="en-US" sz="1600" dirty="0">
-                <a:latin typeface="Consolas" panose="020B0609020204030204" pitchFamily="49" charset="0"/>
-                <a:cs typeface="Consolas" panose="020B0609020204030204" pitchFamily="49" charset="0"/>
-              </a:rPr>
-              <a:t>   if(x%2 == 0) </a:t>
-            </a:r>
-            <a:r>
-              <a:rPr lang="en-US" sz="1600" b="1" dirty="0">
-                <a:latin typeface="Consolas" panose="020B0609020204030204" pitchFamily="49" charset="0"/>
-                <a:cs typeface="Consolas" panose="020B0609020204030204" pitchFamily="49" charset="0"/>
-              </a:rPr>
-              <a:t>continue</a:t>
-            </a:r>
-            <a:r>
-              <a:rPr lang="en-US" sz="1600" dirty="0">
-                <a:latin typeface="Consolas" panose="020B0609020204030204" pitchFamily="49" charset="0"/>
-                <a:cs typeface="Consolas" panose="020B0609020204030204" pitchFamily="49" charset="0"/>
-              </a:rPr>
-              <a:t>;</a:t>
-            </a:r>
-          </a:p>
-          <a:p>
-            <a:r>
-              <a:rPr lang="en-US" sz="1600" dirty="0">
-                <a:latin typeface="Consolas" panose="020B0609020204030204" pitchFamily="49" charset="0"/>
-                <a:cs typeface="Consolas" panose="020B0609020204030204" pitchFamily="49" charset="0"/>
-              </a:rPr>
-              <a:t>   </a:t>
-            </a:r>
-            <a:r>
-              <a:rPr lang="en-US" sz="1600" dirty="0" err="1">
-                <a:latin typeface="Consolas" panose="020B0609020204030204" pitchFamily="49" charset="0"/>
-                <a:cs typeface="Consolas" panose="020B0609020204030204" pitchFamily="49" charset="0"/>
-              </a:rPr>
-              <a:t>System.out.print</a:t>
-            </a:r>
-            <a:r>
-              <a:rPr lang="en-US" sz="1600" dirty="0">
-                <a:latin typeface="Consolas" panose="020B0609020204030204" pitchFamily="49" charset="0"/>
-                <a:cs typeface="Consolas" panose="020B0609020204030204" pitchFamily="49" charset="0"/>
-              </a:rPr>
-              <a:t>(x);</a:t>
-            </a:r>
-          </a:p>
-          <a:p>
-            <a:r>
-              <a:rPr lang="en-US" sz="1600" dirty="0">
-                <a:latin typeface="Consolas" panose="020B0609020204030204" pitchFamily="49" charset="0"/>
-                <a:cs typeface="Consolas" panose="020B0609020204030204" pitchFamily="49" charset="0"/>
-              </a:rPr>
-              <a:t>}</a:t>
-            </a:r>
-          </a:p>
-        </p:txBody>
-      </p:sp>
-      <p:sp>
-        <p:nvSpPr>
-          <p:cNvPr id="7" name="Snip Single Corner Rectangle 6">
-            <a:extLst>
-              <a:ext uri="{FF2B5EF4-FFF2-40B4-BE49-F238E27FC236}">
-                <a16:creationId xmlns:a16="http://schemas.microsoft.com/office/drawing/2014/main" id="{9B78E545-AACE-F448-BFEE-45B3ADEE260E}"/>
-              </a:ext>
-            </a:extLst>
-          </p:cNvPr>
-          <p:cNvSpPr/>
-          <p:nvPr/>
-        </p:nvSpPr>
-        <p:spPr>
-          <a:xfrm>
-            <a:off x="2057111" y="6300011"/>
-            <a:ext cx="3786188" cy="700088"/>
-          </a:xfrm>
-          <a:prstGeom prst="snip1Rect">
-            <a:avLst/>
-          </a:prstGeom>
-          <a:solidFill>
-            <a:schemeClr val="tx2"/>
-          </a:solidFill>
-          <a:ln>
-            <a:noFill/>
-          </a:ln>
-          <a:effectLst/>
-        </p:spPr>
-        <p:style>
-          <a:lnRef idx="1">
-            <a:schemeClr val="accent1"/>
-          </a:lnRef>
-          <a:fillRef idx="3">
-            <a:schemeClr val="accent1"/>
-          </a:fillRef>
-          <a:effectRef idx="2">
-            <a:schemeClr val="accent1"/>
-          </a:effectRef>
-          <a:fontRef idx="minor">
-            <a:schemeClr val="lt1"/>
-          </a:fontRef>
-        </p:style>
-        <p:txBody>
-          <a:bodyPr lIns="274320" tIns="182880" rIns="274320" bIns="182880" rtlCol="0" anchor="ctr"/>
-          <a:lstStyle/>
-          <a:p>
-            <a:pPr algn="ctr"/>
-            <a:r>
-              <a:rPr lang="en-US" dirty="0">
-                <a:latin typeface="Proxima Nova" charset="0"/>
-                <a:ea typeface="Proxima Nova" charset="0"/>
-                <a:cs typeface="Proxima Nova" charset="0"/>
-              </a:rPr>
-              <a:t>13579</a:t>
+              <a:t>Which loop kind of loop are you thinking of using?</a:t>
             </a:r>
           </a:p>
         </p:txBody>
@@ -12830,7 +15631,7 @@
     </p:spTree>
     <p:extLst>
       <p:ext uri="{BB962C8B-B14F-4D97-AF65-F5344CB8AC3E}">
-        <p14:creationId xmlns:p14="http://schemas.microsoft.com/office/powerpoint/2010/main" val="4081044051"/>
+        <p14:creationId xmlns:p14="http://schemas.microsoft.com/office/powerpoint/2010/main" val="2860398301"/>
       </p:ext>
     </p:extLst>
   </p:cSld>
@@ -12849,254 +15650,6 @@
       </p:transition>
     </mc:Fallback>
   </mc:AlternateContent>
-  <p:timing>
-    <p:tnLst>
-      <p:par>
-        <p:cTn id="1" dur="indefinite" restart="never" nodeType="tmRoot">
-          <p:childTnLst>
-            <p:seq concurrent="1" nextAc="seek">
-              <p:cTn id="2" dur="indefinite" nodeType="mainSeq">
-                <p:childTnLst>
-                  <p:par>
-                    <p:cTn id="3" fill="hold">
-                      <p:stCondLst>
-                        <p:cond delay="indefinite"/>
-                      </p:stCondLst>
-                      <p:childTnLst>
-                        <p:par>
-                          <p:cTn id="4" fill="hold">
-                            <p:stCondLst>
-                              <p:cond delay="0"/>
-                            </p:stCondLst>
-                            <p:childTnLst>
-                              <p:par>
-                                <p:cTn id="5" presetID="9" presetClass="entr" presetSubtype="0" fill="hold" grpId="0" nodeType="clickEffect">
-                                  <p:stCondLst>
-                                    <p:cond delay="0"/>
-                                  </p:stCondLst>
-                                  <p:childTnLst>
-                                    <p:set>
-                                      <p:cBhvr>
-                                        <p:cTn id="6" dur="1" fill="hold">
-                                          <p:stCondLst>
-                                            <p:cond delay="0"/>
-                                          </p:stCondLst>
-                                        </p:cTn>
-                                        <p:tgtEl>
-                                          <p:spTgt spid="4"/>
-                                        </p:tgtEl>
-                                        <p:attrNameLst>
-                                          <p:attrName>style.visibility</p:attrName>
-                                        </p:attrNameLst>
-                                      </p:cBhvr>
-                                      <p:to>
-                                        <p:strVal val="visible"/>
-                                      </p:to>
-                                    </p:set>
-                                    <p:animEffect transition="in" filter="dissolve">
-                                      <p:cBhvr>
-                                        <p:cTn id="7" dur="500"/>
-                                        <p:tgtEl>
-                                          <p:spTgt spid="4"/>
-                                        </p:tgtEl>
-                                      </p:cBhvr>
-                                    </p:animEffect>
-                                  </p:childTnLst>
-                                </p:cTn>
-                              </p:par>
-                            </p:childTnLst>
-                          </p:cTn>
-                        </p:par>
-                      </p:childTnLst>
-                    </p:cTn>
-                  </p:par>
-                  <p:par>
-                    <p:cTn id="8" fill="hold">
-                      <p:stCondLst>
-                        <p:cond delay="indefinite"/>
-                      </p:stCondLst>
-                      <p:childTnLst>
-                        <p:par>
-                          <p:cTn id="9" fill="hold">
-                            <p:stCondLst>
-                              <p:cond delay="0"/>
-                            </p:stCondLst>
-                            <p:childTnLst>
-                              <p:par>
-                                <p:cTn id="10" presetID="9" presetClass="entr" presetSubtype="0" fill="hold" grpId="0" nodeType="clickEffect">
-                                  <p:stCondLst>
-                                    <p:cond delay="0"/>
-                                  </p:stCondLst>
-                                  <p:childTnLst>
-                                    <p:set>
-                                      <p:cBhvr>
-                                        <p:cTn id="11" dur="1" fill="hold">
-                                          <p:stCondLst>
-                                            <p:cond delay="0"/>
-                                          </p:stCondLst>
-                                        </p:cTn>
-                                        <p:tgtEl>
-                                          <p:spTgt spid="5"/>
-                                        </p:tgtEl>
-                                        <p:attrNameLst>
-                                          <p:attrName>style.visibility</p:attrName>
-                                        </p:attrNameLst>
-                                      </p:cBhvr>
-                                      <p:to>
-                                        <p:strVal val="visible"/>
-                                      </p:to>
-                                    </p:set>
-                                    <p:animEffect transition="in" filter="dissolve">
-                                      <p:cBhvr>
-                                        <p:cTn id="12" dur="500"/>
-                                        <p:tgtEl>
-                                          <p:spTgt spid="5"/>
-                                        </p:tgtEl>
-                                      </p:cBhvr>
-                                    </p:animEffect>
-                                  </p:childTnLst>
-                                </p:cTn>
-                              </p:par>
-                            </p:childTnLst>
-                          </p:cTn>
-                        </p:par>
-                      </p:childTnLst>
-                    </p:cTn>
-                  </p:par>
-                  <p:par>
-                    <p:cTn id="13" fill="hold">
-                      <p:stCondLst>
-                        <p:cond delay="indefinite"/>
-                      </p:stCondLst>
-                      <p:childTnLst>
-                        <p:par>
-                          <p:cTn id="14" fill="hold">
-                            <p:stCondLst>
-                              <p:cond delay="0"/>
-                            </p:stCondLst>
-                            <p:childTnLst>
-                              <p:par>
-                                <p:cTn id="15" presetID="9" presetClass="entr" presetSubtype="0" fill="hold" grpId="0" nodeType="clickEffect">
-                                  <p:stCondLst>
-                                    <p:cond delay="0"/>
-                                  </p:stCondLst>
-                                  <p:childTnLst>
-                                    <p:set>
-                                      <p:cBhvr>
-                                        <p:cTn id="16" dur="1" fill="hold">
-                                          <p:stCondLst>
-                                            <p:cond delay="0"/>
-                                          </p:stCondLst>
-                                        </p:cTn>
-                                        <p:tgtEl>
-                                          <p:spTgt spid="6"/>
-                                        </p:tgtEl>
-                                        <p:attrNameLst>
-                                          <p:attrName>style.visibility</p:attrName>
-                                        </p:attrNameLst>
-                                      </p:cBhvr>
-                                      <p:to>
-                                        <p:strVal val="visible"/>
-                                      </p:to>
-                                    </p:set>
-                                    <p:animEffect transition="in" filter="dissolve">
-                                      <p:cBhvr>
-                                        <p:cTn id="17" dur="500"/>
-                                        <p:tgtEl>
-                                          <p:spTgt spid="6"/>
-                                        </p:tgtEl>
-                                      </p:cBhvr>
-                                    </p:animEffect>
-                                  </p:childTnLst>
-                                </p:cTn>
-                              </p:par>
-                            </p:childTnLst>
-                          </p:cTn>
-                        </p:par>
-                      </p:childTnLst>
-                    </p:cTn>
-                  </p:par>
-                  <p:par>
-                    <p:cTn id="18" fill="hold">
-                      <p:stCondLst>
-                        <p:cond delay="indefinite"/>
-                      </p:stCondLst>
-                      <p:childTnLst>
-                        <p:par>
-                          <p:cTn id="19" fill="hold">
-                            <p:stCondLst>
-                              <p:cond delay="0"/>
-                            </p:stCondLst>
-                            <p:childTnLst>
-                              <p:par>
-                                <p:cTn id="20" presetID="9" presetClass="entr" presetSubtype="0" fill="hold" grpId="0" nodeType="clickEffect">
-                                  <p:stCondLst>
-                                    <p:cond delay="0"/>
-                                  </p:stCondLst>
-                                  <p:childTnLst>
-                                    <p:set>
-                                      <p:cBhvr>
-                                        <p:cTn id="21" dur="1" fill="hold">
-                                          <p:stCondLst>
-                                            <p:cond delay="0"/>
-                                          </p:stCondLst>
-                                        </p:cTn>
-                                        <p:tgtEl>
-                                          <p:spTgt spid="7"/>
-                                        </p:tgtEl>
-                                        <p:attrNameLst>
-                                          <p:attrName>style.visibility</p:attrName>
-                                        </p:attrNameLst>
-                                      </p:cBhvr>
-                                      <p:to>
-                                        <p:strVal val="visible"/>
-                                      </p:to>
-                                    </p:set>
-                                    <p:animEffect transition="in" filter="dissolve">
-                                      <p:cBhvr>
-                                        <p:cTn id="22" dur="500"/>
-                                        <p:tgtEl>
-                                          <p:spTgt spid="7"/>
-                                        </p:tgtEl>
-                                      </p:cBhvr>
-                                    </p:animEffect>
-                                  </p:childTnLst>
-                                </p:cTn>
-                              </p:par>
-                            </p:childTnLst>
-                          </p:cTn>
-                        </p:par>
-                      </p:childTnLst>
-                    </p:cTn>
-                  </p:par>
-                </p:childTnLst>
-              </p:cTn>
-              <p:prevCondLst>
-                <p:cond evt="onPrev" delay="0">
-                  <p:tgtEl>
-                    <p:sldTgt/>
-                  </p:tgtEl>
-                </p:cond>
-              </p:prevCondLst>
-              <p:nextCondLst>
-                <p:cond evt="onNext" delay="0">
-                  <p:tgtEl>
-                    <p:sldTgt/>
-                  </p:tgtEl>
-                </p:cond>
-              </p:nextCondLst>
-            </p:seq>
-          </p:childTnLst>
-        </p:cTn>
-      </p:par>
-    </p:tnLst>
-    <p:bldLst>
-      <p:bldP spid="4" grpId="0" animBg="1"/>
-      <p:bldP spid="5" grpId="0" animBg="1"/>
-      <p:bldP spid="6" grpId="0" animBg="1"/>
-      <p:bldP spid="7" grpId="0" animBg="1"/>
-    </p:bldLst>
-  </p:timing>
 </p:sld>
 </file>
 

</xml_diff>

<commit_message>
typo fix, added announcements.
</commit_message>
<xml_diff>
--- a/slides/On-Campus/06_02_MoreLoops.pptx
+++ b/slides/On-Campus/06_02_MoreLoops.pptx
@@ -5,22 +5,23 @@
     <p:sldMasterId id="2147483648" r:id="rId1"/>
   </p:sldMasterIdLst>
   <p:notesMasterIdLst>
-    <p:notesMasterId r:id="rId12"/>
+    <p:notesMasterId r:id="rId13"/>
   </p:notesMasterIdLst>
   <p:handoutMasterIdLst>
-    <p:handoutMasterId r:id="rId13"/>
+    <p:handoutMasterId r:id="rId14"/>
   </p:handoutMasterIdLst>
   <p:sldIdLst>
     <p:sldId id="256" r:id="rId2"/>
-    <p:sldId id="257" r:id="rId3"/>
-    <p:sldId id="258" r:id="rId4"/>
-    <p:sldId id="262" r:id="rId5"/>
-    <p:sldId id="263" r:id="rId6"/>
-    <p:sldId id="259" r:id="rId7"/>
-    <p:sldId id="264" r:id="rId8"/>
-    <p:sldId id="260" r:id="rId9"/>
-    <p:sldId id="265" r:id="rId10"/>
-    <p:sldId id="261" r:id="rId11"/>
+    <p:sldId id="266" r:id="rId3"/>
+    <p:sldId id="257" r:id="rId4"/>
+    <p:sldId id="258" r:id="rId5"/>
+    <p:sldId id="262" r:id="rId6"/>
+    <p:sldId id="263" r:id="rId7"/>
+    <p:sldId id="259" r:id="rId8"/>
+    <p:sldId id="264" r:id="rId9"/>
+    <p:sldId id="260" r:id="rId10"/>
+    <p:sldId id="265" r:id="rId11"/>
+    <p:sldId id="261" r:id="rId12"/>
   </p:sldIdLst>
   <p:sldSz cx="13817600" cy="7772400"/>
   <p:notesSz cx="6858000" cy="9144000"/>
@@ -525,7 +526,7 @@
           <a:p>
             <a:fld id="{4D7E51A5-B478-1E40-8CBB-0DAA8831E99D}" type="datetimeFigureOut">
               <a:rPr lang="en-US" smtClean="0"/>
-              <a:t>9/27/2021</a:t>
+              <a:t>9/28/2021</a:t>
             </a:fld>
             <a:endParaRPr lang="en-US"/>
           </a:p>
@@ -690,7 +691,7 @@
           <a:p>
             <a:fld id="{D0ED587F-861E-6740-9643-E3DDAE89B8D6}" type="datetimeFigureOut">
               <a:rPr lang="en-US" smtClean="0"/>
-              <a:t>9/27/2021</a:t>
+              <a:t>9/28/2021</a:t>
             </a:fld>
             <a:endParaRPr lang="en-US"/>
           </a:p>
@@ -4317,6 +4318,602 @@
 </p:sldLayout>
 </file>
 
+<file path=ppt/slideLayouts/slideLayout25.xml><?xml version="1.0" encoding="utf-8"?>
+<p:sldLayout xmlns:a="http://schemas.openxmlformats.org/drawingml/2006/main" xmlns:r="http://schemas.openxmlformats.org/officeDocument/2006/relationships" xmlns:p="http://schemas.openxmlformats.org/presentationml/2006/main" matchingName="Title and Content">
+  <p:cSld name="1_Title and Content">
+    <p:spTree>
+      <p:nvGrpSpPr>
+        <p:cNvPr id="1" name="Shape 53"/>
+        <p:cNvGrpSpPr/>
+        <p:nvPr/>
+      </p:nvGrpSpPr>
+      <p:grpSpPr>
+        <a:xfrm>
+          <a:off x="0" y="0"/>
+          <a:ext cx="0" cy="0"/>
+          <a:chOff x="0" y="0"/>
+          <a:chExt cx="0" cy="0"/>
+        </a:xfrm>
+      </p:grpSpPr>
+      <p:grpSp>
+        <p:nvGrpSpPr>
+          <p:cNvPr id="54" name="Google Shape;54;p14"/>
+          <p:cNvGrpSpPr/>
+          <p:nvPr/>
+        </p:nvGrpSpPr>
+        <p:grpSpPr>
+          <a:xfrm>
+            <a:off x="0" y="7372875"/>
+            <a:ext cx="13849756" cy="400074"/>
+            <a:chOff x="0" y="7372350"/>
+            <a:chExt cx="13817700" cy="400053"/>
+          </a:xfrm>
+        </p:grpSpPr>
+        <p:sp>
+          <p:nvSpPr>
+            <p:cNvPr id="55" name="Google Shape;55;p14"/>
+            <p:cNvSpPr/>
+            <p:nvPr/>
+          </p:nvSpPr>
+          <p:spPr>
+            <a:xfrm>
+              <a:off x="0" y="7372350"/>
+              <a:ext cx="13817700" cy="399900"/>
+            </a:xfrm>
+            <a:prstGeom prst="rect">
+              <a:avLst/>
+            </a:prstGeom>
+            <a:solidFill>
+              <a:schemeClr val="dk2"/>
+            </a:solidFill>
+            <a:ln>
+              <a:noFill/>
+            </a:ln>
+          </p:spPr>
+          <p:txBody>
+            <a:bodyPr spcFirstLastPara="1" wrap="square" lIns="60500" tIns="30250" rIns="60500" bIns="30250" anchor="ctr" anchorCtr="0">
+              <a:noAutofit/>
+            </a:bodyPr>
+            <a:lstStyle/>
+            <a:p>
+              <a:pPr marL="0" marR="0" lvl="0" indent="0" algn="ctr" rtl="0">
+                <a:spcBef>
+                  <a:spcPts val="0"/>
+                </a:spcBef>
+                <a:spcAft>
+                  <a:spcPts val="0"/>
+                </a:spcAft>
+                <a:buNone/>
+              </a:pPr>
+              <a:endParaRPr sz="1964" b="0" i="0" u="none" strike="noStrike" cap="none">
+                <a:solidFill>
+                  <a:schemeClr val="lt1"/>
+                </a:solidFill>
+                <a:latin typeface="Arial"/>
+                <a:ea typeface="Arial"/>
+                <a:cs typeface="Arial"/>
+                <a:sym typeface="Arial"/>
+              </a:endParaRPr>
+            </a:p>
+          </p:txBody>
+        </p:sp>
+        <p:pic>
+          <p:nvPicPr>
+            <p:cNvPr id="56" name="Google Shape;56;p14"/>
+            <p:cNvPicPr preferRelativeResize="0"/>
+            <p:nvPr/>
+          </p:nvPicPr>
+          <p:blipFill rotWithShape="1">
+            <a:blip r:embed="rId2">
+              <a:alphaModFix/>
+            </a:blip>
+            <a:srcRect/>
+            <a:stretch/>
+          </p:blipFill>
+          <p:spPr>
+            <a:xfrm>
+              <a:off x="152257" y="7372351"/>
+              <a:ext cx="1788558" cy="400050"/>
+            </a:xfrm>
+            <a:prstGeom prst="rect">
+              <a:avLst/>
+            </a:prstGeom>
+            <a:noFill/>
+            <a:ln>
+              <a:noFill/>
+            </a:ln>
+          </p:spPr>
+        </p:pic>
+        <p:sp>
+          <p:nvSpPr>
+            <p:cNvPr id="57" name="Google Shape;57;p14"/>
+            <p:cNvSpPr/>
+            <p:nvPr/>
+          </p:nvSpPr>
+          <p:spPr>
+            <a:xfrm>
+              <a:off x="0" y="7372351"/>
+              <a:ext cx="13817700" cy="399900"/>
+            </a:xfrm>
+            <a:prstGeom prst="rect">
+              <a:avLst/>
+            </a:prstGeom>
+            <a:solidFill>
+              <a:schemeClr val="dk2"/>
+            </a:solidFill>
+            <a:ln>
+              <a:noFill/>
+            </a:ln>
+          </p:spPr>
+          <p:txBody>
+            <a:bodyPr spcFirstLastPara="1" wrap="square" lIns="60500" tIns="30250" rIns="60500" bIns="30250" anchor="ctr" anchorCtr="0">
+              <a:noAutofit/>
+            </a:bodyPr>
+            <a:lstStyle/>
+            <a:p>
+              <a:pPr marL="0" marR="0" lvl="0" indent="0" algn="ctr" rtl="0">
+                <a:spcBef>
+                  <a:spcPts val="0"/>
+                </a:spcBef>
+                <a:spcAft>
+                  <a:spcPts val="0"/>
+                </a:spcAft>
+                <a:buNone/>
+              </a:pPr>
+              <a:endParaRPr sz="1964" b="0" i="0" u="none" strike="noStrike" cap="none">
+                <a:solidFill>
+                  <a:schemeClr val="lt1"/>
+                </a:solidFill>
+                <a:latin typeface="Arial"/>
+                <a:ea typeface="Arial"/>
+                <a:cs typeface="Arial"/>
+                <a:sym typeface="Arial"/>
+              </a:endParaRPr>
+            </a:p>
+          </p:txBody>
+        </p:sp>
+        <p:pic>
+          <p:nvPicPr>
+            <p:cNvPr id="58" name="Google Shape;58;p14"/>
+            <p:cNvPicPr preferRelativeResize="0"/>
+            <p:nvPr/>
+          </p:nvPicPr>
+          <p:blipFill rotWithShape="1">
+            <a:blip r:embed="rId2">
+              <a:alphaModFix/>
+            </a:blip>
+            <a:srcRect/>
+            <a:stretch/>
+          </p:blipFill>
+          <p:spPr>
+            <a:xfrm>
+              <a:off x="152257" y="7372352"/>
+              <a:ext cx="1788558" cy="400050"/>
+            </a:xfrm>
+            <a:prstGeom prst="rect">
+              <a:avLst/>
+            </a:prstGeom>
+            <a:noFill/>
+            <a:ln>
+              <a:noFill/>
+            </a:ln>
+          </p:spPr>
+        </p:pic>
+      </p:grpSp>
+      <p:sp>
+        <p:nvSpPr>
+          <p:cNvPr id="59" name="Google Shape;59;p14"/>
+          <p:cNvSpPr txBox="1">
+            <a:spLocks noGrp="1"/>
+          </p:cNvSpPr>
+          <p:nvPr>
+            <p:ph type="title"/>
+          </p:nvPr>
+        </p:nvSpPr>
+        <p:spPr>
+          <a:xfrm>
+            <a:off x="628075" y="905258"/>
+            <a:ext cx="12561413" cy="1015467"/>
+          </a:xfrm>
+          <a:prstGeom prst="rect">
+            <a:avLst/>
+          </a:prstGeom>
+          <a:noFill/>
+          <a:ln>
+            <a:noFill/>
+          </a:ln>
+        </p:spPr>
+        <p:txBody>
+          <a:bodyPr spcFirstLastPara="1" wrap="square" lIns="60500" tIns="60500" rIns="60500" bIns="60500" anchor="b" anchorCtr="0">
+            <a:noAutofit/>
+          </a:bodyPr>
+          <a:lstStyle>
+            <a:lvl1pPr marR="0" lvl="0" algn="l" rtl="0">
+              <a:spcBef>
+                <a:spcPts val="0"/>
+              </a:spcBef>
+              <a:spcAft>
+                <a:spcPts val="0"/>
+              </a:spcAft>
+              <a:buClr>
+                <a:schemeClr val="dk2"/>
+              </a:buClr>
+              <a:buSzPts val="3600"/>
+              <a:buFont typeface="Arial"/>
+              <a:buNone/>
+              <a:defRPr sz="5440" b="0" i="0" u="none" strike="noStrike" cap="none">
+                <a:solidFill>
+                  <a:schemeClr val="dk2"/>
+                </a:solidFill>
+                <a:latin typeface="Arial"/>
+                <a:ea typeface="Arial"/>
+                <a:cs typeface="Arial"/>
+                <a:sym typeface="Arial"/>
+              </a:defRPr>
+            </a:lvl1pPr>
+            <a:lvl2pPr lvl="1" rtl="0">
+              <a:spcBef>
+                <a:spcPts val="0"/>
+              </a:spcBef>
+              <a:spcAft>
+                <a:spcPts val="0"/>
+              </a:spcAft>
+              <a:buSzPts val="900"/>
+              <a:buNone/>
+              <a:defRPr sz="1813"/>
+            </a:lvl2pPr>
+            <a:lvl3pPr lvl="2" rtl="0">
+              <a:spcBef>
+                <a:spcPts val="0"/>
+              </a:spcBef>
+              <a:spcAft>
+                <a:spcPts val="0"/>
+              </a:spcAft>
+              <a:buSzPts val="900"/>
+              <a:buNone/>
+              <a:defRPr sz="1813"/>
+            </a:lvl3pPr>
+            <a:lvl4pPr lvl="3" rtl="0">
+              <a:spcBef>
+                <a:spcPts val="0"/>
+              </a:spcBef>
+              <a:spcAft>
+                <a:spcPts val="0"/>
+              </a:spcAft>
+              <a:buSzPts val="900"/>
+              <a:buNone/>
+              <a:defRPr sz="1813"/>
+            </a:lvl4pPr>
+            <a:lvl5pPr lvl="4" rtl="0">
+              <a:spcBef>
+                <a:spcPts val="0"/>
+              </a:spcBef>
+              <a:spcAft>
+                <a:spcPts val="0"/>
+              </a:spcAft>
+              <a:buSzPts val="900"/>
+              <a:buNone/>
+              <a:defRPr sz="1813"/>
+            </a:lvl5pPr>
+            <a:lvl6pPr lvl="5" rtl="0">
+              <a:spcBef>
+                <a:spcPts val="0"/>
+              </a:spcBef>
+              <a:spcAft>
+                <a:spcPts val="0"/>
+              </a:spcAft>
+              <a:buSzPts val="900"/>
+              <a:buNone/>
+              <a:defRPr sz="1813"/>
+            </a:lvl6pPr>
+            <a:lvl7pPr lvl="6" rtl="0">
+              <a:spcBef>
+                <a:spcPts val="0"/>
+              </a:spcBef>
+              <a:spcAft>
+                <a:spcPts val="0"/>
+              </a:spcAft>
+              <a:buSzPts val="900"/>
+              <a:buNone/>
+              <a:defRPr sz="1813"/>
+            </a:lvl7pPr>
+            <a:lvl8pPr lvl="7" rtl="0">
+              <a:spcBef>
+                <a:spcPts val="0"/>
+              </a:spcBef>
+              <a:spcAft>
+                <a:spcPts val="0"/>
+              </a:spcAft>
+              <a:buSzPts val="900"/>
+              <a:buNone/>
+              <a:defRPr sz="1813"/>
+            </a:lvl8pPr>
+            <a:lvl9pPr lvl="8" rtl="0">
+              <a:spcBef>
+                <a:spcPts val="0"/>
+              </a:spcBef>
+              <a:spcAft>
+                <a:spcPts val="0"/>
+              </a:spcAft>
+              <a:buSzPts val="900"/>
+              <a:buNone/>
+              <a:defRPr sz="1813"/>
+            </a:lvl9pPr>
+          </a:lstStyle>
+          <a:p>
+            <a:endParaRPr/>
+          </a:p>
+        </p:txBody>
+      </p:sp>
+      <p:sp>
+        <p:nvSpPr>
+          <p:cNvPr id="60" name="Google Shape;60;p14"/>
+          <p:cNvSpPr txBox="1">
+            <a:spLocks noGrp="1"/>
+          </p:cNvSpPr>
+          <p:nvPr>
+            <p:ph type="body" idx="1"/>
+          </p:nvPr>
+        </p:nvSpPr>
+        <p:spPr>
+          <a:xfrm>
+            <a:off x="628075" y="2487883"/>
+            <a:ext cx="12561413" cy="2015520"/>
+          </a:xfrm>
+          <a:prstGeom prst="rect">
+            <a:avLst/>
+          </a:prstGeom>
+          <a:noFill/>
+          <a:ln>
+            <a:noFill/>
+          </a:ln>
+        </p:spPr>
+        <p:txBody>
+          <a:bodyPr spcFirstLastPara="1" wrap="square" lIns="60500" tIns="60500" rIns="60500" bIns="60500" anchor="t" anchorCtr="0">
+            <a:noAutofit/>
+          </a:bodyPr>
+          <a:lstStyle>
+            <a:lvl1pPr marL="690875" marR="0" lvl="0" indent="-460583" algn="l" rtl="0">
+              <a:lnSpc>
+                <a:spcPct val="120000"/>
+              </a:lnSpc>
+              <a:spcBef>
+                <a:spcPts val="604"/>
+              </a:spcBef>
+              <a:spcAft>
+                <a:spcPts val="0"/>
+              </a:spcAft>
+              <a:buClr>
+                <a:schemeClr val="dk1"/>
+              </a:buClr>
+              <a:buSzPts val="1200"/>
+              <a:buFont typeface="Arial"/>
+              <a:buChar char="•"/>
+              <a:defRPr sz="1813" b="0" i="0" u="none" strike="noStrike" cap="none">
+                <a:solidFill>
+                  <a:schemeClr val="dk1"/>
+                </a:solidFill>
+                <a:latin typeface="Proxima Nova"/>
+                <a:ea typeface="Proxima Nova"/>
+                <a:cs typeface="Proxima Nova"/>
+                <a:sym typeface="Proxima Nova"/>
+              </a:defRPr>
+            </a:lvl1pPr>
+            <a:lvl2pPr marL="1381750" marR="0" lvl="1" indent="-450988" algn="l" rtl="0">
+              <a:lnSpc>
+                <a:spcPct val="120000"/>
+              </a:lnSpc>
+              <a:spcBef>
+                <a:spcPts val="604"/>
+              </a:spcBef>
+              <a:spcAft>
+                <a:spcPts val="0"/>
+              </a:spcAft>
+              <a:buClr>
+                <a:schemeClr val="dk1"/>
+              </a:buClr>
+              <a:buSzPts val="1100"/>
+              <a:buFont typeface="Arial"/>
+              <a:buChar char="–"/>
+              <a:defRPr sz="1662" b="0" i="0" u="none" strike="noStrike" cap="none">
+                <a:solidFill>
+                  <a:schemeClr val="dk1"/>
+                </a:solidFill>
+                <a:latin typeface="Proxima Nova"/>
+                <a:ea typeface="Proxima Nova"/>
+                <a:cs typeface="Proxima Nova"/>
+                <a:sym typeface="Proxima Nova"/>
+              </a:defRPr>
+            </a:lvl2pPr>
+            <a:lvl3pPr marL="2072625" marR="0" lvl="2" indent="-450988" algn="l" rtl="0">
+              <a:lnSpc>
+                <a:spcPct val="120000"/>
+              </a:lnSpc>
+              <a:spcBef>
+                <a:spcPts val="604"/>
+              </a:spcBef>
+              <a:spcAft>
+                <a:spcPts val="0"/>
+              </a:spcAft>
+              <a:buClr>
+                <a:schemeClr val="dk1"/>
+              </a:buClr>
+              <a:buSzPts val="1100"/>
+              <a:buFont typeface="Arial"/>
+              <a:buChar char="•"/>
+              <a:defRPr sz="1662" b="0" i="0" u="none" strike="noStrike" cap="none">
+                <a:solidFill>
+                  <a:schemeClr val="dk1"/>
+                </a:solidFill>
+                <a:latin typeface="Proxima Nova"/>
+                <a:ea typeface="Proxima Nova"/>
+                <a:cs typeface="Proxima Nova"/>
+                <a:sym typeface="Proxima Nova"/>
+              </a:defRPr>
+            </a:lvl3pPr>
+            <a:lvl4pPr marL="2763500" marR="0" lvl="3" indent="-450988" algn="l" rtl="0">
+              <a:lnSpc>
+                <a:spcPct val="120000"/>
+              </a:lnSpc>
+              <a:spcBef>
+                <a:spcPts val="604"/>
+              </a:spcBef>
+              <a:spcAft>
+                <a:spcPts val="0"/>
+              </a:spcAft>
+              <a:buClr>
+                <a:schemeClr val="dk1"/>
+              </a:buClr>
+              <a:buSzPts val="1100"/>
+              <a:buFont typeface="Arial"/>
+              <a:buChar char="–"/>
+              <a:defRPr sz="1662" b="0" i="0" u="none" strike="noStrike" cap="none">
+                <a:solidFill>
+                  <a:schemeClr val="dk1"/>
+                </a:solidFill>
+                <a:latin typeface="Proxima Nova"/>
+                <a:ea typeface="Proxima Nova"/>
+                <a:cs typeface="Proxima Nova"/>
+                <a:sym typeface="Proxima Nova"/>
+              </a:defRPr>
+            </a:lvl4pPr>
+            <a:lvl5pPr marL="3454375" marR="0" lvl="4" indent="-450988" algn="l" rtl="0">
+              <a:spcBef>
+                <a:spcPts val="604"/>
+              </a:spcBef>
+              <a:spcAft>
+                <a:spcPts val="0"/>
+              </a:spcAft>
+              <a:buClr>
+                <a:schemeClr val="dk1"/>
+              </a:buClr>
+              <a:buSzPts val="1100"/>
+              <a:buFont typeface="Arial"/>
+              <a:buChar char="»"/>
+              <a:defRPr sz="1662" b="0" i="0" u="none" strike="noStrike" cap="none">
+                <a:solidFill>
+                  <a:schemeClr val="dk1"/>
+                </a:solidFill>
+                <a:latin typeface="Source Sans Pro"/>
+                <a:ea typeface="Source Sans Pro"/>
+                <a:cs typeface="Source Sans Pro"/>
+                <a:sym typeface="Source Sans Pro"/>
+              </a:defRPr>
+            </a:lvl5pPr>
+            <a:lvl6pPr marL="4145250" marR="0" lvl="5" indent="-537347" algn="l" rtl="0">
+              <a:spcBef>
+                <a:spcPts val="604"/>
+              </a:spcBef>
+              <a:spcAft>
+                <a:spcPts val="0"/>
+              </a:spcAft>
+              <a:buClr>
+                <a:schemeClr val="dk1"/>
+              </a:buClr>
+              <a:buSzPts val="2000"/>
+              <a:buFont typeface="Arial"/>
+              <a:buChar char="•"/>
+              <a:defRPr sz="3022" b="0" i="0" u="none" strike="noStrike" cap="none">
+                <a:solidFill>
+                  <a:schemeClr val="dk1"/>
+                </a:solidFill>
+                <a:latin typeface="Arial"/>
+                <a:ea typeface="Arial"/>
+                <a:cs typeface="Arial"/>
+                <a:sym typeface="Arial"/>
+              </a:defRPr>
+            </a:lvl6pPr>
+            <a:lvl7pPr marL="4836124" marR="0" lvl="6" indent="-537347" algn="l" rtl="0">
+              <a:spcBef>
+                <a:spcPts val="604"/>
+              </a:spcBef>
+              <a:spcAft>
+                <a:spcPts val="0"/>
+              </a:spcAft>
+              <a:buClr>
+                <a:schemeClr val="dk1"/>
+              </a:buClr>
+              <a:buSzPts val="2000"/>
+              <a:buFont typeface="Arial"/>
+              <a:buChar char="•"/>
+              <a:defRPr sz="3022" b="0" i="0" u="none" strike="noStrike" cap="none">
+                <a:solidFill>
+                  <a:schemeClr val="dk1"/>
+                </a:solidFill>
+                <a:latin typeface="Arial"/>
+                <a:ea typeface="Arial"/>
+                <a:cs typeface="Arial"/>
+                <a:sym typeface="Arial"/>
+              </a:defRPr>
+            </a:lvl7pPr>
+            <a:lvl8pPr marL="5526999" marR="0" lvl="7" indent="-537347" algn="l" rtl="0">
+              <a:spcBef>
+                <a:spcPts val="604"/>
+              </a:spcBef>
+              <a:spcAft>
+                <a:spcPts val="0"/>
+              </a:spcAft>
+              <a:buClr>
+                <a:schemeClr val="dk1"/>
+              </a:buClr>
+              <a:buSzPts val="2000"/>
+              <a:buFont typeface="Arial"/>
+              <a:buChar char="•"/>
+              <a:defRPr sz="3022" b="0" i="0" u="none" strike="noStrike" cap="none">
+                <a:solidFill>
+                  <a:schemeClr val="dk1"/>
+                </a:solidFill>
+                <a:latin typeface="Arial"/>
+                <a:ea typeface="Arial"/>
+                <a:cs typeface="Arial"/>
+                <a:sym typeface="Arial"/>
+              </a:defRPr>
+            </a:lvl8pPr>
+            <a:lvl9pPr marL="6217874" marR="0" lvl="8" indent="-537347" algn="l" rtl="0">
+              <a:spcBef>
+                <a:spcPts val="604"/>
+              </a:spcBef>
+              <a:spcAft>
+                <a:spcPts val="0"/>
+              </a:spcAft>
+              <a:buClr>
+                <a:schemeClr val="dk1"/>
+              </a:buClr>
+              <a:buSzPts val="2000"/>
+              <a:buFont typeface="Arial"/>
+              <a:buChar char="•"/>
+              <a:defRPr sz="3022" b="0" i="0" u="none" strike="noStrike" cap="none">
+                <a:solidFill>
+                  <a:schemeClr val="dk1"/>
+                </a:solidFill>
+                <a:latin typeface="Arial"/>
+                <a:ea typeface="Arial"/>
+                <a:cs typeface="Arial"/>
+                <a:sym typeface="Arial"/>
+              </a:defRPr>
+            </a:lvl9pPr>
+          </a:lstStyle>
+          <a:p>
+            <a:endParaRPr/>
+          </a:p>
+        </p:txBody>
+      </p:sp>
+    </p:spTree>
+    <p:extLst>
+      <p:ext uri="{BB962C8B-B14F-4D97-AF65-F5344CB8AC3E}">
+        <p14:creationId xmlns:p14="http://schemas.microsoft.com/office/powerpoint/2010/main" val="1040450538"/>
+      </p:ext>
+    </p:extLst>
+  </p:cSld>
+  <p:clrMapOvr>
+    <a:masterClrMapping/>
+  </p:clrMapOvr>
+  <p:transition>
+    <p:fade/>
+  </p:transition>
+</p:sldLayout>
+</file>
+
 <file path=ppt/slideLayouts/slideLayout3.xml><?xml version="1.0" encoding="utf-8"?>
 <p:sldLayout xmlns:a="http://schemas.openxmlformats.org/drawingml/2006/main" xmlns:r="http://schemas.openxmlformats.org/officeDocument/2006/relationships" xmlns:p="http://schemas.openxmlformats.org/presentationml/2006/main" preserve="1" userDrawn="1">
   <p:cSld name="Title Green Ram CSU">
@@ -6622,6 +7219,7 @@
     <p:sldLayoutId id="2147483677" r:id="rId22"/>
     <p:sldLayoutId id="2147483692" r:id="rId23"/>
     <p:sldLayoutId id="2147483672" r:id="rId24"/>
+    <p:sldLayoutId id="2147483693" r:id="rId25"/>
   </p:sldLayoutIdLst>
   <mc:AlternateContent xmlns:mc="http://schemas.openxmlformats.org/markup-compatibility/2006" xmlns:p14="http://schemas.microsoft.com/office/powerpoint/2010/main">
     <mc:Choice Requires="p14">
@@ -7036,6 +7634,126 @@
           <p:cNvPr id="2" name="Title 1">
             <a:extLst>
               <a:ext uri="{FF2B5EF4-FFF2-40B4-BE49-F238E27FC236}">
+                <a16:creationId xmlns:a16="http://schemas.microsoft.com/office/drawing/2014/main" id="{D9AF706D-06D8-E545-B819-BF81D256C7CE}"/>
+              </a:ext>
+            </a:extLst>
+          </p:cNvPr>
+          <p:cNvSpPr>
+            <a:spLocks noGrp="1"/>
+          </p:cNvSpPr>
+          <p:nvPr>
+            <p:ph type="title"/>
+          </p:nvPr>
+        </p:nvSpPr>
+        <p:spPr/>
+        <p:txBody>
+          <a:bodyPr/>
+          <a:lstStyle/>
+          <a:p>
+            <a:r>
+              <a:rPr lang="en-US" dirty="0"/>
+              <a:t>Practice 2 – Group Programing</a:t>
+            </a:r>
+          </a:p>
+        </p:txBody>
+      </p:sp>
+      <p:sp>
+        <p:nvSpPr>
+          <p:cNvPr id="3" name="Text Placeholder 2">
+            <a:extLst>
+              <a:ext uri="{FF2B5EF4-FFF2-40B4-BE49-F238E27FC236}">
+                <a16:creationId xmlns:a16="http://schemas.microsoft.com/office/drawing/2014/main" id="{A532DEDA-9414-0A41-B377-DBD94A1F0E75}"/>
+              </a:ext>
+            </a:extLst>
+          </p:cNvPr>
+          <p:cNvSpPr>
+            <a:spLocks noGrp="1"/>
+          </p:cNvSpPr>
+          <p:nvPr>
+            <p:ph type="body" sz="quarter" idx="10"/>
+          </p:nvPr>
+        </p:nvSpPr>
+        <p:spPr>
+          <a:xfrm>
+            <a:off x="628075" y="1776683"/>
+            <a:ext cx="11312287" cy="1786386"/>
+          </a:xfrm>
+        </p:spPr>
+        <p:txBody>
+          <a:bodyPr/>
+          <a:lstStyle/>
+          <a:p>
+            <a:r>
+              <a:rPr lang="en-US" dirty="0"/>
+              <a:t>Write a method that continues to prompt a user to enter a number in the following interval [1;12]. When the user type a correct number</a:t>
+            </a:r>
+            <a:r>
+              <a:rPr lang="en-US"/>
+              <a:t>, return </a:t>
+            </a:r>
+            <a:r>
+              <a:rPr lang="en-US" dirty="0"/>
+              <a:t>that number.</a:t>
+            </a:r>
+          </a:p>
+          <a:p>
+            <a:endParaRPr lang="en-US" dirty="0"/>
+          </a:p>
+          <a:p>
+            <a:r>
+              <a:rPr lang="en-US" dirty="0"/>
+              <a:t>Which loop kind of loop are you thinking of using?</a:t>
+            </a:r>
+          </a:p>
+        </p:txBody>
+      </p:sp>
+    </p:spTree>
+    <p:extLst>
+      <p:ext uri="{BB962C8B-B14F-4D97-AF65-F5344CB8AC3E}">
+        <p14:creationId xmlns:p14="http://schemas.microsoft.com/office/powerpoint/2010/main" val="2860398301"/>
+      </p:ext>
+    </p:extLst>
+  </p:cSld>
+  <p:clrMapOvr>
+    <a:masterClrMapping/>
+  </p:clrMapOvr>
+  <mc:AlternateContent xmlns:mc="http://schemas.openxmlformats.org/markup-compatibility/2006" xmlns:p14="http://schemas.microsoft.com/office/powerpoint/2010/main">
+    <mc:Choice Requires="p14">
+      <p:transition p14:dur="300">
+        <p:fade/>
+      </p:transition>
+    </mc:Choice>
+    <mc:Fallback xmlns="">
+      <p:transition>
+        <p:fade/>
+      </p:transition>
+    </mc:Fallback>
+  </mc:AlternateContent>
+</p:sld>
+</file>
+
+<file path=ppt/slides/slide11.xml><?xml version="1.0" encoding="utf-8"?>
+<p:sld xmlns:a="http://schemas.openxmlformats.org/drawingml/2006/main" xmlns:r="http://schemas.openxmlformats.org/officeDocument/2006/relationships" xmlns:p="http://schemas.openxmlformats.org/presentationml/2006/main">
+  <p:cSld>
+    <p:spTree>
+      <p:nvGrpSpPr>
+        <p:cNvPr id="1" name=""/>
+        <p:cNvGrpSpPr/>
+        <p:nvPr/>
+      </p:nvGrpSpPr>
+      <p:grpSpPr>
+        <a:xfrm>
+          <a:off x="0" y="0"/>
+          <a:ext cx="0" cy="0"/>
+          <a:chOff x="0" y="0"/>
+          <a:chExt cx="0" cy="0"/>
+        </a:xfrm>
+      </p:grpSpPr>
+      <p:sp>
+        <p:nvSpPr>
+          <p:cNvPr id="2" name="Title 1">
+            <a:extLst>
+              <a:ext uri="{FF2B5EF4-FFF2-40B4-BE49-F238E27FC236}">
                 <a16:creationId xmlns:a16="http://schemas.microsoft.com/office/drawing/2014/main" id="{539AA6FB-C635-3F4C-A3B8-64514A3441C6}"/>
               </a:ext>
             </a:extLst>
@@ -7720,6 +8438,295 @@
           <p:cNvPr id="4" name="Title 3">
             <a:extLst>
               <a:ext uri="{FF2B5EF4-FFF2-40B4-BE49-F238E27FC236}">
+                <a16:creationId xmlns:a16="http://schemas.microsoft.com/office/drawing/2014/main" id="{119AD8F2-D5DB-A84B-A5B3-F7935E3E6D1D}"/>
+              </a:ext>
+            </a:extLst>
+          </p:cNvPr>
+          <p:cNvSpPr>
+            <a:spLocks noGrp="1"/>
+          </p:cNvSpPr>
+          <p:nvPr>
+            <p:ph type="title"/>
+          </p:nvPr>
+        </p:nvSpPr>
+        <p:spPr>
+          <a:xfrm>
+            <a:off x="628076" y="607804"/>
+            <a:ext cx="5642096" cy="916848"/>
+          </a:xfrm>
+        </p:spPr>
+        <p:txBody>
+          <a:bodyPr/>
+          <a:lstStyle/>
+          <a:p>
+            <a:r>
+              <a:rPr lang="en-US" dirty="0"/>
+              <a:t>Announcements</a:t>
+            </a:r>
+          </a:p>
+        </p:txBody>
+      </p:sp>
+      <p:sp>
+        <p:nvSpPr>
+          <p:cNvPr id="5" name="Text Placeholder 4">
+            <a:extLst>
+              <a:ext uri="{FF2B5EF4-FFF2-40B4-BE49-F238E27FC236}">
+                <a16:creationId xmlns:a16="http://schemas.microsoft.com/office/drawing/2014/main" id="{1BBD0DB5-379A-304F-9307-E7B1A89B08F7}"/>
+              </a:ext>
+            </a:extLst>
+          </p:cNvPr>
+          <p:cNvSpPr>
+            <a:spLocks noGrp="1"/>
+          </p:cNvSpPr>
+          <p:nvPr>
+            <p:ph type="body" idx="1"/>
+          </p:nvPr>
+        </p:nvSpPr>
+        <p:spPr>
+          <a:xfrm>
+            <a:off x="628075" y="1647163"/>
+            <a:ext cx="8395419" cy="4379259"/>
+          </a:xfrm>
+        </p:spPr>
+        <p:txBody>
+          <a:bodyPr/>
+          <a:lstStyle/>
+          <a:p>
+            <a:pPr marL="930762" lvl="1" indent="0">
+              <a:buNone/>
+            </a:pPr>
+            <a:endParaRPr lang="en-US" dirty="0"/>
+          </a:p>
+          <a:p>
+            <a:r>
+              <a:rPr lang="en-US" dirty="0"/>
+              <a:t>Reminder – readings are due </a:t>
+            </a:r>
+            <a:r>
+              <a:rPr lang="en-US" b="1" dirty="0"/>
+              <a:t>before</a:t>
+            </a:r>
+            <a:r>
+              <a:rPr lang="en-US" dirty="0"/>
+              <a:t> lecture</a:t>
+            </a:r>
+          </a:p>
+          <a:p>
+            <a:pPr lvl="1"/>
+            <a:r>
+              <a:rPr lang="en-US" dirty="0"/>
+              <a:t>You don’t have to do all of it - challenge problems can be challenging…</a:t>
+            </a:r>
+          </a:p>
+          <a:p>
+            <a:pPr lvl="1"/>
+            <a:r>
+              <a:rPr lang="en-US" dirty="0"/>
+              <a:t>You can return to them. </a:t>
+            </a:r>
+          </a:p>
+          <a:p>
+            <a:pPr lvl="1"/>
+            <a:r>
+              <a:rPr lang="en-US" dirty="0"/>
+              <a:t>We start off each lecture with a quiz from your reading! </a:t>
+            </a:r>
+          </a:p>
+          <a:p>
+            <a:r>
+              <a:rPr lang="en-US" dirty="0"/>
+              <a:t>Make sure to review knowledge checks and spread out their use! </a:t>
+            </a:r>
+          </a:p>
+        </p:txBody>
+      </p:sp>
+      <p:sp>
+        <p:nvSpPr>
+          <p:cNvPr id="6" name="TextBox 5">
+            <a:extLst>
+              <a:ext uri="{FF2B5EF4-FFF2-40B4-BE49-F238E27FC236}">
+                <a16:creationId xmlns:a16="http://schemas.microsoft.com/office/drawing/2014/main" id="{32A3B87A-BBC0-704B-AC99-3984206450D5}"/>
+              </a:ext>
+            </a:extLst>
+          </p:cNvPr>
+          <p:cNvSpPr txBox="1"/>
+          <p:nvPr/>
+        </p:nvSpPr>
+        <p:spPr>
+          <a:xfrm>
+            <a:off x="9744412" y="2150737"/>
+            <a:ext cx="3892958" cy="2417650"/>
+          </a:xfrm>
+          <a:prstGeom prst="rect">
+            <a:avLst/>
+          </a:prstGeom>
+          <a:noFill/>
+        </p:spPr>
+        <p:txBody>
+          <a:bodyPr wrap="square" rtlCol="0">
+            <a:spAutoFit/>
+          </a:bodyPr>
+          <a:lstStyle/>
+          <a:p>
+            <a:r>
+              <a:rPr lang="en-US" sz="3022" dirty="0" err="1"/>
+              <a:t>Todo</a:t>
+            </a:r>
+            <a:r>
+              <a:rPr lang="en-US" sz="3022" dirty="0"/>
+              <a:t>:</a:t>
+            </a:r>
+          </a:p>
+          <a:p>
+            <a:r>
+              <a:rPr lang="en-US" sz="3022" dirty="0"/>
+              <a:t>Continue Practical 2 (should be started!)</a:t>
+            </a:r>
+          </a:p>
+          <a:p>
+            <a:endParaRPr lang="en-US" sz="3022" dirty="0"/>
+          </a:p>
+          <a:p>
+            <a:endParaRPr lang="en-US" sz="3022" dirty="0"/>
+          </a:p>
+        </p:txBody>
+      </p:sp>
+      <p:sp>
+        <p:nvSpPr>
+          <p:cNvPr id="3" name="TextBox 2">
+            <a:extLst>
+              <a:ext uri="{FF2B5EF4-FFF2-40B4-BE49-F238E27FC236}">
+                <a16:creationId xmlns:a16="http://schemas.microsoft.com/office/drawing/2014/main" id="{219403AF-FCA0-4FAD-B2CD-E3D24CF8DD27}"/>
+              </a:ext>
+            </a:extLst>
+          </p:cNvPr>
+          <p:cNvSpPr txBox="1"/>
+          <p:nvPr/>
+        </p:nvSpPr>
+        <p:spPr>
+          <a:xfrm>
+            <a:off x="628075" y="6148934"/>
+            <a:ext cx="10580915" cy="1015663"/>
+          </a:xfrm>
+          <a:prstGeom prst="rect">
+            <a:avLst/>
+          </a:prstGeom>
+          <a:noFill/>
+        </p:spPr>
+        <p:txBody>
+          <a:bodyPr wrap="square" rtlCol="0">
+            <a:spAutoFit/>
+          </a:bodyPr>
+          <a:lstStyle/>
+          <a:p>
+            <a:r>
+              <a:rPr lang="en-US" dirty="0"/>
+              <a:t>CS 165 – Next Course In Sequence, also consider CS 220 (math and stats especially) </a:t>
+            </a:r>
+          </a:p>
+          <a:p>
+            <a:r>
+              <a:rPr lang="en-US" dirty="0"/>
+              <a:t>CO Jobs Report 2021 – 77% of new jobs require programming</a:t>
+            </a:r>
+          </a:p>
+          <a:p>
+            <a:r>
+              <a:rPr lang="en-US" dirty="0"/>
+              <a:t>60% of all STEM jobs requires *advanced* (200-300 level) </a:t>
+            </a:r>
+          </a:p>
+        </p:txBody>
+      </p:sp>
+      <p:sp>
+        <p:nvSpPr>
+          <p:cNvPr id="7" name="TextBox 6">
+            <a:extLst>
+              <a:ext uri="{FF2B5EF4-FFF2-40B4-BE49-F238E27FC236}">
+                <a16:creationId xmlns:a16="http://schemas.microsoft.com/office/drawing/2014/main" id="{BF16D510-BC74-4FA5-AFD2-193B039115A5}"/>
+              </a:ext>
+            </a:extLst>
+          </p:cNvPr>
+          <p:cNvSpPr txBox="1"/>
+          <p:nvPr/>
+        </p:nvSpPr>
+        <p:spPr>
+          <a:xfrm>
+            <a:off x="7228114" y="362857"/>
+            <a:ext cx="6125029" cy="1015663"/>
+          </a:xfrm>
+          <a:prstGeom prst="rect">
+            <a:avLst/>
+          </a:prstGeom>
+          <a:solidFill>
+            <a:schemeClr val="accent2"/>
+          </a:solidFill>
+        </p:spPr>
+        <p:txBody>
+          <a:bodyPr wrap="square" rtlCol="0">
+            <a:spAutoFit/>
+          </a:bodyPr>
+          <a:lstStyle/>
+          <a:p>
+            <a:r>
+              <a:rPr lang="en-US" b="1" dirty="0"/>
+              <a:t>Opening Question: </a:t>
+            </a:r>
+          </a:p>
+          <a:p>
+            <a:r>
+              <a:rPr lang="en-US" dirty="0"/>
+              <a:t>How are you studying for this course? Knowledge checks, practice coding assignments, </a:t>
+            </a:r>
+            <a:r>
+              <a:rPr lang="en-US" dirty="0" err="1"/>
+              <a:t>etc</a:t>
+            </a:r>
+            <a:r>
+              <a:rPr lang="en-US" dirty="0"/>
+              <a:t>?</a:t>
+            </a:r>
+          </a:p>
+        </p:txBody>
+      </p:sp>
+    </p:spTree>
+    <p:extLst>
+      <p:ext uri="{BB962C8B-B14F-4D97-AF65-F5344CB8AC3E}">
+        <p14:creationId xmlns:p14="http://schemas.microsoft.com/office/powerpoint/2010/main" val="926474781"/>
+      </p:ext>
+    </p:extLst>
+  </p:cSld>
+  <p:clrMapOvr>
+    <a:masterClrMapping/>
+  </p:clrMapOvr>
+  <p:transition>
+    <p:fade/>
+  </p:transition>
+</p:sld>
+</file>
+
+<file path=ppt/slides/slide3.xml><?xml version="1.0" encoding="utf-8"?>
+<p:sld xmlns:a="http://schemas.openxmlformats.org/drawingml/2006/main" xmlns:r="http://schemas.openxmlformats.org/officeDocument/2006/relationships" xmlns:p="http://schemas.openxmlformats.org/presentationml/2006/main">
+  <p:cSld>
+    <p:spTree>
+      <p:nvGrpSpPr>
+        <p:cNvPr id="1" name=""/>
+        <p:cNvGrpSpPr/>
+        <p:nvPr/>
+      </p:nvGrpSpPr>
+      <p:grpSpPr>
+        <a:xfrm>
+          <a:off x="0" y="0"/>
+          <a:ext cx="0" cy="0"/>
+          <a:chOff x="0" y="0"/>
+          <a:chExt cx="0" cy="0"/>
+        </a:xfrm>
+      </p:grpSpPr>
+      <p:sp>
+        <p:nvSpPr>
+          <p:cNvPr id="4" name="Title 3">
+            <a:extLst>
+              <a:ext uri="{FF2B5EF4-FFF2-40B4-BE49-F238E27FC236}">
                 <a16:creationId xmlns:a16="http://schemas.microsoft.com/office/drawing/2014/main" id="{FAAE6F2E-172B-F74B-A63E-FBEE9F584404}"/>
               </a:ext>
             </a:extLst>
@@ -7885,7 +8892,7 @@
 </p:sld>
 </file>
 
-<file path=ppt/slides/slide3.xml><?xml version="1.0" encoding="utf-8"?>
+<file path=ppt/slides/slide4.xml><?xml version="1.0" encoding="utf-8"?>
 <p:sld xmlns:a="http://schemas.openxmlformats.org/drawingml/2006/main" xmlns:r="http://schemas.openxmlformats.org/officeDocument/2006/relationships" xmlns:p="http://schemas.openxmlformats.org/presentationml/2006/main">
   <p:cSld>
     <p:spTree>
@@ -9008,7 +10015,7 @@
 </p:sld>
 </file>
 
-<file path=ppt/slides/slide4.xml><?xml version="1.0" encoding="utf-8"?>
+<file path=ppt/slides/slide5.xml><?xml version="1.0" encoding="utf-8"?>
 <p:sld xmlns:a="http://schemas.openxmlformats.org/drawingml/2006/main" xmlns:r="http://schemas.openxmlformats.org/officeDocument/2006/relationships" xmlns:p="http://schemas.openxmlformats.org/presentationml/2006/main">
   <p:cSld>
     <p:spTree>
@@ -9182,7 +10189,7 @@
 </p:sld>
 </file>
 
-<file path=ppt/slides/slide5.xml><?xml version="1.0" encoding="utf-8"?>
+<file path=ppt/slides/slide6.xml><?xml version="1.0" encoding="utf-8"?>
 <p:sld xmlns:a="http://schemas.openxmlformats.org/drawingml/2006/main" xmlns:r="http://schemas.openxmlformats.org/officeDocument/2006/relationships" xmlns:p="http://schemas.openxmlformats.org/presentationml/2006/main">
   <p:cSld>
     <p:spTree>
@@ -9515,6 +10522,45 @@
               </a:rPr>
             </a:br>
             <a:r>
+              <a:rPr kumimoji="0" lang="en-US" altLang="en-US" sz="2400" b="0" i="0" u="none" strike="noStrike" cap="none" normalizeH="0" baseline="0" dirty="0" err="1">
+                <a:ln>
+                  <a:noFill/>
+                </a:ln>
+                <a:solidFill>
+                  <a:srgbClr val="A9B7C6"/>
+                </a:solidFill>
+                <a:effectLst/>
+                <a:latin typeface="JetBrains Mono"/>
+              </a:rPr>
+              <a:t>System.</a:t>
+            </a:r>
+            <a:r>
+              <a:rPr kumimoji="0" lang="en-US" altLang="en-US" sz="2400" b="0" i="1" u="none" strike="noStrike" cap="none" normalizeH="0" baseline="0" dirty="0" err="1">
+                <a:ln>
+                  <a:noFill/>
+                </a:ln>
+                <a:solidFill>
+                  <a:srgbClr val="9876AA"/>
+                </a:solidFill>
+                <a:effectLst/>
+                <a:latin typeface="JetBrains Mono"/>
+              </a:rPr>
+              <a:t>out</a:t>
+            </a:r>
+            <a:r>
+              <a:rPr kumimoji="0" lang="en-US" altLang="en-US" sz="2400" b="0" i="0" u="none" strike="noStrike" cap="none" normalizeH="0" baseline="0" dirty="0" err="1">
+                <a:ln>
+                  <a:noFill/>
+                </a:ln>
+                <a:solidFill>
+                  <a:srgbClr val="A9B7C6"/>
+                </a:solidFill>
+                <a:effectLst/>
+                <a:latin typeface="JetBrains Mono"/>
+              </a:rPr>
+              <a:t>.print</a:t>
+            </a:r>
+            <a:r>
               <a:rPr kumimoji="0" lang="en-US" altLang="en-US" sz="2400" b="0" i="0" u="none" strike="noStrike" cap="none" normalizeH="0" baseline="0" dirty="0">
                 <a:ln>
                   <a:noFill/>
@@ -9525,20 +10571,7 @@
                 <a:effectLst/>
                 <a:latin typeface="JetBrains Mono"/>
               </a:rPr>
-              <a:t>System.</a:t>
-            </a:r>
-            <a:r>
-              <a:rPr kumimoji="0" lang="en-US" altLang="en-US" sz="2400" b="0" i="1" u="none" strike="noStrike" cap="none" normalizeH="0" baseline="0" dirty="0">
-                <a:ln>
-                  <a:noFill/>
-                </a:ln>
-                <a:solidFill>
-                  <a:srgbClr val="9876AA"/>
-                </a:solidFill>
-                <a:effectLst/>
-                <a:latin typeface="JetBrains Mono"/>
-              </a:rPr>
-              <a:t>out</a:t>
+              <a:t>(</a:t>
             </a:r>
             <a:r>
               <a:rPr kumimoji="0" lang="en-US" altLang="en-US" sz="2400" b="0" i="0" u="none" strike="noStrike" cap="none" normalizeH="0" baseline="0" dirty="0">
@@ -9546,12 +10579,12 @@
                   <a:noFill/>
                 </a:ln>
                 <a:solidFill>
-                  <a:srgbClr val="A9B7C6"/>
+                  <a:srgbClr val="6A8759"/>
                 </a:solidFill>
                 <a:effectLst/>
                 <a:latin typeface="JetBrains Mono"/>
               </a:rPr>
-              <a:t>.println(</a:t>
+              <a:t>"</a:t>
             </a:r>
             <a:r>
               <a:rPr kumimoji="0" lang="en-US" altLang="en-US" sz="2400" b="0" i="0" u="none" strike="noStrike" cap="none" normalizeH="0" baseline="0" dirty="0">
@@ -9559,12 +10592,38 @@
                   <a:noFill/>
                 </a:ln>
                 <a:solidFill>
-                  <a:srgbClr val="6A8759"/>
+                  <a:srgbClr val="CC7832"/>
                 </a:solidFill>
                 <a:effectLst/>
                 <a:latin typeface="JetBrains Mono"/>
               </a:rPr>
-              <a:t>"</a:t>
+              <a:t>\</a:t>
+            </a:r>
+            <a:r>
+              <a:rPr kumimoji="0" lang="en-US" altLang="en-US" sz="2400" b="0" i="0" u="none" strike="noStrike" cap="none" normalizeH="0" baseline="0" dirty="0" err="1">
+                <a:ln>
+                  <a:noFill/>
+                </a:ln>
+                <a:solidFill>
+                  <a:srgbClr val="CC7832"/>
+                </a:solidFill>
+                <a:effectLst/>
+                <a:latin typeface="JetBrains Mono"/>
+              </a:rPr>
+              <a:t>n</a:t>
+            </a:r>
+            <a:r>
+              <a:rPr kumimoji="0" lang="en-US" altLang="en-US" sz="2400" b="0" i="0" u="none" strike="noStrike" cap="none" normalizeH="0" baseline="0" dirty="0" err="1">
+                <a:ln>
+                  <a:noFill/>
+                </a:ln>
+                <a:solidFill>
+                  <a:srgbClr val="6A8759"/>
+                </a:solidFill>
+                <a:effectLst/>
+                <a:latin typeface="JetBrains Mono"/>
+              </a:rPr>
+              <a:t>Enter</a:t>
             </a:r>
             <a:r>
               <a:rPr kumimoji="0" lang="en-US" altLang="en-US" sz="2400" b="0" i="0" u="none" strike="noStrike" cap="none" normalizeH="0" baseline="0" dirty="0">
@@ -9572,51 +10631,12 @@
                   <a:noFill/>
                 </a:ln>
                 <a:solidFill>
-                  <a:srgbClr val="CC7832"/>
+                  <a:srgbClr val="6A8759"/>
                 </a:solidFill>
                 <a:effectLst/>
                 <a:latin typeface="JetBrains Mono"/>
               </a:rPr>
-              <a:t>\</a:t>
-            </a:r>
-            <a:r>
-              <a:rPr kumimoji="0" lang="en-US" altLang="en-US" sz="2400" b="0" i="0" u="none" strike="noStrike" cap="none" normalizeH="0" baseline="0" dirty="0" err="1">
-                <a:ln>
-                  <a:noFill/>
-                </a:ln>
-                <a:solidFill>
-                  <a:srgbClr val="CC7832"/>
-                </a:solidFill>
-                <a:effectLst/>
-                <a:latin typeface="JetBrains Mono"/>
-              </a:rPr>
-              <a:t>n</a:t>
-            </a:r>
-            <a:r>
-              <a:rPr kumimoji="0" lang="en-US" altLang="en-US" sz="2400" b="0" i="0" u="none" strike="noStrike" cap="none" normalizeH="0" baseline="0" dirty="0" err="1">
-                <a:ln>
-                  <a:noFill/>
-                </a:ln>
-                <a:solidFill>
-                  <a:srgbClr val="6A8759"/>
-                </a:solidFill>
-                <a:effectLst/>
-                <a:latin typeface="JetBrains Mono"/>
-              </a:rPr>
-              <a:t>Enter</a:t>
-            </a:r>
-            <a:r>
-              <a:rPr kumimoji="0" lang="en-US" altLang="en-US" sz="2400" b="0" i="0" u="none" strike="noStrike" cap="none" normalizeH="0" baseline="0" dirty="0">
-                <a:ln>
-                  <a:noFill/>
-                </a:ln>
-                <a:solidFill>
-                  <a:srgbClr val="6A8759"/>
-                </a:solidFill>
-                <a:effectLst/>
-                <a:latin typeface="JetBrains Mono"/>
-              </a:rPr>
-              <a:t> a positive value (0 or negative to exit):"</a:t>
+              <a:t> a positive value (0 or negative to exit): "</a:t>
             </a:r>
             <a:r>
               <a:rPr kumimoji="0" lang="en-US" altLang="en-US" sz="2400" b="0" i="0" u="none" strike="noStrike" cap="none" normalizeH="0" baseline="0" dirty="0">
@@ -9946,20 +10966,46 @@
                 <a:effectLst/>
                 <a:latin typeface="JetBrains Mono"/>
               </a:rPr>
-              <a:t>    System.</a:t>
-            </a:r>
-            <a:r>
-              <a:rPr kumimoji="0" lang="en-US" altLang="en-US" sz="2400" b="0" i="1" u="none" strike="noStrike" cap="none" normalizeH="0" baseline="0" dirty="0">
+              <a:t>    </a:t>
+            </a:r>
+            <a:r>
+              <a:rPr kumimoji="0" lang="en-US" altLang="en-US" sz="2400" b="0" i="0" u="none" strike="noStrike" cap="none" normalizeH="0" baseline="0" dirty="0" err="1">
                 <a:ln>
                   <a:noFill/>
                 </a:ln>
                 <a:solidFill>
-                  <a:srgbClr val="9876AA"/>
+                  <a:srgbClr val="A9B7C6"/>
                 </a:solidFill>
                 <a:effectLst/>
                 <a:latin typeface="JetBrains Mono"/>
               </a:rPr>
+              <a:t>System.</a:t>
+            </a:r>
+            <a:r>
+              <a:rPr kumimoji="0" lang="en-US" altLang="en-US" sz="2400" b="0" i="1" u="none" strike="noStrike" cap="none" normalizeH="0" baseline="0" dirty="0" err="1">
+                <a:ln>
+                  <a:noFill/>
+                </a:ln>
+                <a:solidFill>
+                  <a:srgbClr val="9876AA"/>
+                </a:solidFill>
+                <a:effectLst/>
+                <a:latin typeface="JetBrains Mono"/>
+              </a:rPr>
               <a:t>out</a:t>
+            </a:r>
+            <a:r>
+              <a:rPr kumimoji="0" lang="en-US" altLang="en-US" sz="2400" b="0" i="0" u="none" strike="noStrike" cap="none" normalizeH="0" baseline="0" dirty="0" err="1">
+                <a:ln>
+                  <a:noFill/>
+                </a:ln>
+                <a:solidFill>
+                  <a:srgbClr val="A9B7C6"/>
+                </a:solidFill>
+                <a:effectLst/>
+                <a:latin typeface="JetBrains Mono"/>
+              </a:rPr>
+              <a:t>.print</a:t>
             </a:r>
             <a:r>
               <a:rPr kumimoji="0" lang="en-US" altLang="en-US" sz="2400" b="0" i="0" u="none" strike="noStrike" cap="none" normalizeH="0" baseline="0" dirty="0">
@@ -9972,7 +11018,7 @@
                 <a:effectLst/>
                 <a:latin typeface="JetBrains Mono"/>
               </a:rPr>
-              <a:t>.println(</a:t>
+              <a:t>(</a:t>
             </a:r>
             <a:r>
               <a:rPr kumimoji="0" lang="en-US" altLang="en-US" sz="2400" b="0" i="0" u="none" strike="noStrike" cap="none" normalizeH="0" baseline="0" dirty="0">
@@ -9985,7 +11031,7 @@
                 <a:effectLst/>
                 <a:latin typeface="JetBrains Mono"/>
               </a:rPr>
-              <a:t>"Enter a positive value (0 or negative to exit):"</a:t>
+              <a:t>"Enter a positive value (0 or negative to exit): "</a:t>
             </a:r>
             <a:r>
               <a:rPr kumimoji="0" lang="en-US" altLang="en-US" sz="2400" b="0" i="0" u="none" strike="noStrike" cap="none" normalizeH="0" baseline="0" dirty="0">
@@ -10752,7 +11798,7 @@
 </p:sld>
 </file>
 
-<file path=ppt/slides/slide6.xml><?xml version="1.0" encoding="utf-8"?>
+<file path=ppt/slides/slide7.xml><?xml version="1.0" encoding="utf-8"?>
 <p:sld xmlns:a="http://schemas.openxmlformats.org/drawingml/2006/main" xmlns:r="http://schemas.openxmlformats.org/officeDocument/2006/relationships" xmlns:p="http://schemas.openxmlformats.org/presentationml/2006/main">
   <p:cSld>
     <p:spTree>
@@ -14846,7 +15892,7 @@
 </p:sld>
 </file>
 
-<file path=ppt/slides/slide7.xml><?xml version="1.0" encoding="utf-8"?>
+<file path=ppt/slides/slide8.xml><?xml version="1.0" encoding="utf-8"?>
 <p:sld xmlns:a="http://schemas.openxmlformats.org/drawingml/2006/main" xmlns:r="http://schemas.openxmlformats.org/officeDocument/2006/relationships" xmlns:p="http://schemas.openxmlformats.org/presentationml/2006/main">
   <p:cSld>
     <p:spTree>
@@ -14987,7 +16033,7 @@
 </p:sld>
 </file>
 
-<file path=ppt/slides/slide8.xml><?xml version="1.0" encoding="utf-8"?>
+<file path=ppt/slides/slide9.xml><?xml version="1.0" encoding="utf-8"?>
 <p:sld xmlns:a="http://schemas.openxmlformats.org/drawingml/2006/main" xmlns:r="http://schemas.openxmlformats.org/officeDocument/2006/relationships" xmlns:p="http://schemas.openxmlformats.org/presentationml/2006/main">
   <p:cSld>
     <p:spTree>
@@ -15530,126 +16576,6 @@
       <p:bldP spid="6" grpId="0" animBg="1"/>
     </p:bldLst>
   </p:timing>
-</p:sld>
-</file>
-
-<file path=ppt/slides/slide9.xml><?xml version="1.0" encoding="utf-8"?>
-<p:sld xmlns:a="http://schemas.openxmlformats.org/drawingml/2006/main" xmlns:r="http://schemas.openxmlformats.org/officeDocument/2006/relationships" xmlns:p="http://schemas.openxmlformats.org/presentationml/2006/main">
-  <p:cSld>
-    <p:spTree>
-      <p:nvGrpSpPr>
-        <p:cNvPr id="1" name=""/>
-        <p:cNvGrpSpPr/>
-        <p:nvPr/>
-      </p:nvGrpSpPr>
-      <p:grpSpPr>
-        <a:xfrm>
-          <a:off x="0" y="0"/>
-          <a:ext cx="0" cy="0"/>
-          <a:chOff x="0" y="0"/>
-          <a:chExt cx="0" cy="0"/>
-        </a:xfrm>
-      </p:grpSpPr>
-      <p:sp>
-        <p:nvSpPr>
-          <p:cNvPr id="2" name="Title 1">
-            <a:extLst>
-              <a:ext uri="{FF2B5EF4-FFF2-40B4-BE49-F238E27FC236}">
-                <a16:creationId xmlns:a16="http://schemas.microsoft.com/office/drawing/2014/main" id="{D9AF706D-06D8-E545-B819-BF81D256C7CE}"/>
-              </a:ext>
-            </a:extLst>
-          </p:cNvPr>
-          <p:cNvSpPr>
-            <a:spLocks noGrp="1"/>
-          </p:cNvSpPr>
-          <p:nvPr>
-            <p:ph type="title"/>
-          </p:nvPr>
-        </p:nvSpPr>
-        <p:spPr/>
-        <p:txBody>
-          <a:bodyPr/>
-          <a:lstStyle/>
-          <a:p>
-            <a:r>
-              <a:rPr lang="en-US" dirty="0"/>
-              <a:t>Practice 2 – Group Programing</a:t>
-            </a:r>
-          </a:p>
-        </p:txBody>
-      </p:sp>
-      <p:sp>
-        <p:nvSpPr>
-          <p:cNvPr id="3" name="Text Placeholder 2">
-            <a:extLst>
-              <a:ext uri="{FF2B5EF4-FFF2-40B4-BE49-F238E27FC236}">
-                <a16:creationId xmlns:a16="http://schemas.microsoft.com/office/drawing/2014/main" id="{A532DEDA-9414-0A41-B377-DBD94A1F0E75}"/>
-              </a:ext>
-            </a:extLst>
-          </p:cNvPr>
-          <p:cNvSpPr>
-            <a:spLocks noGrp="1"/>
-          </p:cNvSpPr>
-          <p:nvPr>
-            <p:ph type="body" sz="quarter" idx="10"/>
-          </p:nvPr>
-        </p:nvSpPr>
-        <p:spPr>
-          <a:xfrm>
-            <a:off x="628075" y="1776683"/>
-            <a:ext cx="11312287" cy="1786386"/>
-          </a:xfrm>
-        </p:spPr>
-        <p:txBody>
-          <a:bodyPr/>
-          <a:lstStyle/>
-          <a:p>
-            <a:r>
-              <a:rPr lang="en-US" dirty="0"/>
-              <a:t>Write a method that continues to prompt a user to enter a number in the following interval [1;12]. When the user type a correct number</a:t>
-            </a:r>
-            <a:r>
-              <a:rPr lang="en-US"/>
-              <a:t>, return </a:t>
-            </a:r>
-            <a:r>
-              <a:rPr lang="en-US" dirty="0"/>
-              <a:t>that number.</a:t>
-            </a:r>
-          </a:p>
-          <a:p>
-            <a:endParaRPr lang="en-US" dirty="0"/>
-          </a:p>
-          <a:p>
-            <a:r>
-              <a:rPr lang="en-US" dirty="0"/>
-              <a:t>Which loop kind of loop are you thinking of using?</a:t>
-            </a:r>
-          </a:p>
-        </p:txBody>
-      </p:sp>
-    </p:spTree>
-    <p:extLst>
-      <p:ext uri="{BB962C8B-B14F-4D97-AF65-F5344CB8AC3E}">
-        <p14:creationId xmlns:p14="http://schemas.microsoft.com/office/powerpoint/2010/main" val="2860398301"/>
-      </p:ext>
-    </p:extLst>
-  </p:cSld>
-  <p:clrMapOvr>
-    <a:masterClrMapping/>
-  </p:clrMapOvr>
-  <mc:AlternateContent xmlns:mc="http://schemas.openxmlformats.org/markup-compatibility/2006" xmlns:p14="http://schemas.microsoft.com/office/powerpoint/2010/main">
-    <mc:Choice Requires="p14">
-      <p:transition p14:dur="300">
-        <p:fade/>
-      </p:transition>
-    </mc:Choice>
-    <mc:Fallback xmlns="">
-      <p:transition>
-        <p:fade/>
-      </p:transition>
-    </mc:Fallback>
-  </mc:AlternateContent>
 </p:sld>
 </file>
 

</xml_diff>